<commit_message>
re-commit as updates to 03 and 04 didnt take.
</commit_message>
<xml_diff>
--- a/04 -EML standards.pptx
+++ b/04 -EML standards.pptx
@@ -5,26 +5,27 @@
     <p:sldMasterId id="2147483660" r:id="rId1"/>
   </p:sldMasterIdLst>
   <p:notesMasterIdLst>
-    <p:notesMasterId r:id="rId9"/>
+    <p:notesMasterId r:id="rId10"/>
   </p:notesMasterIdLst>
   <p:sldIdLst>
-    <p:sldId id="275" r:id="rId2"/>
-    <p:sldId id="276" r:id="rId3"/>
-    <p:sldId id="277" r:id="rId4"/>
-    <p:sldId id="278" r:id="rId5"/>
-    <p:sldId id="279" r:id="rId6"/>
-    <p:sldId id="280" r:id="rId7"/>
-    <p:sldId id="281" r:id="rId8"/>
+    <p:sldId id="282" r:id="rId2"/>
+    <p:sldId id="275" r:id="rId3"/>
+    <p:sldId id="276" r:id="rId4"/>
+    <p:sldId id="277" r:id="rId5"/>
+    <p:sldId id="278" r:id="rId6"/>
+    <p:sldId id="279" r:id="rId7"/>
+    <p:sldId id="280" r:id="rId8"/>
+    <p:sldId id="281" r:id="rId9"/>
   </p:sldIdLst>
   <p:sldSz cx="12192000" cy="6858000"/>
   <p:notesSz cx="6858000" cy="9144000"/>
   <p:embeddedFontLst>
     <p:embeddedFont>
       <p:font typeface="Calibri" panose="020F0502020204030204" pitchFamily="34" charset="0"/>
-      <p:regular r:id="rId10"/>
-      <p:bold r:id="rId11"/>
-      <p:italic r:id="rId12"/>
-      <p:boldItalic r:id="rId13"/>
+      <p:regular r:id="rId11"/>
+      <p:bold r:id="rId12"/>
+      <p:italic r:id="rId13"/>
+      <p:boldItalic r:id="rId14"/>
     </p:embeddedFont>
   </p:embeddedFontLst>
   <p:defaultTextStyle>
@@ -1458,6 +1459,115 @@
 </file>
 
 <file path=ppt/notesSlides/notesSlide1.xml><?xml version="1.0" encoding="utf-8"?>
+<p:notes xmlns:a="http://schemas.openxmlformats.org/drawingml/2006/main" xmlns:r="http://schemas.openxmlformats.org/officeDocument/2006/relationships" xmlns:p="http://schemas.openxmlformats.org/presentationml/2006/main">
+  <p:cSld>
+    <p:spTree>
+      <p:nvGrpSpPr>
+        <p:cNvPr id="1" name=""/>
+        <p:cNvGrpSpPr/>
+        <p:nvPr/>
+      </p:nvGrpSpPr>
+      <p:grpSpPr>
+        <a:xfrm>
+          <a:off x="0" y="0"/>
+          <a:ext cx="0" cy="0"/>
+          <a:chOff x="0" y="0"/>
+          <a:chExt cx="0" cy="0"/>
+        </a:xfrm>
+      </p:grpSpPr>
+      <p:sp>
+        <p:nvSpPr>
+          <p:cNvPr id="2" name="Slide Image Placeholder 1"/>
+          <p:cNvSpPr>
+            <a:spLocks noGrp="1" noRot="1" noChangeAspect="1"/>
+          </p:cNvSpPr>
+          <p:nvPr>
+            <p:ph type="sldImg"/>
+          </p:nvPr>
+        </p:nvSpPr>
+        <p:spPr/>
+      </p:sp>
+      <p:sp>
+        <p:nvSpPr>
+          <p:cNvPr id="3" name="Notes Placeholder 2"/>
+          <p:cNvSpPr>
+            <a:spLocks noGrp="1"/>
+          </p:cNvSpPr>
+          <p:nvPr>
+            <p:ph type="body" idx="1"/>
+          </p:nvPr>
+        </p:nvSpPr>
+        <p:spPr/>
+        <p:txBody>
+          <a:bodyPr/>
+          <a:lstStyle/>
+          <a:p>
+            <a:endParaRPr lang="en-CA" dirty="0"/>
+          </a:p>
+        </p:txBody>
+      </p:sp>
+      <p:sp>
+        <p:nvSpPr>
+          <p:cNvPr id="4" name="Slide Number Placeholder 3"/>
+          <p:cNvSpPr>
+            <a:spLocks noGrp="1"/>
+          </p:cNvSpPr>
+          <p:nvPr>
+            <p:ph type="sldNum" idx="12"/>
+          </p:nvPr>
+        </p:nvSpPr>
+        <p:spPr/>
+        <p:txBody>
+          <a:bodyPr/>
+          <a:lstStyle/>
+          <a:p>
+            <a:pPr marL="0" marR="0" lvl="0" indent="0" algn="r" rtl="0">
+              <a:spcBef>
+                <a:spcPts val="0"/>
+              </a:spcBef>
+              <a:spcAft>
+                <a:spcPts val="0"/>
+              </a:spcAft>
+              <a:buNone/>
+            </a:pPr>
+            <a:fld id="{00000000-1234-1234-1234-123412341234}" type="slidenum">
+              <a:rPr lang="en-US" sz="1200" b="0" i="0" u="none" strike="noStrike" cap="none" smtClean="0">
+                <a:solidFill>
+                  <a:schemeClr val="dk1"/>
+                </a:solidFill>
+                <a:latin typeface="Calibri"/>
+                <a:ea typeface="Calibri"/>
+                <a:cs typeface="Calibri"/>
+                <a:sym typeface="Calibri"/>
+              </a:rPr>
+              <a:t>1</a:t>
+            </a:fld>
+            <a:endParaRPr lang="en-US" sz="1200" b="0" i="0" u="none" strike="noStrike" cap="none">
+              <a:solidFill>
+                <a:schemeClr val="dk1"/>
+              </a:solidFill>
+              <a:latin typeface="Calibri"/>
+              <a:ea typeface="Calibri"/>
+              <a:cs typeface="Calibri"/>
+              <a:sym typeface="Calibri"/>
+            </a:endParaRPr>
+          </a:p>
+        </p:txBody>
+      </p:sp>
+    </p:spTree>
+    <p:extLst>
+      <p:ext uri="{BB962C8B-B14F-4D97-AF65-F5344CB8AC3E}">
+        <p14:creationId xmlns:p14="http://schemas.microsoft.com/office/powerpoint/2010/main" val="1241031381"/>
+      </p:ext>
+    </p:extLst>
+  </p:cSld>
+  <p:clrMapOvr>
+    <a:masterClrMapping/>
+  </p:clrMapOvr>
+</p:notes>
+</file>
+
+<file path=ppt/notesSlides/notesSlide2.xml><?xml version="1.0" encoding="utf-8"?>
 <p:notes xmlns:a="http://schemas.openxmlformats.org/drawingml/2006/main" xmlns:r="http://schemas.openxmlformats.org/officeDocument/2006/relationships" xmlns:p="http://schemas.openxmlformats.org/presentationml/2006/main" showMasterSp="0" showMasterPhAnim="0">
   <p:cSld>
     <p:spTree>
@@ -1561,7 +1671,7 @@
 </p:notes>
 </file>
 
-<file path=ppt/notesSlides/notesSlide2.xml><?xml version="1.0" encoding="utf-8"?>
+<file path=ppt/notesSlides/notesSlide3.xml><?xml version="1.0" encoding="utf-8"?>
 <p:notes xmlns:a="http://schemas.openxmlformats.org/drawingml/2006/main" xmlns:r="http://schemas.openxmlformats.org/officeDocument/2006/relationships" xmlns:p="http://schemas.openxmlformats.org/presentationml/2006/main" showMasterSp="0" showMasterPhAnim="0">
   <p:cSld>
     <p:spTree>
@@ -1612,7 +1722,22 @@
               </a:spcAft>
               <a:buNone/>
             </a:pPr>
-            <a:endParaRPr/>
+            <a:r>
+              <a:rPr lang="en-CA" dirty="0"/>
+              <a:t>For submitting to OBIS, the following 4 terms are the bare minimum: Title, Citation, Contact and Abstract.</a:t>
+            </a:r>
+          </a:p>
+          <a:p>
+            <a:pPr marL="0" lvl="0" indent="0" algn="l" rtl="0">
+              <a:spcBef>
+                <a:spcPts val="0"/>
+              </a:spcBef>
+              <a:spcAft>
+                <a:spcPts val="0"/>
+              </a:spcAft>
+              <a:buNone/>
+            </a:pPr>
+            <a:endParaRPr dirty="0"/>
           </a:p>
         </p:txBody>
       </p:sp>
@@ -1665,7 +1790,7 @@
 </p:notes>
 </file>
 
-<file path=ppt/notesSlides/notesSlide3.xml><?xml version="1.0" encoding="utf-8"?>
+<file path=ppt/notesSlides/notesSlide4.xml><?xml version="1.0" encoding="utf-8"?>
 <p:notes xmlns:a="http://schemas.openxmlformats.org/drawingml/2006/main" xmlns:r="http://schemas.openxmlformats.org/officeDocument/2006/relationships" xmlns:p="http://schemas.openxmlformats.org/presentationml/2006/main" showMasterSp="0" showMasterPhAnim="0">
   <p:cSld>
     <p:spTree>
@@ -1716,7 +1841,113 @@
               </a:spcAft>
               <a:buNone/>
             </a:pPr>
-            <a:endParaRPr/>
+            <a:r>
+              <a:rPr lang="en-CA" dirty="0"/>
+              <a:t>The IPT requires you to provide a </a:t>
+            </a:r>
+            <a:r>
+              <a:rPr lang="en-CA" dirty="0" err="1"/>
+              <a:t>Shortname</a:t>
+            </a:r>
+            <a:r>
+              <a:rPr lang="en-CA" dirty="0"/>
+              <a:t>. </a:t>
+            </a:r>
+            <a:r>
+              <a:rPr lang="en-CA" dirty="0" err="1"/>
+              <a:t>Shortnames</a:t>
+            </a:r>
+            <a:r>
+              <a:rPr lang="en-CA" dirty="0"/>
+              <a:t> serve as an identifier for the resource within the IPT installation (so should be unique within your IPT), and will be used as a parameter in the URL to access the resource via the Internet. Please use only alphanumeric characters, hyphens, or underscores. E.g. </a:t>
+            </a:r>
+            <a:r>
+              <a:rPr lang="en-CA" dirty="0" err="1"/>
+              <a:t>largenet_im</a:t>
+            </a:r>
+            <a:r>
+              <a:rPr lang="en-CA" dirty="0"/>
+              <a:t> in http://ipt.vliz.be/eurobis/resource?r=largenet_im. After creating a new dataset resource, the field </a:t>
+            </a:r>
+            <a:r>
+              <a:rPr lang="en-CA" dirty="0" err="1"/>
+              <a:t>titel</a:t>
+            </a:r>
+            <a:r>
+              <a:rPr lang="en-CA" dirty="0"/>
+              <a:t> will be filled out with the short name you provided earlier. Please make sure you provide a dataset title following the guidelines below.</a:t>
+            </a:r>
+          </a:p>
+          <a:p>
+            <a:pPr marL="0" lvl="0" indent="0" algn="l" rtl="0">
+              <a:spcBef>
+                <a:spcPts val="0"/>
+              </a:spcBef>
+              <a:spcAft>
+                <a:spcPts val="0"/>
+              </a:spcAft>
+              <a:buNone/>
+            </a:pPr>
+            <a:endParaRPr lang="en-CA" dirty="0"/>
+          </a:p>
+          <a:p>
+            <a:pPr marL="0" lvl="0" indent="0" algn="l" rtl="0">
+              <a:spcBef>
+                <a:spcPts val="0"/>
+              </a:spcBef>
+              <a:spcAft>
+                <a:spcPts val="0"/>
+              </a:spcAft>
+              <a:buNone/>
+            </a:pPr>
+            <a:r>
+              <a:rPr lang="en-CA" dirty="0"/>
+              <a:t>Dataset titles provided to OBIS node managers are often very cryptic, such as an acronym, and often only understandable by the data provider. However, to </a:t>
+            </a:r>
+            <a:r>
+              <a:rPr lang="en-CA" dirty="0" err="1"/>
+              <a:t>increae</a:t>
+            </a:r>
+            <a:r>
+              <a:rPr lang="en-CA" dirty="0"/>
+              <a:t> the discoverability and be useful for a larger audience, the dataset title should be as descriptive and complete as possible. OBIS recommends titles to contain information about the taxonomic, geographic and temporal coverage. If the dataset title does not meet these criteria and you believe the title should be changed, then contact the data provider with a suggestion or ask for a more descriptive title. If the dataset has already been published (made publicly available) - and therefore known by that title </a:t>
+            </a:r>
+            <a:r>
+              <a:rPr lang="en-CA" dirty="0" err="1"/>
+              <a:t>elsewere</a:t>
+            </a:r>
+            <a:r>
+              <a:rPr lang="en-CA" dirty="0"/>
+              <a:t>, then the same title should be kept (even if it would not meet the proposed guidelines)! Changing the title of an already published dataset cannot be done, as this will generate confusion and possible duplicates in systems like OBIS or GBIF in a later stage.</a:t>
+            </a:r>
+          </a:p>
+          <a:p>
+            <a:pPr marL="0" lvl="0" indent="0" algn="l" rtl="0">
+              <a:spcBef>
+                <a:spcPts val="0"/>
+              </a:spcBef>
+              <a:spcAft>
+                <a:spcPts val="0"/>
+              </a:spcAft>
+              <a:buNone/>
+            </a:pPr>
+            <a:endParaRPr lang="en-CA" dirty="0"/>
+          </a:p>
+          <a:p>
+            <a:pPr marL="0" lvl="0" indent="0" algn="l" rtl="0">
+              <a:spcBef>
+                <a:spcPts val="0"/>
+              </a:spcBef>
+              <a:spcAft>
+                <a:spcPts val="0"/>
+              </a:spcAft>
+              <a:buNone/>
+            </a:pPr>
+            <a:r>
+              <a:rPr lang="en-CA"/>
+              <a:t>The acronym or working title could still be documented in the metadata, so there is no confusion about how the full title is linked to the originally provided acronym or working title.</a:t>
+            </a:r>
+            <a:endParaRPr dirty="0"/>
           </a:p>
         </p:txBody>
       </p:sp>
@@ -1769,7 +2000,7 @@
 </p:notes>
 </file>
 
-<file path=ppt/notesSlides/notesSlide4.xml><?xml version="1.0" encoding="utf-8"?>
+<file path=ppt/notesSlides/notesSlide5.xml><?xml version="1.0" encoding="utf-8"?>
 <p:notes xmlns:a="http://schemas.openxmlformats.org/drawingml/2006/main" xmlns:r="http://schemas.openxmlformats.org/officeDocument/2006/relationships" xmlns:p="http://schemas.openxmlformats.org/presentationml/2006/main" showMasterSp="0" showMasterPhAnim="0">
   <p:cSld>
     <p:spTree>
@@ -1820,7 +2051,22 @@
               </a:spcAft>
               <a:buNone/>
             </a:pPr>
-            <a:endParaRPr/>
+            <a:r>
+              <a:rPr lang="en-CA" dirty="0"/>
+              <a:t>Brief description of the data resource.  Bilingual abstracts are supported with this procedure</a:t>
+            </a:r>
+          </a:p>
+          <a:p>
+            <a:pPr marL="0" lvl="0" indent="0" algn="l" rtl="0">
+              <a:spcBef>
+                <a:spcPts val="0"/>
+              </a:spcBef>
+              <a:spcAft>
+                <a:spcPts val="0"/>
+              </a:spcAft>
+              <a:buNone/>
+            </a:pPr>
+            <a:endParaRPr dirty="0"/>
           </a:p>
         </p:txBody>
       </p:sp>
@@ -1873,7 +2119,7 @@
 </p:notes>
 </file>
 
-<file path=ppt/notesSlides/notesSlide5.xml><?xml version="1.0" encoding="utf-8"?>
+<file path=ppt/notesSlides/notesSlide6.xml><?xml version="1.0" encoding="utf-8"?>
 <p:notes xmlns:a="http://schemas.openxmlformats.org/drawingml/2006/main" xmlns:r="http://schemas.openxmlformats.org/officeDocument/2006/relationships" xmlns:p="http://schemas.openxmlformats.org/presentationml/2006/main" showMasterSp="0" showMasterPhAnim="0">
   <p:cSld>
     <p:spTree>
@@ -1924,7 +2170,118 @@
               </a:spcAft>
               <a:buNone/>
             </a:pPr>
-            <a:endParaRPr/>
+            <a:r>
+              <a:rPr lang="en-CA" dirty="0"/>
+              <a:t>The contact is the person or organization that curates the resource and who should be contacted to get more information or to whom questions with the resource or data should be addressed. Although a number of fields are not required, it is strongly recommend to provide as much information as possible, and in particular the email address. This will also be the contact information that appears on the OBIS metadata pages.</a:t>
+            </a:r>
+          </a:p>
+          <a:p>
+            <a:pPr marL="0" lvl="0" indent="0" algn="l" rtl="0">
+              <a:spcBef>
+                <a:spcPts val="0"/>
+              </a:spcBef>
+              <a:spcAft>
+                <a:spcPts val="0"/>
+              </a:spcAft>
+              <a:buNone/>
+            </a:pPr>
+            <a:endParaRPr lang="en-CA" dirty="0"/>
+          </a:p>
+          <a:p>
+            <a:pPr marL="0" lvl="0" indent="0" algn="l" rtl="0">
+              <a:spcBef>
+                <a:spcPts val="0"/>
+              </a:spcBef>
+              <a:spcAft>
+                <a:spcPts val="0"/>
+              </a:spcAft>
+              <a:buNone/>
+            </a:pPr>
+            <a:r>
+              <a:rPr lang="en-CA" dirty="0"/>
+              <a:t>The creator is the person or organization responsible for the original creation of the resource content. When there are multiple creators, the one that bears the greatest responsibility is the resource creator, and other people can be added as associated parties with a role such as ‘originator’, ‘content provider’, ‘principle investigator’, etc.</a:t>
+            </a:r>
+          </a:p>
+          <a:p>
+            <a:pPr marL="0" lvl="0" indent="0" algn="l" rtl="0">
+              <a:spcBef>
+                <a:spcPts val="0"/>
+              </a:spcBef>
+              <a:spcAft>
+                <a:spcPts val="0"/>
+              </a:spcAft>
+              <a:buNone/>
+            </a:pPr>
+            <a:endParaRPr lang="en-CA" dirty="0"/>
+          </a:p>
+          <a:p>
+            <a:pPr marL="0" lvl="0" indent="0" algn="l" rtl="0">
+              <a:spcBef>
+                <a:spcPts val="0"/>
+              </a:spcBef>
+              <a:spcAft>
+                <a:spcPts val="0"/>
+              </a:spcAft>
+              <a:buNone/>
+            </a:pPr>
+            <a:r>
+              <a:rPr lang="en-CA" dirty="0"/>
+              <a:t>Possible functions/roles:</a:t>
+            </a:r>
+          </a:p>
+          <a:p>
+            <a:pPr marL="0" lvl="0" indent="0" algn="l" rtl="0">
+              <a:spcBef>
+                <a:spcPts val="0"/>
+              </a:spcBef>
+              <a:spcAft>
+                <a:spcPts val="0"/>
+              </a:spcAft>
+              <a:buNone/>
+            </a:pPr>
+            <a:endParaRPr lang="en-CA" dirty="0"/>
+          </a:p>
+          <a:p>
+            <a:pPr marL="0" lvl="0" indent="0" algn="l" rtl="0">
+              <a:spcBef>
+                <a:spcPts val="0"/>
+              </a:spcBef>
+              <a:spcAft>
+                <a:spcPts val="0"/>
+              </a:spcAft>
+              <a:buNone/>
+            </a:pPr>
+            <a:r>
+              <a:rPr lang="en-CA" dirty="0"/>
+              <a:t>    Originator (person/organization that originally gathered/prepared the dataset)</a:t>
+            </a:r>
+          </a:p>
+          <a:p>
+            <a:pPr marL="0" lvl="0" indent="0" algn="l" rtl="0">
+              <a:spcBef>
+                <a:spcPts val="0"/>
+              </a:spcBef>
+              <a:spcAft>
+                <a:spcPts val="0"/>
+              </a:spcAft>
+              <a:buNone/>
+            </a:pPr>
+            <a:r>
+              <a:rPr lang="en-CA" dirty="0"/>
+              <a:t>    Content provider (principal person/organization that contributed content to the dataset)</a:t>
+            </a:r>
+          </a:p>
+          <a:p>
+            <a:pPr marL="0" lvl="0" indent="0" algn="l" rtl="0">
+              <a:spcBef>
+                <a:spcPts val="0"/>
+              </a:spcBef>
+              <a:spcAft>
+                <a:spcPts val="0"/>
+              </a:spcAft>
+              <a:buNone/>
+            </a:pPr>
+            <a:endParaRPr dirty="0"/>
           </a:p>
         </p:txBody>
       </p:sp>
@@ -1977,7 +2334,7 @@
 </p:notes>
 </file>
 
-<file path=ppt/notesSlides/notesSlide6.xml><?xml version="1.0" encoding="utf-8"?>
+<file path=ppt/notesSlides/notesSlide7.xml><?xml version="1.0" encoding="utf-8"?>
 <p:notes xmlns:a="http://schemas.openxmlformats.org/drawingml/2006/main" xmlns:r="http://schemas.openxmlformats.org/officeDocument/2006/relationships" xmlns:p="http://schemas.openxmlformats.org/presentationml/2006/main" showMasterSp="0" showMasterPhAnim="0">
   <p:cSld>
     <p:spTree>
@@ -2028,7 +2385,53 @@
               </a:spcAft>
               <a:buNone/>
             </a:pPr>
-            <a:endParaRPr/>
+            <a:r>
+              <a:rPr lang="en-CA" dirty="0"/>
+              <a:t>Citations</a:t>
+            </a:r>
+          </a:p>
+          <a:p>
+            <a:pPr marL="0" lvl="0" indent="0" algn="l" rtl="0">
+              <a:spcBef>
+                <a:spcPts val="0"/>
+              </a:spcBef>
+              <a:spcAft>
+                <a:spcPts val="0"/>
+              </a:spcAft>
+              <a:buNone/>
+            </a:pPr>
+            <a:endParaRPr lang="en-CA" dirty="0"/>
+          </a:p>
+          <a:p>
+            <a:pPr marL="0" lvl="0" indent="0" algn="l" rtl="0">
+              <a:spcBef>
+                <a:spcPts val="0"/>
+              </a:spcBef>
+              <a:spcAft>
+                <a:spcPts val="0"/>
+              </a:spcAft>
+              <a:buNone/>
+            </a:pPr>
+            <a:r>
+              <a:rPr lang="en-CA" dirty="0"/>
+              <a:t>The dataset citation allows users to properly cite the datasets in further publications or other uses of the data. </a:t>
+            </a:r>
+          </a:p>
+          <a:p>
+            <a:pPr marL="0" lvl="0" indent="0" algn="l" rtl="0">
+              <a:spcBef>
+                <a:spcPts val="0"/>
+              </a:spcBef>
+              <a:spcAft>
+                <a:spcPts val="0"/>
+              </a:spcAft>
+              <a:buNone/>
+            </a:pPr>
+            <a:r>
+              <a:rPr lang="en-CA" dirty="0"/>
+              <a:t>A dataset citation is different from the data source citation (in case the data is digitized from a publication), and these references can be added to the additional metadata. A dataset citation can have the same format of a journal article citation, and should include the authors (contact, creator, principle investigator, data managers, custodians, collectors…), the title of the dataset, the name of the data publisher (or custodian institute), and the access point URL to the resource.</a:t>
+            </a:r>
+            <a:endParaRPr dirty="0"/>
           </a:p>
         </p:txBody>
       </p:sp>
@@ -2081,7 +2484,7 @@
 </p:notes>
 </file>
 
-<file path=ppt/notesSlides/notesSlide7.xml><?xml version="1.0" encoding="utf-8"?>
+<file path=ppt/notesSlides/notesSlide8.xml><?xml version="1.0" encoding="utf-8"?>
 <p:notes xmlns:a="http://schemas.openxmlformats.org/drawingml/2006/main" xmlns:r="http://schemas.openxmlformats.org/officeDocument/2006/relationships" xmlns:p="http://schemas.openxmlformats.org/presentationml/2006/main" showMasterSp="0" showMasterPhAnim="0">
   <p:cSld>
     <p:spTree>
@@ -2132,7 +2535,22 @@
               </a:spcAft>
               <a:buNone/>
             </a:pPr>
-            <a:endParaRPr/>
+            <a:r>
+              <a:rPr lang="en-CA" dirty="0"/>
+              <a:t>TODO: are we doing this exercise during this presentation?</a:t>
+            </a:r>
+          </a:p>
+          <a:p>
+            <a:pPr marL="0" lvl="0" indent="0" algn="l" rtl="0">
+              <a:spcBef>
+                <a:spcPts val="0"/>
+              </a:spcBef>
+              <a:spcAft>
+                <a:spcPts val="0"/>
+              </a:spcAft>
+              <a:buNone/>
+            </a:pPr>
+            <a:endParaRPr dirty="0"/>
           </a:p>
         </p:txBody>
       </p:sp>
@@ -11534,6 +11952,96 @@
   <p:cSld>
     <p:spTree>
       <p:nvGrpSpPr>
+        <p:cNvPr id="1" name=""/>
+        <p:cNvGrpSpPr/>
+        <p:nvPr/>
+      </p:nvGrpSpPr>
+      <p:grpSpPr>
+        <a:xfrm>
+          <a:off x="0" y="0"/>
+          <a:ext cx="0" cy="0"/>
+          <a:chOff x="0" y="0"/>
+          <a:chExt cx="0" cy="0"/>
+        </a:xfrm>
+      </p:grpSpPr>
+      <p:sp>
+        <p:nvSpPr>
+          <p:cNvPr id="2" name="Title 1">
+            <a:extLst>
+              <a:ext uri="{FF2B5EF4-FFF2-40B4-BE49-F238E27FC236}">
+                <a16:creationId xmlns:a16="http://schemas.microsoft.com/office/drawing/2014/main" id="{D320A2D9-132E-49C9-9913-7CEB0C1A15EB}"/>
+              </a:ext>
+            </a:extLst>
+          </p:cNvPr>
+          <p:cNvSpPr>
+            <a:spLocks noGrp="1"/>
+          </p:cNvSpPr>
+          <p:nvPr>
+            <p:ph type="ctrTitle"/>
+          </p:nvPr>
+        </p:nvSpPr>
+        <p:spPr/>
+        <p:txBody>
+          <a:bodyPr/>
+          <a:lstStyle/>
+          <a:p>
+            <a:r>
+              <a:rPr lang="en-CA" b="1" dirty="0"/>
+              <a:t>Ecological Metadata Language</a:t>
+            </a:r>
+            <a:br>
+              <a:rPr lang="en-CA" b="1" dirty="0"/>
+            </a:br>
+            <a:endParaRPr lang="en-CA" dirty="0"/>
+          </a:p>
+        </p:txBody>
+      </p:sp>
+      <p:sp>
+        <p:nvSpPr>
+          <p:cNvPr id="3" name="Subtitle 2">
+            <a:extLst>
+              <a:ext uri="{FF2B5EF4-FFF2-40B4-BE49-F238E27FC236}">
+                <a16:creationId xmlns:a16="http://schemas.microsoft.com/office/drawing/2014/main" id="{1DC9D013-6819-4223-B6B2-EF7296775342}"/>
+              </a:ext>
+            </a:extLst>
+          </p:cNvPr>
+          <p:cNvSpPr>
+            <a:spLocks noGrp="1"/>
+          </p:cNvSpPr>
+          <p:nvPr>
+            <p:ph type="subTitle" idx="1"/>
+          </p:nvPr>
+        </p:nvSpPr>
+        <p:spPr/>
+        <p:txBody>
+          <a:bodyPr/>
+          <a:lstStyle/>
+          <a:p>
+            <a:r>
+              <a:rPr lang="en-CA" dirty="0"/>
+              <a:t>Metadata Standards</a:t>
+            </a:r>
+          </a:p>
+        </p:txBody>
+      </p:sp>
+    </p:spTree>
+    <p:extLst>
+      <p:ext uri="{BB962C8B-B14F-4D97-AF65-F5344CB8AC3E}">
+        <p14:creationId xmlns:p14="http://schemas.microsoft.com/office/powerpoint/2010/main" val="942925178"/>
+      </p:ext>
+    </p:extLst>
+  </p:cSld>
+  <p:clrMapOvr>
+    <a:masterClrMapping/>
+  </p:clrMapOvr>
+</p:sld>
+</file>
+
+<file path=ppt/slides/slide2.xml><?xml version="1.0" encoding="utf-8"?>
+<p:sld xmlns:a="http://schemas.openxmlformats.org/drawingml/2006/main" xmlns:r="http://schemas.openxmlformats.org/officeDocument/2006/relationships" xmlns:p="http://schemas.openxmlformats.org/presentationml/2006/main">
+  <p:cSld>
+    <p:spTree>
+      <p:nvGrpSpPr>
         <p:cNvPr id="1" name="Shape 370"/>
         <p:cNvGrpSpPr/>
         <p:nvPr/>
@@ -11793,7 +12301,7 @@
 </p:sld>
 </file>
 
-<file path=ppt/slides/slide2.xml><?xml version="1.0" encoding="utf-8"?>
+<file path=ppt/slides/slide3.xml><?xml version="1.0" encoding="utf-8"?>
 <p:sld xmlns:a="http://schemas.openxmlformats.org/drawingml/2006/main" xmlns:r="http://schemas.openxmlformats.org/officeDocument/2006/relationships" xmlns:p="http://schemas.openxmlformats.org/presentationml/2006/main">
   <p:cSld>
     <p:spTree>
@@ -12340,7 +12848,7 @@
 </p:sld>
 </file>
 
-<file path=ppt/slides/slide3.xml><?xml version="1.0" encoding="utf-8"?>
+<file path=ppt/slides/slide4.xml><?xml version="1.0" encoding="utf-8"?>
 <p:sld xmlns:a="http://schemas.openxmlformats.org/drawingml/2006/main" xmlns:r="http://schemas.openxmlformats.org/officeDocument/2006/relationships" xmlns:p="http://schemas.openxmlformats.org/presentationml/2006/main">
   <p:cSld>
     <p:spTree>
@@ -13224,7 +13732,7 @@
 </p:sld>
 </file>
 
-<file path=ppt/slides/slide4.xml><?xml version="1.0" encoding="utf-8"?>
+<file path=ppt/slides/slide5.xml><?xml version="1.0" encoding="utf-8"?>
 <p:sld xmlns:a="http://schemas.openxmlformats.org/drawingml/2006/main" xmlns:r="http://schemas.openxmlformats.org/officeDocument/2006/relationships" xmlns:p="http://schemas.openxmlformats.org/presentationml/2006/main">
   <p:cSld>
     <p:spTree>
@@ -13378,7 +13886,7 @@
               </a:rPr>
               <a:t>The abstract or description of a dataset provides basic information on the content of the dataset. The information in the abstract should improve understanding and interpretation of the data. </a:t>
             </a:r>
-            <a:endParaRPr/>
+            <a:endParaRPr dirty="0"/>
           </a:p>
           <a:p>
             <a:pPr marL="91440" marR="0" lvl="0" indent="-95250" algn="l" rtl="0">
@@ -13757,13 +14265,13 @@
               <a:rPr lang="en-US" sz="1500" dirty="0">
                 <a:latin typeface="Calibri"/>
               </a:rPr>
-              <a:t>. Ce </a:t>
+              <a:t>. Ce jeu </a:t>
             </a:r>
             <a:r>
               <a:rPr lang="en-US" sz="1500" dirty="0" err="1">
                 <a:latin typeface="Calibri"/>
               </a:rPr>
-              <a:t>jeu</a:t>
+              <a:t>présente</a:t>
             </a:r>
             <a:r>
               <a:rPr lang="en-US" sz="1500" dirty="0">
@@ -13775,7 +14283,19 @@
               <a:rPr lang="en-US" sz="1500" dirty="0" err="1">
                 <a:latin typeface="Calibri"/>
               </a:rPr>
-              <a:t>présente</a:t>
+              <a:t>principalement</a:t>
+            </a:r>
+            <a:r>
+              <a:rPr lang="en-US" sz="1500" dirty="0">
+                <a:latin typeface="Calibri"/>
+              </a:rPr>
+              <a:t> des </a:t>
+            </a:r>
+            <a:r>
+              <a:rPr lang="en-US" sz="1500" dirty="0" err="1">
+                <a:latin typeface="Calibri"/>
+              </a:rPr>
+              <a:t>spécimens</a:t>
             </a:r>
             <a:r>
               <a:rPr lang="en-US" sz="1500" dirty="0">
@@ -13787,30 +14307,6 @@
               <a:rPr lang="en-US" sz="1500" dirty="0" err="1">
                 <a:latin typeface="Calibri"/>
               </a:rPr>
-              <a:t>principalement</a:t>
-            </a:r>
-            <a:r>
-              <a:rPr lang="en-US" sz="1500" dirty="0">
-                <a:latin typeface="Calibri"/>
-              </a:rPr>
-              <a:t> des </a:t>
-            </a:r>
-            <a:r>
-              <a:rPr lang="en-US" sz="1500" dirty="0" err="1">
-                <a:latin typeface="Calibri"/>
-              </a:rPr>
-              <a:t>spécimens</a:t>
-            </a:r>
-            <a:r>
-              <a:rPr lang="en-US" sz="1500" dirty="0">
-                <a:latin typeface="Calibri"/>
-              </a:rPr>
-              <a:t> </a:t>
-            </a:r>
-            <a:r>
-              <a:rPr lang="en-US" sz="1500" dirty="0" err="1">
-                <a:latin typeface="Calibri"/>
-              </a:rPr>
               <a:t>provenant</a:t>
             </a:r>
             <a:r>
@@ -13819,7 +14315,7 @@
               </a:rPr>
               <a:t> du Québec.</a:t>
             </a:r>
-            <a:endParaRPr lang="en-US">
+            <a:endParaRPr lang="en-US" dirty="0">
               <a:latin typeface="Calibri"/>
             </a:endParaRPr>
           </a:p>
@@ -13864,7 +14360,7 @@
               <a:buFont typeface="Calibri"/>
               <a:buNone/>
             </a:pPr>
-            <a:endParaRPr sz="1500" b="1" i="0" u="none" strike="noStrike" cap="none">
+            <a:endParaRPr sz="1500" b="1" i="0" u="none" strike="noStrike" cap="none" dirty="0">
               <a:solidFill>
                 <a:srgbClr val="3F3F3F"/>
               </a:solidFill>
@@ -13891,7 +14387,7 @@
               <a:buFont typeface="Calibri"/>
               <a:buNone/>
             </a:pPr>
-            <a:endParaRPr sz="1350" b="0" i="0" u="none" strike="noStrike" cap="none">
+            <a:endParaRPr sz="1350" b="0" i="0" u="none" strike="noStrike" cap="none" dirty="0">
               <a:solidFill>
                 <a:srgbClr val="3F3F3F"/>
               </a:solidFill>
@@ -13918,7 +14414,7 @@
               <a:buFont typeface="Calibri"/>
               <a:buNone/>
             </a:pPr>
-            <a:endParaRPr sz="1350" b="0" i="0" u="none" strike="noStrike" cap="none">
+            <a:endParaRPr sz="1350" b="0" i="0" u="none" strike="noStrike" cap="none" dirty="0">
               <a:solidFill>
                 <a:srgbClr val="3F3F3F"/>
               </a:solidFill>
@@ -13945,7 +14441,7 @@
               <a:buFont typeface="Calibri"/>
               <a:buNone/>
             </a:pPr>
-            <a:endParaRPr sz="1350" b="0" i="0" u="none" strike="noStrike" cap="none">
+            <a:endParaRPr sz="1350" b="0" i="0" u="none" strike="noStrike" cap="none" dirty="0">
               <a:solidFill>
                 <a:srgbClr val="3F3F3F"/>
               </a:solidFill>
@@ -13967,7 +14463,7 @@
               </a:buClr>
               <a:buSzPts val="1350"/>
             </a:pPr>
-            <a:endParaRPr lang="en-US" sz="1350">
+            <a:endParaRPr lang="en-US" sz="1350" dirty="0">
               <a:solidFill>
                 <a:srgbClr val="3F3F3F"/>
               </a:solidFill>
@@ -13986,7 +14482,7 @@
 </p:sld>
 </file>
 
-<file path=ppt/slides/slide5.xml><?xml version="1.0" encoding="utf-8"?>
+<file path=ppt/slides/slide6.xml><?xml version="1.0" encoding="utf-8"?>
 <p:sld xmlns:a="http://schemas.openxmlformats.org/drawingml/2006/main" xmlns:r="http://schemas.openxmlformats.org/officeDocument/2006/relationships" xmlns:p="http://schemas.openxmlformats.org/presentationml/2006/main">
   <p:cSld>
     <p:spTree>
@@ -14575,7 +15071,7 @@
 </p:sld>
 </file>
 
-<file path=ppt/slides/slide6.xml><?xml version="1.0" encoding="utf-8"?>
+<file path=ppt/slides/slide7.xml><?xml version="1.0" encoding="utf-8"?>
 <p:sld xmlns:a="http://schemas.openxmlformats.org/drawingml/2006/main" xmlns:r="http://schemas.openxmlformats.org/officeDocument/2006/relationships" xmlns:p="http://schemas.openxmlformats.org/presentationml/2006/main">
   <p:cSld>
     <p:spTree>
@@ -15232,7 +15728,7 @@
 </p:sld>
 </file>
 
-<file path=ppt/slides/slide7.xml><?xml version="1.0" encoding="utf-8"?>
+<file path=ppt/slides/slide8.xml><?xml version="1.0" encoding="utf-8"?>
 <p:sld xmlns:a="http://schemas.openxmlformats.org/drawingml/2006/main" xmlns:r="http://schemas.openxmlformats.org/officeDocument/2006/relationships" xmlns:p="http://schemas.openxmlformats.org/presentationml/2006/main">
   <p:cSld>
     <p:spTree>
@@ -15346,7 +15842,7 @@
               <a:buNone/>
             </a:pPr>
             <a:r>
-              <a:rPr lang="en-US" sz="1800" b="1" i="0" u="none" strike="noStrike" cap="none">
+              <a:rPr lang="en-US" sz="1800" b="1" i="0" u="none" strike="noStrike" cap="none" dirty="0">
                 <a:solidFill>
                   <a:srgbClr val="3F3F3F"/>
                 </a:solidFill>
@@ -15357,7 +15853,7 @@
               </a:rPr>
               <a:t>Data paper</a:t>
             </a:r>
-            <a:endParaRPr/>
+            <a:endParaRPr dirty="0"/>
           </a:p>
           <a:p>
             <a:pPr marL="150876" marR="0" lvl="1" indent="0" algn="l" rtl="0">
@@ -15377,7 +15873,7 @@
               <a:buFont typeface="Calibri"/>
               <a:buNone/>
             </a:pPr>
-            <a:endParaRPr sz="1800" b="0" i="0" u="none" strike="noStrike" cap="none">
+            <a:endParaRPr sz="1800" b="0" i="0" u="none" strike="noStrike" cap="none" dirty="0">
               <a:solidFill>
                 <a:srgbClr val="3F3F3F"/>
               </a:solidFill>
@@ -15406,7 +15902,7 @@
               <a:buNone/>
             </a:pPr>
             <a:r>
-              <a:rPr lang="en-US" sz="1800" b="0" i="0" u="none" strike="noStrike" cap="none">
+              <a:rPr lang="en-US" sz="1800" b="0" i="0" u="none" strike="noStrike" cap="none" dirty="0">
                 <a:solidFill>
                   <a:srgbClr val="3F3F3F"/>
                 </a:solidFill>
@@ -15415,9 +15911,33 @@
                 <a:cs typeface="Calibri"/>
                 <a:sym typeface="Calibri"/>
               </a:rPr>
-              <a:t>Fill in as much metadata as possible and publish your metadata as a data paper e.g. in a Pensoft journal, by importing the eml.xml file into their arpha tool. </a:t>
+              <a:t>Fill in as much metadata as possible and publish your metadata as a data paper e.g. in a Pensoft journal, by importing the eml.xml file into their </a:t>
             </a:r>
-            <a:endParaRPr/>
+            <a:r>
+              <a:rPr lang="en-US" sz="1800" b="0" i="0" u="none" strike="noStrike" cap="none" dirty="0" err="1">
+                <a:solidFill>
+                  <a:srgbClr val="3F3F3F"/>
+                </a:solidFill>
+                <a:latin typeface="Calibri"/>
+                <a:ea typeface="Calibri"/>
+                <a:cs typeface="Calibri"/>
+                <a:sym typeface="Calibri"/>
+              </a:rPr>
+              <a:t>arpha</a:t>
+            </a:r>
+            <a:r>
+              <a:rPr lang="en-US" sz="1800" b="0" i="0" u="none" strike="noStrike" cap="none" dirty="0">
+                <a:solidFill>
+                  <a:srgbClr val="3F3F3F"/>
+                </a:solidFill>
+                <a:latin typeface="Calibri"/>
+                <a:ea typeface="Calibri"/>
+                <a:cs typeface="Calibri"/>
+                <a:sym typeface="Calibri"/>
+              </a:rPr>
+              <a:t> tool. </a:t>
+            </a:r>
+            <a:endParaRPr dirty="0"/>
           </a:p>
           <a:p>
             <a:pPr marL="150876" marR="0" lvl="1" indent="0" algn="l" rtl="0">
@@ -15437,7 +15957,7 @@
               <a:buFont typeface="Calibri"/>
               <a:buNone/>
             </a:pPr>
-            <a:endParaRPr sz="1800" b="0" i="0" u="none" strike="noStrike" cap="none">
+            <a:endParaRPr sz="1800" b="0" i="0" u="none" strike="noStrike" cap="none" dirty="0">
               <a:solidFill>
                 <a:srgbClr val="3F3F3F"/>
               </a:solidFill>
@@ -15466,7 +15986,7 @@
               <a:buNone/>
             </a:pPr>
             <a:r>
-              <a:rPr lang="en-US" sz="1800" b="0" i="0" u="none" strike="noStrike" cap="none">
+              <a:rPr lang="en-US" sz="1800" b="0" i="0" u="none" strike="noStrike" cap="none" dirty="0">
                 <a:solidFill>
                   <a:srgbClr val="3F3F3F"/>
                 </a:solidFill>
@@ -15478,7 +15998,7 @@
               <a:t>Instructions: </a:t>
             </a:r>
             <a:r>
-              <a:rPr lang="en-US" sz="1800" b="0" i="0" u="sng" strike="noStrike" cap="none">
+              <a:rPr lang="en-US" sz="1800" b="0" i="0" u="sng" strike="noStrike" cap="none" dirty="0">
                 <a:solidFill>
                   <a:schemeClr val="hlink"/>
                 </a:solidFill>
@@ -15491,7 +16011,7 @@
               <a:t>https://arpha.pensoft.net/tips/From-GBIF-IPT-metadata-EML</a:t>
             </a:r>
             <a:r>
-              <a:rPr lang="en-US" sz="1800" b="0" i="0" u="none" strike="noStrike" cap="none">
+              <a:rPr lang="en-US" sz="1800" b="0" i="0" u="none" strike="noStrike" cap="none" dirty="0">
                 <a:solidFill>
                   <a:srgbClr val="3F3F3F"/>
                 </a:solidFill>
@@ -15502,7 +16022,7 @@
               </a:rPr>
               <a:t> </a:t>
             </a:r>
-            <a:endParaRPr/>
+            <a:endParaRPr dirty="0"/>
           </a:p>
         </p:txBody>
       </p:sp>

</xml_diff>

<commit_message>
fixed todo in 04, reformatted assignments to be Rmd and knitted HTML.
</commit_message>
<xml_diff>
--- a/04 -EML standards.pptx
+++ b/04 -EML standards.pptx
@@ -2537,20 +2537,13 @@
             </a:pPr>
             <a:r>
               <a:rPr lang="en-CA" dirty="0"/>
-              <a:t>TODO: are we doing this exercise during this presentation?</a:t>
+              <a:t>So, we won’t do this just yet, but it’s worth highlighting that due to their shared understanding of EML we can take a dataset published on an IPT, and register it with a Pensoft journal as a ‘data paper’, simply by exporting the EML and importing it to the appropriate Pensoft journal of </a:t>
             </a:r>
-          </a:p>
-          <a:p>
-            <a:pPr marL="0" lvl="0" indent="0" algn="l" rtl="0">
-              <a:spcBef>
-                <a:spcPts val="0"/>
-              </a:spcBef>
-              <a:spcAft>
-                <a:spcPts val="0"/>
-              </a:spcAft>
-              <a:buNone/>
-            </a:pPr>
-            <a:endParaRPr dirty="0"/>
+            <a:r>
+              <a:rPr lang="en-CA"/>
+              <a:t>our choice.</a:t>
+            </a:r>
+            <a:endParaRPr lang="en-CA" dirty="0"/>
           </a:p>
         </p:txBody>
       </p:sp>

</xml_diff>

<commit_message>
adding notes for 04thru 06
</commit_message>
<xml_diff>
--- a/04 -EML standards.pptx
+++ b/04 -EML standards.pptx
@@ -1609,6 +1609,74 @@
           </a:bodyPr>
           <a:lstStyle/>
           <a:p>
+            <a:pPr marL="0" marR="0" lvl="0" indent="0" algn="l" rtl="0">
+              <a:spcBef>
+                <a:spcPts val="0"/>
+              </a:spcBef>
+              <a:spcAft>
+                <a:spcPts val="0"/>
+              </a:spcAft>
+              <a:buNone/>
+            </a:pPr>
+            <a:r>
+              <a:rPr lang="en-CA" sz="1200" dirty="0">
+                <a:solidFill>
+                  <a:schemeClr val="dk1"/>
+                </a:solidFill>
+                <a:latin typeface="Calibri"/>
+                <a:ea typeface="Calibri"/>
+                <a:cs typeface="Calibri"/>
+                <a:sym typeface="Calibri"/>
+              </a:rPr>
+              <a:t>OBIS (and GBIF) uses the Ecological Metadata Language (EML), in more particularly the GBIF EML profile (version 1.1), as its metadata standard.</a:t>
+            </a:r>
+            <a:endParaRPr lang="en-CA" dirty="0"/>
+          </a:p>
+          <a:p>
+            <a:pPr marL="0" marR="0" lvl="0" indent="0" algn="l" rtl="0">
+              <a:spcBef>
+                <a:spcPts val="0"/>
+              </a:spcBef>
+              <a:spcAft>
+                <a:spcPts val="0"/>
+              </a:spcAft>
+              <a:buNone/>
+            </a:pPr>
+            <a:endParaRPr lang="en-CA" sz="1200" dirty="0">
+              <a:solidFill>
+                <a:schemeClr val="dk1"/>
+              </a:solidFill>
+              <a:latin typeface="Calibri"/>
+              <a:ea typeface="Calibri"/>
+              <a:cs typeface="Calibri"/>
+              <a:sym typeface="Calibri"/>
+            </a:endParaRPr>
+          </a:p>
+          <a:p>
+            <a:pPr marL="0" marR="0" lvl="0" indent="0" algn="l" rtl="0">
+              <a:spcBef>
+                <a:spcPts val="0"/>
+              </a:spcBef>
+              <a:spcAft>
+                <a:spcPts val="0"/>
+              </a:spcAft>
+              <a:buNone/>
+            </a:pPr>
+            <a:r>
+              <a:rPr lang="en-CA" sz="1200" dirty="0">
+                <a:solidFill>
+                  <a:schemeClr val="dk1"/>
+                </a:solidFill>
+                <a:latin typeface="Calibri"/>
+                <a:ea typeface="Calibri"/>
+                <a:cs typeface="Calibri"/>
+                <a:sym typeface="Calibri"/>
+              </a:rPr>
+              <a:t>The Integrated Publishing Toolkit (IPT) developed by GBIF provides an online interface to manually fill in the EML terms.</a:t>
+            </a:r>
+            <a:endParaRPr lang="en-CA" dirty="0"/>
+          </a:p>
+          <a:p>
             <a:pPr marL="0" lvl="0" indent="0" algn="l" rtl="0">
               <a:spcBef>
                 <a:spcPts val="0"/>
@@ -1618,7 +1686,31 @@
               </a:spcAft>
               <a:buNone/>
             </a:pPr>
-            <a:endParaRPr/>
+            <a:endParaRPr lang="en-CA" dirty="0"/>
+          </a:p>
+          <a:p>
+            <a:pPr marL="0" lvl="0" indent="0" algn="l" rtl="0">
+              <a:spcBef>
+                <a:spcPts val="0"/>
+              </a:spcBef>
+              <a:spcAft>
+                <a:spcPts val="0"/>
+              </a:spcAft>
+              <a:buNone/>
+            </a:pPr>
+            <a:r>
+              <a:rPr lang="en-CA" dirty="0"/>
+              <a:t>This metadata is concerned with discovery, and attribution, it’s what populates the flashy dataset pages on the OBIS website, and how we register </a:t>
+            </a:r>
+            <a:r>
+              <a:rPr lang="en-CA"/>
+              <a:t>who funded, collected</a:t>
+            </a:r>
+            <a:r>
+              <a:rPr lang="en-CA" dirty="0"/>
+              <a:t>, curated, published, and were the primary users of each dataset.</a:t>
+            </a:r>
+            <a:endParaRPr dirty="0"/>
           </a:p>
         </p:txBody>
       </p:sp>
@@ -1867,15 +1959,7 @@
             </a:r>
             <a:r>
               <a:rPr lang="en-CA" dirty="0"/>
-              <a:t> in http://ipt.vliz.be/eurobis/resource?r=largenet_im. After creating a new dataset resource, the field </a:t>
-            </a:r>
-            <a:r>
-              <a:rPr lang="en-CA" dirty="0" err="1"/>
-              <a:t>titel</a:t>
-            </a:r>
-            <a:r>
-              <a:rPr lang="en-CA" dirty="0"/>
-              <a:t> will be filled out with the short name you provided earlier. Please make sure you provide a dataset title following the guidelines below.</a:t>
+              <a:t> in http://ipt.vliz.be/eurobis/resource?r=largenet_im. After creating a new dataset resource, the field title will be filled out with the short name you provided earlier. Please make sure you provide a dataset title following the guidelines below.</a:t>
             </a:r>
           </a:p>
           <a:p>
@@ -1902,49 +1986,33 @@
             </a:pPr>
             <a:r>
               <a:rPr lang="en-CA" dirty="0"/>
-              <a:t>Dataset titles provided to OBIS node managers are often very cryptic, such as an acronym, and often only understandable by the data provider. However, to </a:t>
+              <a:t>Dataset titles provided to OBIS node managers are often very cryptic, such as an acronym, and often only understandable by the data provider. However, to increase the discoverability and be useful for a larger audience, the dataset title should be as descriptive and complete as possible. OBIS recommends titles to contain information about the taxonomic, geographic and temporal coverage. If the dataset title does not meet these criteria and you believe the title should be changed, then contact the data provider with a suggestion or ask for a more descriptive title. If the dataset has already been published (made publicly available) - and therefore known by that title elsewhere, then the same title should be kept (even if it would not meet the proposed guidelines)! Changing the title of an already published dataset cannot be done, as this will generate confusion and possible duplicates in systems like OBIS or GBIF in a later stage.</a:t>
             </a:r>
-            <a:r>
-              <a:rPr lang="en-CA" dirty="0" err="1"/>
-              <a:t>increae</a:t>
-            </a:r>
+          </a:p>
+          <a:p>
+            <a:pPr marL="0" lvl="0" indent="0" algn="l" rtl="0">
+              <a:spcBef>
+                <a:spcPts val="0"/>
+              </a:spcBef>
+              <a:spcAft>
+                <a:spcPts val="0"/>
+              </a:spcAft>
+              <a:buNone/>
+            </a:pPr>
+            <a:endParaRPr lang="en-CA" dirty="0"/>
+          </a:p>
+          <a:p>
+            <a:pPr marL="0" lvl="0" indent="0" algn="l" rtl="0">
+              <a:spcBef>
+                <a:spcPts val="0"/>
+              </a:spcBef>
+              <a:spcAft>
+                <a:spcPts val="0"/>
+              </a:spcAft>
+              <a:buNone/>
+            </a:pPr>
             <a:r>
               <a:rPr lang="en-CA" dirty="0"/>
-              <a:t> the discoverability and be useful for a larger audience, the dataset title should be as descriptive and complete as possible. OBIS recommends titles to contain information about the taxonomic, geographic and temporal coverage. If the dataset title does not meet these criteria and you believe the title should be changed, then contact the data provider with a suggestion or ask for a more descriptive title. If the dataset has already been published (made publicly available) - and therefore known by that title </a:t>
-            </a:r>
-            <a:r>
-              <a:rPr lang="en-CA" dirty="0" err="1"/>
-              <a:t>elsewere</a:t>
-            </a:r>
-            <a:r>
-              <a:rPr lang="en-CA" dirty="0"/>
-              <a:t>, then the same title should be kept (even if it would not meet the proposed guidelines)! Changing the title of an already published dataset cannot be done, as this will generate confusion and possible duplicates in systems like OBIS or GBIF in a later stage.</a:t>
-            </a:r>
-          </a:p>
-          <a:p>
-            <a:pPr marL="0" lvl="0" indent="0" algn="l" rtl="0">
-              <a:spcBef>
-                <a:spcPts val="0"/>
-              </a:spcBef>
-              <a:spcAft>
-                <a:spcPts val="0"/>
-              </a:spcAft>
-              <a:buNone/>
-            </a:pPr>
-            <a:endParaRPr lang="en-CA" dirty="0"/>
-          </a:p>
-          <a:p>
-            <a:pPr marL="0" lvl="0" indent="0" algn="l" rtl="0">
-              <a:spcBef>
-                <a:spcPts val="0"/>
-              </a:spcBef>
-              <a:spcAft>
-                <a:spcPts val="0"/>
-              </a:spcAft>
-              <a:buNone/>
-            </a:pPr>
-            <a:r>
-              <a:rPr lang="en-CA"/>
               <a:t>The acronym or working title could still be documented in the metadata, so there is no confusion about how the full title is linked to the originally provided acronym or working title.</a:t>
             </a:r>
             <a:endParaRPr dirty="0"/>
@@ -2537,13 +2605,8 @@
             </a:pPr>
             <a:r>
               <a:rPr lang="en-CA" dirty="0"/>
-              <a:t>So, we won’t do this just yet, but it’s worth highlighting that due to their shared understanding of EML we can take a dataset published on an IPT, and register it with a Pensoft journal as a ‘data paper’, simply by exporting the EML and importing it to the appropriate Pensoft journal of </a:t>
+              <a:t>So, we won’t do this just yet, but it’s worth highlighting that due to their shared understanding of EML we can take a dataset published on an IPT, and register it with a Pensoft journal as a ‘data paper’, simply by exporting the EML and importing it to the appropriate Pensoft journal of our choice.</a:t>
             </a:r>
-            <a:r>
-              <a:rPr lang="en-CA"/>
-              <a:t>our choice.</a:t>
-            </a:r>
-            <a:endParaRPr lang="en-CA" dirty="0"/>
           </a:p>
         </p:txBody>
       </p:sp>
@@ -12136,7 +12199,7 @@
               <a:buNone/>
             </a:pPr>
             <a:r>
-              <a:rPr lang="en-US" sz="1800">
+              <a:rPr lang="en-US" sz="1800" dirty="0">
                 <a:solidFill>
                   <a:schemeClr val="dk1"/>
                 </a:solidFill>
@@ -12147,7 +12210,7 @@
               </a:rPr>
               <a:t>OBIS (and GBIF) uses the Ecological Metadata Language (EML), in more particularly the GBIF EML profile (version 1.1), as its metadata standard.</a:t>
             </a:r>
-            <a:endParaRPr/>
+            <a:endParaRPr dirty="0"/>
           </a:p>
           <a:p>
             <a:pPr marL="0" marR="0" lvl="0" indent="0" algn="l" rtl="0">
@@ -12159,7 +12222,7 @@
               </a:spcAft>
               <a:buNone/>
             </a:pPr>
-            <a:endParaRPr sz="1800">
+            <a:endParaRPr sz="1800" dirty="0">
               <a:solidFill>
                 <a:schemeClr val="dk1"/>
               </a:solidFill>
@@ -12180,7 +12243,7 @@
               <a:buNone/>
             </a:pPr>
             <a:r>
-              <a:rPr lang="en-US" sz="1800">
+              <a:rPr lang="en-US" sz="1800" dirty="0">
                 <a:solidFill>
                   <a:schemeClr val="dk1"/>
                 </a:solidFill>
@@ -12191,7 +12254,7 @@
               </a:rPr>
               <a:t>The Integrated Publishing Toolkit (IPT) developed by GBIF provides an online interface to manually fill in the EML terms.</a:t>
             </a:r>
-            <a:endParaRPr/>
+            <a:endParaRPr dirty="0"/>
           </a:p>
         </p:txBody>
       </p:sp>
@@ -12400,7 +12463,7 @@
               <a:buNone/>
             </a:pPr>
             <a:r>
-              <a:rPr lang="en-US" sz="1800" b="1">
+              <a:rPr lang="en-US" sz="1800" b="1" dirty="0">
                 <a:solidFill>
                   <a:srgbClr val="FF0000"/>
                 </a:solidFill>
@@ -12411,7 +12474,7 @@
               </a:rPr>
               <a:t>Required by OBIS</a:t>
             </a:r>
-            <a:endParaRPr sz="1800" b="1">
+            <a:endParaRPr sz="1800" b="1" dirty="0">
               <a:solidFill>
                 <a:srgbClr val="FF0000"/>
               </a:solidFill>
@@ -12458,7 +12521,7 @@
               <a:buNone/>
             </a:pPr>
             <a:r>
-              <a:rPr lang="en-US" sz="1800">
+              <a:rPr lang="en-US" sz="1800" dirty="0">
                 <a:solidFill>
                   <a:schemeClr val="dk1"/>
                 </a:solidFill>
@@ -12469,7 +12532,7 @@
               </a:rPr>
               <a:t>EML TERMS </a:t>
             </a:r>
-            <a:endParaRPr/>
+            <a:endParaRPr dirty="0"/>
           </a:p>
           <a:p>
             <a:pPr marL="214312" marR="0" lvl="0" indent="-100012" algn="l" rtl="0">
@@ -12486,7 +12549,7 @@
               <a:buFont typeface="Arial"/>
               <a:buNone/>
             </a:pPr>
-            <a:endParaRPr sz="1800">
+            <a:endParaRPr sz="1800" dirty="0">
               <a:solidFill>
                 <a:schemeClr val="dk1"/>
               </a:solidFill>
@@ -12512,7 +12575,7 @@
               <a:buChar char="-"/>
             </a:pPr>
             <a:r>
-              <a:rPr lang="en-US" sz="1800">
+              <a:rPr lang="en-US" sz="1800" dirty="0">
                 <a:solidFill>
                   <a:srgbClr val="FF0000"/>
                 </a:solidFill>
@@ -12523,7 +12586,7 @@
               </a:rPr>
               <a:t>Title</a:t>
             </a:r>
-            <a:endParaRPr/>
+            <a:endParaRPr dirty="0"/>
           </a:p>
           <a:p>
             <a:pPr marL="214312" marR="0" lvl="0" indent="-214312" algn="l" rtl="0">
@@ -12541,7 +12604,7 @@
               <a:buChar char="-"/>
             </a:pPr>
             <a:r>
-              <a:rPr lang="en-US" sz="1800">
+              <a:rPr lang="en-US" sz="1800" dirty="0">
                 <a:solidFill>
                   <a:srgbClr val="FF0000"/>
                 </a:solidFill>
@@ -12552,7 +12615,7 @@
               </a:rPr>
               <a:t>Abstract</a:t>
             </a:r>
-            <a:endParaRPr/>
+            <a:endParaRPr dirty="0"/>
           </a:p>
           <a:p>
             <a:pPr marL="214312" marR="0" lvl="0" indent="-214312" algn="l" rtl="0">
@@ -12570,7 +12633,7 @@
               <a:buChar char="-"/>
             </a:pPr>
             <a:r>
-              <a:rPr lang="en-US" sz="1800">
+              <a:rPr lang="en-US" sz="1800" dirty="0">
                 <a:solidFill>
                   <a:srgbClr val="FF0000"/>
                 </a:solidFill>
@@ -12581,7 +12644,7 @@
               </a:rPr>
               <a:t>Contact</a:t>
             </a:r>
-            <a:endParaRPr/>
+            <a:endParaRPr dirty="0"/>
           </a:p>
           <a:p>
             <a:pPr marL="214312" marR="0" lvl="0" indent="-214312" algn="l" rtl="0">
@@ -12599,7 +12662,7 @@
               <a:buChar char="-"/>
             </a:pPr>
             <a:r>
-              <a:rPr lang="en-US" sz="1800">
+              <a:rPr lang="en-US" sz="1800" dirty="0">
                 <a:solidFill>
                   <a:srgbClr val="FF0000"/>
                 </a:solidFill>
@@ -12610,7 +12673,7 @@
               </a:rPr>
               <a:t>Citation</a:t>
             </a:r>
-            <a:endParaRPr/>
+            <a:endParaRPr dirty="0"/>
           </a:p>
           <a:p>
             <a:pPr marL="214312" marR="0" lvl="0" indent="-214312" algn="l" rtl="0">
@@ -12628,7 +12691,7 @@
               <a:buChar char="-"/>
             </a:pPr>
             <a:r>
-              <a:rPr lang="en-US" sz="1800">
+              <a:rPr lang="en-US" sz="1800" dirty="0" err="1">
                 <a:solidFill>
                   <a:schemeClr val="dk1"/>
                 </a:solidFill>
@@ -12639,7 +12702,7 @@
               </a:rPr>
               <a:t>geographicCoverage</a:t>
             </a:r>
-            <a:endParaRPr sz="1800">
+            <a:endParaRPr sz="1800" dirty="0">
               <a:solidFill>
                 <a:schemeClr val="dk1"/>
               </a:solidFill>
@@ -12665,7 +12728,7 @@
               <a:buChar char="-"/>
             </a:pPr>
             <a:r>
-              <a:rPr lang="en-US" sz="1800">
+              <a:rPr lang="en-US" sz="1800" dirty="0" err="1">
                 <a:solidFill>
                   <a:schemeClr val="dk1"/>
                 </a:solidFill>
@@ -12676,7 +12739,7 @@
               </a:rPr>
               <a:t>temporalCoverage</a:t>
             </a:r>
-            <a:endParaRPr sz="1800">
+            <a:endParaRPr sz="1800" dirty="0">
               <a:solidFill>
                 <a:schemeClr val="dk1"/>
               </a:solidFill>
@@ -12702,7 +12765,7 @@
               <a:buChar char="-"/>
             </a:pPr>
             <a:r>
-              <a:rPr lang="en-US" sz="1800">
+              <a:rPr lang="en-US" sz="1800" dirty="0" err="1">
                 <a:solidFill>
                   <a:schemeClr val="dk1"/>
                 </a:solidFill>
@@ -12711,9 +12774,21 @@
                 <a:cs typeface="Calibri"/>
                 <a:sym typeface="Calibri"/>
               </a:rPr>
-              <a:t>taxonomicCoverage </a:t>
+              <a:t>taxonomicCoverage</a:t>
             </a:r>
-            <a:endParaRPr/>
+            <a:r>
+              <a:rPr lang="en-US" sz="1800" dirty="0">
+                <a:solidFill>
+                  <a:schemeClr val="dk1"/>
+                </a:solidFill>
+                <a:latin typeface="Calibri"/>
+                <a:ea typeface="Calibri"/>
+                <a:cs typeface="Calibri"/>
+                <a:sym typeface="Calibri"/>
+              </a:rPr>
+              <a:t> </a:t>
+            </a:r>
+            <a:endParaRPr dirty="0"/>
           </a:p>
           <a:p>
             <a:pPr marL="214312" marR="0" lvl="0" indent="-214312" algn="l" rtl="0">
@@ -12731,7 +12806,7 @@
               <a:buChar char="-"/>
             </a:pPr>
             <a:r>
-              <a:rPr lang="en-US" sz="1800">
+              <a:rPr lang="en-US" sz="1800" dirty="0">
                 <a:solidFill>
                   <a:schemeClr val="dk1"/>
                 </a:solidFill>
@@ -12742,7 +12817,7 @@
               </a:rPr>
               <a:t>purpose</a:t>
             </a:r>
-            <a:endParaRPr/>
+            <a:endParaRPr dirty="0"/>
           </a:p>
           <a:p>
             <a:pPr marL="214312" marR="0" lvl="0" indent="-214312" algn="l" rtl="0">
@@ -12760,7 +12835,7 @@
               <a:buChar char="-"/>
             </a:pPr>
             <a:r>
-              <a:rPr lang="en-US" sz="1800">
+              <a:rPr lang="en-US" sz="1800" dirty="0">
                 <a:solidFill>
                   <a:schemeClr val="dk1"/>
                 </a:solidFill>
@@ -12771,7 +12846,7 @@
               </a:rPr>
               <a:t>methods (sampling, QC) </a:t>
             </a:r>
-            <a:endParaRPr/>
+            <a:endParaRPr dirty="0"/>
           </a:p>
           <a:p>
             <a:pPr marL="214312" marR="0" lvl="0" indent="-214312" algn="l" rtl="0">
@@ -12789,7 +12864,7 @@
               <a:buChar char="-"/>
             </a:pPr>
             <a:r>
-              <a:rPr lang="en-US" sz="1800">
+              <a:rPr lang="en-US" sz="1800" dirty="0">
                 <a:solidFill>
                   <a:schemeClr val="dk1"/>
                 </a:solidFill>
@@ -12800,7 +12875,7 @@
               </a:rPr>
               <a:t>project</a:t>
             </a:r>
-            <a:endParaRPr/>
+            <a:endParaRPr dirty="0"/>
           </a:p>
           <a:p>
             <a:pPr marL="214312" marR="0" lvl="0" indent="-214312" algn="l" rtl="0">
@@ -12818,7 +12893,7 @@
               <a:buChar char="-"/>
             </a:pPr>
             <a:r>
-              <a:rPr lang="en-US" sz="1800">
+              <a:rPr lang="en-US" sz="1800" dirty="0">
                 <a:solidFill>
                   <a:schemeClr val="dk1"/>
                 </a:solidFill>
@@ -12829,7 +12904,7 @@
               </a:rPr>
               <a:t>keywords </a:t>
             </a:r>
-            <a:endParaRPr/>
+            <a:endParaRPr dirty="0"/>
           </a:p>
         </p:txBody>
       </p:sp>

</xml_diff>

<commit_message>
added some content to EML ppt
</commit_message>
<xml_diff>
--- a/04 -EML standards.pptx
+++ b/04 -EML standards.pptx
@@ -1628,7 +1628,7 @@
                 <a:cs typeface="Calibri"/>
                 <a:sym typeface="Calibri"/>
               </a:rPr>
-              <a:t>OBIS (and GBIF) uses the Ecological Metadata Language (EML), in more particularly the GBIF EML profile (version 1.1), as its metadata standard.</a:t>
+              <a:t>OBIS (and GBIF) uses the Ecological Metadata Language (EML), in more particularly the GBIF EML profile (version 1.1), as its metadata standard. EML has moved leaps and bounds beyond 1.1 (v2.2 released in September 2019) but the GBIF profile split off from it in 2014 or so and it hasn’t been tracking alongside the current EML standard.</a:t>
             </a:r>
             <a:endParaRPr lang="en-CA" dirty="0"/>
           </a:p>
@@ -1672,7 +1672,7 @@
                 <a:cs typeface="Calibri"/>
                 <a:sym typeface="Calibri"/>
               </a:rPr>
-              <a:t>The Integrated Publishing Toolkit (IPT) developed by GBIF provides an online interface to manually fill in the EML terms.</a:t>
+              <a:t>The Integrated Publishing Toolkit (IPT) developed by GBIF provides an online interface to manually fill in the EML terms via webform and generate a eml.xml file that is compliant.</a:t>
             </a:r>
             <a:endParaRPr lang="en-CA" dirty="0"/>
           </a:p>
@@ -1700,15 +1700,7 @@
             </a:pPr>
             <a:r>
               <a:rPr lang="en-CA" dirty="0"/>
-              <a:t>This metadata is concerned with discovery, and attribution, it’s what populates the flashy dataset pages on the OBIS website, and how we register </a:t>
-            </a:r>
-            <a:r>
-              <a:rPr lang="en-CA"/>
-              <a:t>who funded, collected</a:t>
-            </a:r>
-            <a:r>
-              <a:rPr lang="en-CA" dirty="0"/>
-              <a:t>, curated, published, and were the primary users of each dataset.</a:t>
+              <a:t>This metadata is concerned with discovery, and attribution, it’s what populates the flashy dataset pages on the OBIS website, and how we register who funded, collected, curated, published, and were the primary users of each dataset.</a:t>
             </a:r>
             <a:endParaRPr dirty="0"/>
           </a:p>
@@ -1951,7 +1943,15 @@
             </a:r>
             <a:r>
               <a:rPr lang="en-CA" dirty="0"/>
-              <a:t> serve as an identifier for the resource within the IPT installation (so should be unique within your IPT), and will be used as a parameter in the URL to access the resource via the Internet. Please use only alphanumeric characters, hyphens, or underscores. E.g. </a:t>
+              <a:t> serve as an identifier for the resource within the IPT installation (so should be unique within your IPT), and will be used as a parameter in the URL to access the resource via the Internet. The convention is to use only alphanumeric characters, hyphens, or </a:t>
+            </a:r>
+            <a:r>
+              <a:rPr lang="en-CA" dirty="0" err="1"/>
+              <a:t>underscoresm</a:t>
+            </a:r>
+            <a:r>
+              <a:rPr lang="en-CA" dirty="0"/>
+              <a:t> so no spaces, and no special characters or marks. E.g. </a:t>
             </a:r>
             <a:r>
               <a:rPr lang="en-CA" dirty="0" err="1"/>
@@ -2121,8 +2121,13 @@
             </a:pPr>
             <a:r>
               <a:rPr lang="en-CA" dirty="0"/>
-              <a:t>Brief description of the data resource.  Bilingual abstracts are supported with this procedure</a:t>
+              <a:t>Brief description of the data resource.  If you are providing a subset or a generalization / averaging of the complete source data, you can flag it here and also in </a:t>
             </a:r>
+            <a:r>
+              <a:rPr lang="en-CA" dirty="0" err="1"/>
+              <a:t>dataGeneralizations</a:t>
+            </a:r>
+            <a:endParaRPr lang="en-CA" dirty="0"/>
           </a:p>
           <a:p>
             <a:pPr marL="0" lvl="0" indent="0" algn="l" rtl="0">
@@ -2134,6 +2139,61 @@
               </a:spcAft>
               <a:buNone/>
             </a:pPr>
+            <a:endParaRPr lang="en-CA" dirty="0"/>
+          </a:p>
+          <a:p>
+            <a:pPr marL="0" lvl="0" indent="0" algn="l" rtl="0">
+              <a:spcBef>
+                <a:spcPts val="0"/>
+              </a:spcBef>
+              <a:spcAft>
+                <a:spcPts val="0"/>
+              </a:spcAft>
+              <a:buNone/>
+            </a:pPr>
+            <a:endParaRPr lang="en-CA" dirty="0"/>
+          </a:p>
+          <a:p>
+            <a:pPr marL="0" lvl="0" indent="0" algn="l" rtl="0">
+              <a:spcBef>
+                <a:spcPts val="0"/>
+              </a:spcBef>
+              <a:spcAft>
+                <a:spcPts val="0"/>
+              </a:spcAft>
+              <a:buNone/>
+            </a:pPr>
+            <a:r>
+              <a:rPr lang="en-CA" dirty="0"/>
+              <a:t>Bilingual abstracts can be supported with this procedure</a:t>
+            </a:r>
+          </a:p>
+          <a:p>
+            <a:pPr marL="0" lvl="0" indent="0" algn="l" rtl="0">
+              <a:spcBef>
+                <a:spcPts val="0"/>
+              </a:spcBef>
+              <a:spcAft>
+                <a:spcPts val="0"/>
+              </a:spcAft>
+              <a:buNone/>
+            </a:pPr>
+            <a:endParaRPr lang="en-CA" dirty="0"/>
+          </a:p>
+          <a:p>
+            <a:pPr marL="0" lvl="0" indent="0" algn="l" rtl="0">
+              <a:spcBef>
+                <a:spcPts val="0"/>
+              </a:spcBef>
+              <a:spcAft>
+                <a:spcPts val="0"/>
+              </a:spcAft>
+              <a:buNone/>
+            </a:pPr>
+            <a:r>
+              <a:rPr lang="en-CA" dirty="0"/>
+              <a:t>EML proper has more accommodation for multilingual abstracts, this could be a development request</a:t>
+            </a:r>
             <a:endParaRPr dirty="0"/>
           </a:p>
         </p:txBody>
@@ -2240,7 +2300,7 @@
             </a:pPr>
             <a:r>
               <a:rPr lang="en-CA" dirty="0"/>
-              <a:t>The contact is the person or organization that curates the resource and who should be contacted to get more information or to whom questions with the resource or data should be addressed. Although a number of fields are not required, it is strongly recommend to provide as much information as possible, and in particular the email address. This will also be the contact information that appears on the OBIS metadata pages.</a:t>
+              <a:t>The resource contact is the person or organization that curates the resource and who should be contacted to get more information or to whom questions with the resource or data should be addressed. Although a number of fields are not required, it is strongly recommend to provide as much information as possible, and in particular the email address. This will also be the contact information that appears on the OBIS metadata pages.</a:t>
             </a:r>
           </a:p>
           <a:p>
@@ -2267,7 +2327,7 @@
             </a:pPr>
             <a:r>
               <a:rPr lang="en-CA" dirty="0"/>
-              <a:t>The creator is the person or organization responsible for the original creation of the resource content. When there are multiple creators, the one that bears the greatest responsibility is the resource creator, and other people can be added as associated parties with a role such as ‘originator’, ‘content provider’, ‘principle investigator’, etc.</a:t>
+              <a:t>The resource creator is the person or organization responsible for the original creation of the resource content. When there are multiple creators, the one that bears the greatest responsibility is the resource creator, and other people can be added as associated parties with a role such as ‘originator’, ‘content provider’, ‘principle investigator’, etc.</a:t>
             </a:r>
           </a:p>
           <a:p>
@@ -2349,6 +2409,22 @@
               </a:spcAft>
               <a:buNone/>
             </a:pPr>
+            <a:endParaRPr lang="en-CA" dirty="0"/>
+          </a:p>
+          <a:p>
+            <a:pPr marL="0" lvl="0" indent="0" algn="l" rtl="0">
+              <a:spcBef>
+                <a:spcPts val="0"/>
+              </a:spcBef>
+              <a:spcAft>
+                <a:spcPts val="0"/>
+              </a:spcAft>
+              <a:buNone/>
+            </a:pPr>
+            <a:r>
+              <a:rPr lang="en-CA" dirty="0"/>
+              <a:t>If you’re building EML via the IPT you’ll see pre-created forms for the few roles they want you to fill out by default, and the option to add more personnel and roles below those. Each role lays out name, position, org, contact info, plus a Personnel Directory/Identifier dropdown</a:t>
+            </a:r>
             <a:endParaRPr dirty="0"/>
           </a:p>
         </p:txBody>
@@ -2498,6 +2574,60 @@
             <a:r>
               <a:rPr lang="en-CA" dirty="0"/>
               <a:t>A dataset citation is different from the data source citation (in case the data is digitized from a publication), and these references can be added to the additional metadata. A dataset citation can have the same format of a journal article citation, and should include the authors (contact, creator, principle investigator, data managers, custodians, collectors…), the title of the dataset, the name of the data publisher (or custodian institute), and the access point URL to the resource.</a:t>
+            </a:r>
+          </a:p>
+          <a:p>
+            <a:pPr marL="0" lvl="0" indent="0" algn="l" rtl="0">
+              <a:spcBef>
+                <a:spcPts val="0"/>
+              </a:spcBef>
+              <a:spcAft>
+                <a:spcPts val="0"/>
+              </a:spcAft>
+              <a:buNone/>
+            </a:pPr>
+            <a:endParaRPr lang="en-CA" dirty="0"/>
+          </a:p>
+          <a:p>
+            <a:pPr marL="0" lvl="0" indent="0" algn="l" rtl="0">
+              <a:spcBef>
+                <a:spcPts val="0"/>
+              </a:spcBef>
+              <a:spcAft>
+                <a:spcPts val="0"/>
+              </a:spcAft>
+              <a:buNone/>
+            </a:pPr>
+            <a:r>
+              <a:rPr lang="en-CA" dirty="0"/>
+              <a:t>There’s a citation generator built into the GBIF IPT that you can turn on or off. Citations include a version number for datasets that get updated continually, and can also include a Citation Identifier, so a DOI/or other persistent universal resource identifier, that will resolve to some external resource. You can supply your own format for citation but I don’t believe they will let you template it yet using other variables in the metadata. Also, if you supply your own citation format, when it’s published to GBIF, that gets replaced with the auto-citation on the gbif.org dataset pages. For them, it’s a matter of standardization over customization, but they’ve left a line open at the GBIF helpdesk for people who truly cannot abide this, and must provide a specific citation profile.</a:t>
+            </a:r>
+          </a:p>
+          <a:p>
+            <a:pPr marL="0" lvl="0" indent="0" algn="l" rtl="0">
+              <a:spcBef>
+                <a:spcPts val="0"/>
+              </a:spcBef>
+              <a:spcAft>
+                <a:spcPts val="0"/>
+              </a:spcAft>
+              <a:buNone/>
+            </a:pPr>
+            <a:endParaRPr lang="en-CA" dirty="0"/>
+          </a:p>
+          <a:p>
+            <a:pPr marL="0" lvl="0" indent="0" algn="l" rtl="0">
+              <a:spcBef>
+                <a:spcPts val="0"/>
+              </a:spcBef>
+              <a:spcAft>
+                <a:spcPts val="0"/>
+              </a:spcAft>
+              <a:buNone/>
+            </a:pPr>
+            <a:r>
+              <a:rPr lang="en-CA" dirty="0"/>
+              <a:t>Here’s the formula the citation generator uses, and here’s an example of how that works in practice.</a:t>
             </a:r>
             <a:endParaRPr dirty="0"/>
           </a:p>
@@ -12020,6 +12150,37 @@
           <a:chExt cx="0" cy="0"/>
         </a:xfrm>
       </p:grpSpPr>
+      <p:pic>
+        <p:nvPicPr>
+          <p:cNvPr id="5" name="Picture 3">
+            <a:extLst>
+              <a:ext uri="{FF2B5EF4-FFF2-40B4-BE49-F238E27FC236}">
+                <a16:creationId xmlns:a16="http://schemas.microsoft.com/office/drawing/2014/main" id="{AC3E99D4-9B4C-416F-8675-CDC5DDDF456A}"/>
+              </a:ext>
+            </a:extLst>
+          </p:cNvPr>
+          <p:cNvPicPr>
+            <a:picLocks noChangeAspect="1"/>
+          </p:cNvPicPr>
+          <p:nvPr/>
+        </p:nvPicPr>
+        <p:blipFill rotWithShape="1">
+          <a:blip r:embed="rId3">
+            <a:alphaModFix amt="50000"/>
+          </a:blip>
+          <a:srcRect l="14726" t="14029" r="14726" b="20703"/>
+          <a:stretch/>
+        </p:blipFill>
+        <p:spPr>
+          <a:xfrm>
+            <a:off x="0" y="0"/>
+            <a:ext cx="12192000" cy="6345382"/>
+          </a:xfrm>
+          <a:prstGeom prst="rect">
+            <a:avLst/>
+          </a:prstGeom>
+        </p:spPr>
+      </p:pic>
       <p:sp>
         <p:nvSpPr>
           <p:cNvPr id="2" name="Title 1">
@@ -12110,6 +12271,37 @@
           <a:chExt cx="0" cy="0"/>
         </a:xfrm>
       </p:grpSpPr>
+      <p:pic>
+        <p:nvPicPr>
+          <p:cNvPr id="6" name="Picture 3">
+            <a:extLst>
+              <a:ext uri="{FF2B5EF4-FFF2-40B4-BE49-F238E27FC236}">
+                <a16:creationId xmlns:a16="http://schemas.microsoft.com/office/drawing/2014/main" id="{2B7D88D7-A42B-4FC9-B9FB-36279453591C}"/>
+              </a:ext>
+            </a:extLst>
+          </p:cNvPr>
+          <p:cNvPicPr>
+            <a:picLocks noChangeAspect="1"/>
+          </p:cNvPicPr>
+          <p:nvPr/>
+        </p:nvPicPr>
+        <p:blipFill rotWithShape="1">
+          <a:blip r:embed="rId3">
+            <a:alphaModFix amt="50000"/>
+          </a:blip>
+          <a:srcRect l="14726" t="14029" r="14726" b="20703"/>
+          <a:stretch/>
+        </p:blipFill>
+        <p:spPr>
+          <a:xfrm>
+            <a:off x="0" y="0"/>
+            <a:ext cx="12192000" cy="6345382"/>
+          </a:xfrm>
+          <a:prstGeom prst="rect">
+            <a:avLst/>
+          </a:prstGeom>
+        </p:spPr>
+      </p:pic>
       <p:sp>
         <p:nvSpPr>
           <p:cNvPr id="371" name="Google Shape;371;p33"/>
@@ -12122,7 +12314,7 @@
         </p:nvSpPr>
         <p:spPr>
           <a:xfrm>
-            <a:off x="1117600" y="365125"/>
+            <a:off x="838200" y="158334"/>
             <a:ext cx="14020800" cy="1325700"/>
           </a:xfrm>
           <a:prstGeom prst="rect">
@@ -12157,10 +12349,10 @@
               <a:buNone/>
             </a:pPr>
             <a:r>
-              <a:rPr lang="en-US"/>
+              <a:rPr lang="en-US" dirty="0"/>
               <a:t>Metadata standards</a:t>
             </a:r>
-            <a:endParaRPr/>
+            <a:endParaRPr dirty="0"/>
           </a:p>
         </p:txBody>
       </p:sp>
@@ -12266,7 +12458,7 @@
         </p:nvSpPr>
         <p:spPr>
           <a:xfrm>
-            <a:off x="4684296" y="5256201"/>
+            <a:off x="6145763" y="3754496"/>
             <a:ext cx="7496700" cy="461700"/>
           </a:xfrm>
           <a:prstGeom prst="rect">
@@ -12293,7 +12485,7 @@
               <a:buNone/>
             </a:pPr>
             <a:r>
-              <a:rPr lang="en-US" sz="2400">
+              <a:rPr lang="en-US" sz="2400" dirty="0">
                 <a:solidFill>
                   <a:schemeClr val="accent1"/>
                 </a:solidFill>
@@ -12305,7 +12497,7 @@
               <a:t>OBIS Manual: </a:t>
             </a:r>
             <a:r>
-              <a:rPr lang="en-US" sz="2400" u="sng">
+              <a:rPr lang="en-US" sz="2400" u="sng" dirty="0">
                 <a:solidFill>
                   <a:schemeClr val="hlink"/>
                 </a:solidFill>
@@ -12313,11 +12505,11 @@
                 <a:ea typeface="Calibri"/>
                 <a:cs typeface="Calibri"/>
                 <a:sym typeface="Calibri"/>
-                <a:hlinkClick r:id="rId3"/>
+                <a:hlinkClick r:id="rId4"/>
               </a:rPr>
               <a:t>https://obis.org/manual/eml</a:t>
             </a:r>
-            <a:endParaRPr sz="2400">
+            <a:endParaRPr sz="2400" dirty="0">
               <a:solidFill>
                 <a:schemeClr val="accent1"/>
               </a:solidFill>
@@ -12337,7 +12529,7 @@
               </a:spcAft>
               <a:buNone/>
             </a:pPr>
-            <a:endParaRPr sz="2400">
+            <a:endParaRPr sz="2400" dirty="0">
               <a:solidFill>
                 <a:schemeClr val="accent1"/>
               </a:solidFill>
@@ -12374,6 +12566,37 @@
           <a:chExt cx="0" cy="0"/>
         </a:xfrm>
       </p:grpSpPr>
+      <p:pic>
+        <p:nvPicPr>
+          <p:cNvPr id="6" name="Picture 3">
+            <a:extLst>
+              <a:ext uri="{FF2B5EF4-FFF2-40B4-BE49-F238E27FC236}">
+                <a16:creationId xmlns:a16="http://schemas.microsoft.com/office/drawing/2014/main" id="{5660DF54-BB5C-4F5B-80BC-3906F49CB3EE}"/>
+              </a:ext>
+            </a:extLst>
+          </p:cNvPr>
+          <p:cNvPicPr>
+            <a:picLocks noChangeAspect="1"/>
+          </p:cNvPicPr>
+          <p:nvPr/>
+        </p:nvPicPr>
+        <p:blipFill rotWithShape="1">
+          <a:blip r:embed="rId3">
+            <a:alphaModFix amt="50000"/>
+          </a:blip>
+          <a:srcRect l="14726" t="14029" r="14726" b="20703"/>
+          <a:stretch/>
+        </p:blipFill>
+        <p:spPr>
+          <a:xfrm>
+            <a:off x="0" y="0"/>
+            <a:ext cx="12192000" cy="6345382"/>
+          </a:xfrm>
+          <a:prstGeom prst="rect">
+            <a:avLst/>
+          </a:prstGeom>
+        </p:spPr>
+      </p:pic>
       <p:sp>
         <p:nvSpPr>
           <p:cNvPr id="378" name="Google Shape;378;p34"/>
@@ -12933,6 +13156,37 @@
           <a:chExt cx="0" cy="0"/>
         </a:xfrm>
       </p:grpSpPr>
+      <p:pic>
+        <p:nvPicPr>
+          <p:cNvPr id="7" name="Picture 3">
+            <a:extLst>
+              <a:ext uri="{FF2B5EF4-FFF2-40B4-BE49-F238E27FC236}">
+                <a16:creationId xmlns:a16="http://schemas.microsoft.com/office/drawing/2014/main" id="{E99A4541-3D5B-4D53-89E5-58BE1D794D79}"/>
+              </a:ext>
+            </a:extLst>
+          </p:cNvPr>
+          <p:cNvPicPr>
+            <a:picLocks noChangeAspect="1"/>
+          </p:cNvPicPr>
+          <p:nvPr/>
+        </p:nvPicPr>
+        <p:blipFill rotWithShape="1">
+          <a:blip r:embed="rId3">
+            <a:alphaModFix amt="50000"/>
+          </a:blip>
+          <a:srcRect l="14726" t="14029" r="14726" b="20703"/>
+          <a:stretch/>
+        </p:blipFill>
+        <p:spPr>
+          <a:xfrm>
+            <a:off x="0" y="0"/>
+            <a:ext cx="12192000" cy="6345382"/>
+          </a:xfrm>
+          <a:prstGeom prst="rect">
+            <a:avLst/>
+          </a:prstGeom>
+        </p:spPr>
+      </p:pic>
       <p:sp>
         <p:nvSpPr>
           <p:cNvPr id="385" name="Google Shape;385;p35"/>
@@ -13401,10 +13655,10 @@
                         <a:buNone/>
                       </a:pPr>
                       <a:r>
-                        <a:rPr lang="en-US" sz="1200"/>
+                        <a:rPr lang="en-US" sz="1200" dirty="0" err="1"/>
                         <a:t>Benthos_NS</a:t>
                       </a:r>
-                      <a:endParaRPr/>
+                      <a:endParaRPr dirty="0"/>
                     </a:p>
                   </a:txBody>
                   <a:tcPr marL="68575" marR="68575" marT="34300" marB="34300"/>
@@ -13582,7 +13836,7 @@
                         </a:spcAft>
                         <a:buNone/>
                       </a:pPr>
-                      <a:endParaRPr sz="1200"/>
+                      <a:endParaRPr sz="1200" dirty="0"/>
                     </a:p>
                   </a:txBody>
                   <a:tcPr marL="68575" marR="68575" marT="34300" marB="34300"/>
@@ -13817,6 +14071,37 @@
           <a:chExt cx="0" cy="0"/>
         </a:xfrm>
       </p:grpSpPr>
+      <p:pic>
+        <p:nvPicPr>
+          <p:cNvPr id="5" name="Picture 3">
+            <a:extLst>
+              <a:ext uri="{FF2B5EF4-FFF2-40B4-BE49-F238E27FC236}">
+                <a16:creationId xmlns:a16="http://schemas.microsoft.com/office/drawing/2014/main" id="{D668FB4D-AF65-48C3-A851-7E7BBC175AAF}"/>
+              </a:ext>
+            </a:extLst>
+          </p:cNvPr>
+          <p:cNvPicPr>
+            <a:picLocks noChangeAspect="1"/>
+          </p:cNvPicPr>
+          <p:nvPr/>
+        </p:nvPicPr>
+        <p:blipFill rotWithShape="1">
+          <a:blip r:embed="rId3">
+            <a:alphaModFix amt="50000"/>
+          </a:blip>
+          <a:srcRect l="14726" t="14029" r="14726" b="20703"/>
+          <a:stretch/>
+        </p:blipFill>
+        <p:spPr>
+          <a:xfrm>
+            <a:off x="0" y="0"/>
+            <a:ext cx="12192000" cy="6345382"/>
+          </a:xfrm>
+          <a:prstGeom prst="rect">
+            <a:avLst/>
+          </a:prstGeom>
+        </p:spPr>
+      </p:pic>
       <p:sp>
         <p:nvSpPr>
           <p:cNvPr id="393" name="Google Shape;393;p36"/>
@@ -13829,7 +14114,7 @@
         </p:nvSpPr>
         <p:spPr>
           <a:xfrm>
-            <a:off x="1117600" y="365125"/>
+            <a:off x="501014" y="262488"/>
             <a:ext cx="14020800" cy="1325700"/>
           </a:xfrm>
           <a:prstGeom prst="rect">
@@ -13864,10 +14149,10 @@
               <a:buNone/>
             </a:pPr>
             <a:r>
-              <a:rPr lang="en-US"/>
+              <a:rPr lang="en-US" dirty="0"/>
               <a:t>Metadata standards</a:t>
             </a:r>
-            <a:endParaRPr/>
+            <a:endParaRPr dirty="0"/>
           </a:p>
         </p:txBody>
       </p:sp>
@@ -14567,6 +14852,37 @@
           <a:chExt cx="0" cy="0"/>
         </a:xfrm>
       </p:grpSpPr>
+      <p:pic>
+        <p:nvPicPr>
+          <p:cNvPr id="5" name="Picture 3">
+            <a:extLst>
+              <a:ext uri="{FF2B5EF4-FFF2-40B4-BE49-F238E27FC236}">
+                <a16:creationId xmlns:a16="http://schemas.microsoft.com/office/drawing/2014/main" id="{D2A89851-E576-49E1-AB47-1C3370AADB8A}"/>
+              </a:ext>
+            </a:extLst>
+          </p:cNvPr>
+          <p:cNvPicPr>
+            <a:picLocks noChangeAspect="1"/>
+          </p:cNvPicPr>
+          <p:nvPr/>
+        </p:nvPicPr>
+        <p:blipFill rotWithShape="1">
+          <a:blip r:embed="rId3">
+            <a:alphaModFix amt="50000"/>
+          </a:blip>
+          <a:srcRect l="14726" t="14029" r="14726" b="20703"/>
+          <a:stretch/>
+        </p:blipFill>
+        <p:spPr>
+          <a:xfrm>
+            <a:off x="0" y="0"/>
+            <a:ext cx="12192000" cy="6345382"/>
+          </a:xfrm>
+          <a:prstGeom prst="rect">
+            <a:avLst/>
+          </a:prstGeom>
+        </p:spPr>
+      </p:pic>
       <p:sp>
         <p:nvSpPr>
           <p:cNvPr id="399" name="Google Shape;399;p37"/>
@@ -14664,7 +14980,7 @@
               <a:buNone/>
             </a:pPr>
             <a:r>
-              <a:rPr lang="en-US" sz="1500" b="1">
+              <a:rPr lang="en-US" sz="1500" b="1" dirty="0">
                 <a:solidFill>
                   <a:srgbClr val="3F3F3F"/>
                 </a:solidFill>
@@ -14675,7 +14991,7 @@
               </a:rPr>
               <a:t>Contact</a:t>
             </a:r>
-            <a:endParaRPr/>
+            <a:endParaRPr dirty="0"/>
           </a:p>
           <a:p>
             <a:pPr marL="91440" marR="0" lvl="0" indent="-91440" algn="l" rtl="0">
@@ -14696,7 +15012,7 @@
               <a:buNone/>
             </a:pPr>
             <a:r>
-              <a:rPr lang="en-US" sz="1500">
+              <a:rPr lang="en-US" sz="1500" dirty="0">
                 <a:solidFill>
                   <a:srgbClr val="3F3F3F"/>
                 </a:solidFill>
@@ -14707,7 +15023,7 @@
               </a:rPr>
               <a:t>Publisher (institution)</a:t>
             </a:r>
-            <a:endParaRPr/>
+            <a:endParaRPr dirty="0"/>
           </a:p>
           <a:p>
             <a:pPr marL="91440" marR="0" lvl="0" indent="-91440" algn="l" rtl="0">
@@ -14728,7 +15044,7 @@
               <a:buNone/>
             </a:pPr>
             <a:r>
-              <a:rPr lang="en-US" sz="1500">
+              <a:rPr lang="en-US" sz="1500" dirty="0">
                 <a:solidFill>
                   <a:srgbClr val="3F3F3F"/>
                 </a:solidFill>
@@ -14739,7 +15055,7 @@
               </a:rPr>
               <a:t>Contact (person + institution)</a:t>
             </a:r>
-            <a:endParaRPr/>
+            <a:endParaRPr dirty="0"/>
           </a:p>
           <a:p>
             <a:pPr marL="91440" marR="0" lvl="0" indent="-91440" algn="l" rtl="0">
@@ -14760,7 +15076,7 @@
               <a:buNone/>
             </a:pPr>
             <a:r>
-              <a:rPr lang="en-US" sz="1500">
+              <a:rPr lang="en-US" sz="1500" dirty="0">
                 <a:solidFill>
                   <a:srgbClr val="3F3F3F"/>
                 </a:solidFill>
@@ -14771,7 +15087,7 @@
               </a:rPr>
               <a:t>Creator (person + institution)</a:t>
             </a:r>
-            <a:endParaRPr/>
+            <a:endParaRPr dirty="0"/>
           </a:p>
           <a:p>
             <a:pPr marL="91440" marR="0" lvl="0" indent="-91440" algn="l" rtl="0">
@@ -14792,7 +15108,7 @@
               <a:buNone/>
             </a:pPr>
             <a:r>
-              <a:rPr lang="en-US" sz="1500">
+              <a:rPr lang="en-US" sz="1500" dirty="0">
                 <a:solidFill>
                   <a:srgbClr val="3F3F3F"/>
                 </a:solidFill>
@@ -14803,7 +15119,7 @@
               </a:rPr>
               <a:t>Associate party (person + institution)</a:t>
             </a:r>
-            <a:endParaRPr/>
+            <a:endParaRPr dirty="0"/>
           </a:p>
           <a:p>
             <a:pPr marL="384048" marR="0" lvl="1" indent="-182880" algn="l" rtl="0">
@@ -14824,7 +15140,7 @@
               <a:buChar char="◦"/>
             </a:pPr>
             <a:r>
-              <a:rPr lang="en-US" sz="1350" b="0" i="0" u="none" strike="noStrike" cap="none">
+              <a:rPr lang="en-US" sz="1350" b="0" i="0" u="none" strike="noStrike" cap="none" dirty="0">
                 <a:solidFill>
                   <a:srgbClr val="3F3F3F"/>
                 </a:solidFill>
@@ -14835,7 +15151,7 @@
               </a:rPr>
               <a:t>Originator</a:t>
             </a:r>
-            <a:endParaRPr sz="1350" b="0" i="0" u="none" strike="noStrike" cap="none">
+            <a:endParaRPr sz="1350" b="0" i="0" u="none" strike="noStrike" cap="none" dirty="0">
               <a:solidFill>
                 <a:srgbClr val="3F3F3F"/>
               </a:solidFill>
@@ -14864,7 +15180,7 @@
               <a:buChar char="◦"/>
             </a:pPr>
             <a:r>
-              <a:rPr lang="en-US" sz="1350" b="0" i="0" u="none" strike="noStrike" cap="none">
+              <a:rPr lang="en-US" sz="1350" b="0" i="0" u="none" strike="noStrike" cap="none" dirty="0">
                 <a:solidFill>
                   <a:srgbClr val="3F3F3F"/>
                 </a:solidFill>
@@ -14875,7 +15191,7 @@
               </a:rPr>
               <a:t>Content provider</a:t>
             </a:r>
-            <a:endParaRPr/>
+            <a:endParaRPr dirty="0"/>
           </a:p>
           <a:p>
             <a:pPr marL="384048" marR="0" lvl="1" indent="-182880" algn="l" rtl="0">
@@ -14896,7 +15212,7 @@
               <a:buChar char="◦"/>
             </a:pPr>
             <a:r>
-              <a:rPr lang="en-US" sz="1350" b="0" i="0" u="none" strike="noStrike" cap="none">
+              <a:rPr lang="en-US" sz="1350" b="0" i="0" u="none" strike="noStrike" cap="none" dirty="0">
                 <a:solidFill>
                   <a:srgbClr val="3F3F3F"/>
                 </a:solidFill>
@@ -14907,7 +15223,7 @@
               </a:rPr>
               <a:t>Principle investigator</a:t>
             </a:r>
-            <a:endParaRPr/>
+            <a:endParaRPr dirty="0"/>
           </a:p>
           <a:p>
             <a:pPr marL="384048" marR="0" lvl="1" indent="-182880" algn="l" rtl="0">
@@ -14928,7 +15244,7 @@
               <a:buChar char="◦"/>
             </a:pPr>
             <a:r>
-              <a:rPr lang="en-US" sz="1350" b="0" i="0" u="none" strike="noStrike" cap="none">
+              <a:rPr lang="en-US" sz="1350" b="0" i="0" u="none" strike="noStrike" cap="none" dirty="0">
                 <a:solidFill>
                   <a:srgbClr val="3F3F3F"/>
                 </a:solidFill>
@@ -14939,7 +15255,7 @@
               </a:rPr>
               <a:t>Custodian steward</a:t>
             </a:r>
-            <a:endParaRPr/>
+            <a:endParaRPr dirty="0"/>
           </a:p>
           <a:p>
             <a:pPr marL="384048" marR="0" lvl="1" indent="-182880" algn="l" rtl="0">
@@ -14960,7 +15276,7 @@
               <a:buChar char="◦"/>
             </a:pPr>
             <a:r>
-              <a:rPr lang="en-US" sz="1350" b="0" i="0" u="none" strike="noStrike" cap="none">
+              <a:rPr lang="en-US" sz="1350" b="0" i="0" u="none" strike="noStrike" cap="none" dirty="0">
                 <a:solidFill>
                   <a:srgbClr val="3F3F3F"/>
                 </a:solidFill>
@@ -14971,7 +15287,7 @@
               </a:rPr>
               <a:t>Owner</a:t>
             </a:r>
-            <a:endParaRPr sz="1350" b="0" i="0" u="none" strike="noStrike" cap="none">
+            <a:endParaRPr sz="1350" b="0" i="0" u="none" strike="noStrike" cap="none" dirty="0">
               <a:solidFill>
                 <a:srgbClr val="3F3F3F"/>
               </a:solidFill>
@@ -15000,7 +15316,7 @@
               <a:buChar char="◦"/>
             </a:pPr>
             <a:r>
-              <a:rPr lang="en-US" sz="1350" b="0" i="0" u="none" strike="noStrike" cap="none">
+              <a:rPr lang="en-US" sz="1350" b="0" i="0" u="none" strike="noStrike" cap="none" dirty="0">
                 <a:solidFill>
                   <a:srgbClr val="3F3F3F"/>
                 </a:solidFill>
@@ -15011,7 +15327,7 @@
               </a:rPr>
               <a:t>Point of contact</a:t>
             </a:r>
-            <a:endParaRPr/>
+            <a:endParaRPr dirty="0"/>
           </a:p>
           <a:p>
             <a:pPr marL="384048" marR="0" lvl="1" indent="-182880" algn="l" rtl="0">
@@ -15032,7 +15348,7 @@
               <a:buChar char="◦"/>
             </a:pPr>
             <a:r>
-              <a:rPr lang="en-US" sz="1350" b="0" i="0" u="none" strike="noStrike" cap="none">
+              <a:rPr lang="en-US" sz="1350" b="0" i="0" u="none" strike="noStrike" cap="none" dirty="0">
                 <a:solidFill>
                   <a:srgbClr val="3F3F3F"/>
                 </a:solidFill>
@@ -15043,7 +15359,7 @@
               </a:rPr>
               <a:t>..</a:t>
             </a:r>
-            <a:endParaRPr/>
+            <a:endParaRPr dirty="0"/>
           </a:p>
           <a:p>
             <a:pPr marL="384048" marR="0" lvl="1" indent="-97154" algn="l" rtl="0">
@@ -15063,7 +15379,7 @@
               <a:buFont typeface="Calibri"/>
               <a:buNone/>
             </a:pPr>
-            <a:endParaRPr sz="1350" b="0" i="0" u="none" strike="noStrike" cap="none">
+            <a:endParaRPr sz="1350" b="0" i="0" u="none" strike="noStrike" cap="none" dirty="0">
               <a:solidFill>
                 <a:srgbClr val="3F3F3F"/>
               </a:solidFill>
@@ -15091,7 +15407,7 @@
               <a:buFont typeface="Calibri"/>
               <a:buNone/>
             </a:pPr>
-            <a:endParaRPr sz="1350" b="0" i="0" u="none" strike="noStrike" cap="none">
+            <a:endParaRPr sz="1350" b="0" i="0" u="none" strike="noStrike" cap="none" dirty="0">
               <a:solidFill>
                 <a:srgbClr val="3F3F3F"/>
               </a:solidFill>
@@ -15119,7 +15435,7 @@
               <a:buFont typeface="Calibri"/>
               <a:buNone/>
             </a:pPr>
-            <a:endParaRPr sz="1350" b="0" i="0" u="none" strike="noStrike" cap="none">
+            <a:endParaRPr sz="1350" b="0" i="0" u="none" strike="noStrike" cap="none" dirty="0">
               <a:solidFill>
                 <a:srgbClr val="3F3F3F"/>
               </a:solidFill>
@@ -15131,11 +15447,153 @@
           </a:p>
         </p:txBody>
       </p:sp>
+      <p:pic>
+        <p:nvPicPr>
+          <p:cNvPr id="3" name="Picture 2">
+            <a:extLst>
+              <a:ext uri="{FF2B5EF4-FFF2-40B4-BE49-F238E27FC236}">
+                <a16:creationId xmlns:a16="http://schemas.microsoft.com/office/drawing/2014/main" id="{9806824B-5145-4F38-BABB-2A09EA63FE18}"/>
+              </a:ext>
+            </a:extLst>
+          </p:cNvPr>
+          <p:cNvPicPr>
+            <a:picLocks noChangeAspect="1"/>
+          </p:cNvPicPr>
+          <p:nvPr/>
+        </p:nvPicPr>
+        <p:blipFill>
+          <a:blip r:embed="rId4"/>
+          <a:stretch>
+            <a:fillRect/>
+          </a:stretch>
+        </p:blipFill>
+        <p:spPr>
+          <a:xfrm>
+            <a:off x="5201393" y="1521588"/>
+            <a:ext cx="6118698" cy="4118758"/>
+          </a:xfrm>
+          <a:prstGeom prst="rect">
+            <a:avLst/>
+          </a:prstGeom>
+          <a:solidFill>
+            <a:srgbClr val="FFFFFF">
+              <a:shade val="85000"/>
+            </a:srgbClr>
+          </a:solidFill>
+          <a:ln w="190500" cap="rnd">
+            <a:solidFill>
+              <a:srgbClr val="FFFFFF"/>
+            </a:solidFill>
+          </a:ln>
+          <a:effectLst>
+            <a:outerShdw blurRad="50000" algn="tl" rotWithShape="0">
+              <a:srgbClr val="000000">
+                <a:alpha val="41000"/>
+              </a:srgbClr>
+            </a:outerShdw>
+          </a:effectLst>
+          <a:scene3d>
+            <a:camera prst="orthographicFront"/>
+            <a:lightRig rig="twoPt" dir="t">
+              <a:rot lat="0" lon="0" rev="7800000"/>
+            </a:lightRig>
+          </a:scene3d>
+          <a:sp3d contourW="6350">
+            <a:bevelT w="50800" h="16510"/>
+            <a:contourClr>
+              <a:srgbClr val="C0C0C0"/>
+            </a:contourClr>
+          </a:sp3d>
+        </p:spPr>
+      </p:pic>
     </p:spTree>
   </p:cSld>
   <p:clrMapOvr>
     <a:masterClrMapping/>
   </p:clrMapOvr>
+  <p:timing>
+    <p:tnLst>
+      <p:par>
+        <p:cTn id="1" dur="indefinite" restart="never" nodeType="tmRoot">
+          <p:childTnLst>
+            <p:seq concurrent="1" nextAc="seek">
+              <p:cTn id="2" dur="indefinite" nodeType="mainSeq">
+                <p:childTnLst>
+                  <p:par>
+                    <p:cTn id="3" fill="hold">
+                      <p:stCondLst>
+                        <p:cond delay="indefinite"/>
+                      </p:stCondLst>
+                      <p:childTnLst>
+                        <p:par>
+                          <p:cTn id="4" fill="hold">
+                            <p:stCondLst>
+                              <p:cond delay="0"/>
+                            </p:stCondLst>
+                            <p:childTnLst>
+                              <p:par>
+                                <p:cTn id="5" presetID="10" presetClass="entr" presetSubtype="0" fill="hold" nodeType="clickEffect">
+                                  <p:stCondLst>
+                                    <p:cond delay="0"/>
+                                  </p:stCondLst>
+                                  <p:childTnLst>
+                                    <p:set>
+                                      <p:cBhvr>
+                                        <p:cTn id="6" dur="1" fill="hold">
+                                          <p:stCondLst>
+                                            <p:cond delay="0"/>
+                                          </p:stCondLst>
+                                        </p:cTn>
+                                        <p:tgtEl>
+                                          <p:spTgt spid="3"/>
+                                        </p:tgtEl>
+                                        <p:attrNameLst>
+                                          <p:attrName>style.visibility</p:attrName>
+                                        </p:attrNameLst>
+                                      </p:cBhvr>
+                                      <p:to>
+                                        <p:strVal val="visible"/>
+                                      </p:to>
+                                    </p:set>
+                                    <p:animEffect transition="in" filter="fade">
+                                      <p:cBhvr>
+                                        <p:cTn id="7" dur="500"/>
+                                        <p:tgtEl>
+                                          <p:spTgt spid="3"/>
+                                        </p:tgtEl>
+                                      </p:cBhvr>
+                                    </p:animEffect>
+                                  </p:childTnLst>
+                                </p:cTn>
+                              </p:par>
+                            </p:childTnLst>
+                          </p:cTn>
+                        </p:par>
+                      </p:childTnLst>
+                    </p:cTn>
+                  </p:par>
+                </p:childTnLst>
+              </p:cTn>
+              <p:prevCondLst>
+                <p:cond evt="onPrev" delay="0">
+                  <p:tgtEl>
+                    <p:sldTgt/>
+                  </p:tgtEl>
+                </p:cond>
+              </p:prevCondLst>
+              <p:nextCondLst>
+                <p:cond evt="onNext" delay="0">
+                  <p:tgtEl>
+                    <p:sldTgt/>
+                  </p:tgtEl>
+                </p:cond>
+              </p:nextCondLst>
+            </p:seq>
+          </p:childTnLst>
+        </p:cTn>
+      </p:par>
+    </p:tnLst>
+  </p:timing>
 </p:sld>
 </file>
 
@@ -15156,6 +15614,37 @@
           <a:chExt cx="0" cy="0"/>
         </a:xfrm>
       </p:grpSpPr>
+      <p:pic>
+        <p:nvPicPr>
+          <p:cNvPr id="5" name="Picture 3">
+            <a:extLst>
+              <a:ext uri="{FF2B5EF4-FFF2-40B4-BE49-F238E27FC236}">
+                <a16:creationId xmlns:a16="http://schemas.microsoft.com/office/drawing/2014/main" id="{968C6ECA-FFC7-49B1-A04D-2C813935D1D8}"/>
+              </a:ext>
+            </a:extLst>
+          </p:cNvPr>
+          <p:cNvPicPr>
+            <a:picLocks noChangeAspect="1"/>
+          </p:cNvPicPr>
+          <p:nvPr/>
+        </p:nvPicPr>
+        <p:blipFill rotWithShape="1">
+          <a:blip r:embed="rId3">
+            <a:alphaModFix amt="50000"/>
+          </a:blip>
+          <a:srcRect l="14726" t="14029" r="14726" b="20703"/>
+          <a:stretch/>
+        </p:blipFill>
+        <p:spPr>
+          <a:xfrm>
+            <a:off x="0" y="0"/>
+            <a:ext cx="12192000" cy="6345382"/>
+          </a:xfrm>
+          <a:prstGeom prst="rect">
+            <a:avLst/>
+          </a:prstGeom>
+        </p:spPr>
+      </p:pic>
       <p:sp>
         <p:nvSpPr>
           <p:cNvPr id="405" name="Google Shape;405;p38"/>
@@ -15203,10 +15692,10 @@
               <a:buNone/>
             </a:pPr>
             <a:r>
-              <a:rPr lang="en-US"/>
+              <a:rPr lang="en-US" dirty="0"/>
               <a:t>Metadata standards</a:t>
             </a:r>
-            <a:endParaRPr/>
+            <a:endParaRPr dirty="0"/>
           </a:p>
         </p:txBody>
       </p:sp>
@@ -15218,8 +15707,8 @@
         </p:nvSpPr>
         <p:spPr>
           <a:xfrm>
-            <a:off x="1177289" y="2237423"/>
-            <a:ext cx="9978300" cy="3214500"/>
+            <a:off x="1117600" y="2735568"/>
+            <a:ext cx="5839090" cy="3130557"/>
           </a:xfrm>
           <a:prstGeom prst="rect">
             <a:avLst/>
@@ -15253,7 +15742,7 @@
               <a:buNone/>
             </a:pPr>
             <a:r>
-              <a:rPr lang="en-US" sz="1500" b="1">
+              <a:rPr lang="en-US" sz="1500" b="1" dirty="0">
                 <a:solidFill>
                   <a:srgbClr val="3F3F3F"/>
                 </a:solidFill>
@@ -15264,7 +15753,7 @@
               </a:rPr>
               <a:t>Citation</a:t>
             </a:r>
-            <a:endParaRPr sz="1500" b="1">
+            <a:endParaRPr sz="1500" b="1" dirty="0">
               <a:solidFill>
                 <a:srgbClr val="3F3F3F"/>
               </a:solidFill>
@@ -15293,7 +15782,7 @@
               <a:buChar char=" "/>
             </a:pPr>
             <a:r>
-              <a:rPr lang="en-US" sz="1500">
+              <a:rPr lang="en-US" sz="1500" dirty="0">
                 <a:solidFill>
                   <a:srgbClr val="3F3F3F"/>
                 </a:solidFill>
@@ -15304,7 +15793,7 @@
               </a:rPr>
               <a:t>Comparable to a publication reference</a:t>
             </a:r>
-            <a:endParaRPr sz="1500">
+            <a:endParaRPr sz="1500" dirty="0">
               <a:solidFill>
                 <a:srgbClr val="3F3F3F"/>
               </a:solidFill>
@@ -15333,7 +15822,7 @@
               <a:buChar char=" "/>
             </a:pPr>
             <a:r>
-              <a:rPr lang="en-US" sz="1500">
+              <a:rPr lang="en-US" sz="1500" dirty="0">
                 <a:solidFill>
                   <a:srgbClr val="3F3F3F"/>
                 </a:solidFill>
@@ -15344,7 +15833,7 @@
               </a:rPr>
               <a:t>Should contain:</a:t>
             </a:r>
-            <a:endParaRPr/>
+            <a:endParaRPr dirty="0"/>
           </a:p>
           <a:p>
             <a:pPr marL="384048" marR="0" lvl="1" indent="-182880" algn="l" rtl="0">
@@ -15365,7 +15854,7 @@
               <a:buChar char="◦"/>
             </a:pPr>
             <a:r>
-              <a:rPr lang="en-US" sz="1350" b="0" i="0" u="none" strike="noStrike" cap="none">
+              <a:rPr lang="en-US" sz="1350" b="0" i="0" u="none" strike="noStrike" cap="none" dirty="0">
                 <a:solidFill>
                   <a:srgbClr val="3F3F3F"/>
                 </a:solidFill>
@@ -15376,7 +15865,7 @@
               </a:rPr>
               <a:t>Authors (e.g. data collectors, responsible researchers, data managers, …)</a:t>
             </a:r>
-            <a:endParaRPr/>
+            <a:endParaRPr dirty="0"/>
           </a:p>
           <a:p>
             <a:pPr marL="384048" marR="0" lvl="1" indent="-182880" algn="l" rtl="0">
@@ -15397,7 +15886,7 @@
               <a:buChar char="◦"/>
             </a:pPr>
             <a:r>
-              <a:rPr lang="en-US" sz="1350" b="0" i="0" u="none" strike="noStrike" cap="none">
+              <a:rPr lang="en-US" sz="1350" b="0" i="0" u="none" strike="noStrike" cap="none" dirty="0">
                 <a:solidFill>
                   <a:srgbClr val="3F3F3F"/>
                 </a:solidFill>
@@ -15408,7 +15897,7 @@
               </a:rPr>
               <a:t>Publication year</a:t>
             </a:r>
-            <a:endParaRPr sz="1350" b="0" i="0" u="none" strike="noStrike" cap="none">
+            <a:endParaRPr sz="1350" b="0" i="0" u="none" strike="noStrike" cap="none" dirty="0">
               <a:solidFill>
                 <a:srgbClr val="3F3F3F"/>
               </a:solidFill>
@@ -15437,7 +15926,7 @@
               <a:buChar char="◦"/>
             </a:pPr>
             <a:r>
-              <a:rPr lang="en-US" sz="1350" b="0" i="0" u="none" strike="noStrike" cap="none">
+              <a:rPr lang="en-US" sz="1350" b="0" i="0" u="none" strike="noStrike" cap="none" dirty="0">
                 <a:solidFill>
                   <a:srgbClr val="3F3F3F"/>
                 </a:solidFill>
@@ -15448,7 +15937,7 @@
               </a:rPr>
               <a:t>Dataset title</a:t>
             </a:r>
-            <a:endParaRPr sz="1350" b="0" i="0" u="none" strike="noStrike" cap="none">
+            <a:endParaRPr sz="1350" b="0" i="0" u="none" strike="noStrike" cap="none" dirty="0">
               <a:solidFill>
                 <a:srgbClr val="3F3F3F"/>
               </a:solidFill>
@@ -15477,7 +15966,7 @@
               <a:buChar char="◦"/>
             </a:pPr>
             <a:r>
-              <a:rPr lang="en-US" sz="1350" b="0" i="0" u="none" strike="noStrike" cap="none">
+              <a:rPr lang="en-US" sz="1350" b="0" i="0" u="none" strike="noStrike" cap="none" dirty="0">
                 <a:solidFill>
                   <a:srgbClr val="3F3F3F"/>
                 </a:solidFill>
@@ -15488,7 +15977,7 @@
               </a:rPr>
               <a:t>Name of the organizations involved when different from publisher</a:t>
             </a:r>
-            <a:endParaRPr sz="1350" b="0" i="0" u="none" strike="noStrike" cap="none">
+            <a:endParaRPr sz="1350" b="0" i="0" u="none" strike="noStrike" cap="none" dirty="0">
               <a:solidFill>
                 <a:srgbClr val="3F3F3F"/>
               </a:solidFill>
@@ -15517,7 +16006,7 @@
               <a:buChar char="◦"/>
             </a:pPr>
             <a:r>
-              <a:rPr lang="en-US" sz="1350" b="0" i="0" u="none" strike="noStrike" cap="none">
+              <a:rPr lang="en-US" sz="1350" b="0" i="0" u="none" strike="noStrike" cap="none" dirty="0">
                 <a:solidFill>
                   <a:srgbClr val="3F3F3F"/>
                 </a:solidFill>
@@ -15528,7 +16017,7 @@
               </a:rPr>
               <a:t>Publisher (can be the OBIS node)</a:t>
             </a:r>
-            <a:endParaRPr/>
+            <a:endParaRPr dirty="0"/>
           </a:p>
           <a:p>
             <a:pPr marL="384048" marR="0" lvl="1" indent="-182880" algn="l" rtl="0">
@@ -15549,7 +16038,7 @@
               <a:buChar char="◦"/>
             </a:pPr>
             <a:r>
-              <a:rPr lang="en-US" sz="1350" b="0" i="0" u="none" strike="noStrike" cap="none">
+              <a:rPr lang="en-US" sz="1350" b="0" i="0" u="none" strike="noStrike" cap="none" dirty="0">
                 <a:solidFill>
                   <a:srgbClr val="3F3F3F"/>
                 </a:solidFill>
@@ -15560,7 +16049,7 @@
               </a:rPr>
               <a:t>Dataset type (e.g. occurrence, sampling event)</a:t>
             </a:r>
-            <a:endParaRPr/>
+            <a:endParaRPr dirty="0"/>
           </a:p>
           <a:p>
             <a:pPr marL="384048" marR="0" lvl="1" indent="-182880" algn="l" rtl="0">
@@ -15581,7 +16070,7 @@
               <a:buChar char="◦"/>
             </a:pPr>
             <a:r>
-              <a:rPr lang="en-US" sz="1350" b="0" i="0" u="none" strike="noStrike" cap="none">
+              <a:rPr lang="en-US" sz="1350" b="0" i="0" u="none" strike="noStrike" cap="none" dirty="0">
                 <a:solidFill>
                   <a:srgbClr val="3F3F3F"/>
                 </a:solidFill>
@@ -15592,7 +16081,7 @@
               </a:rPr>
               <a:t>Version number</a:t>
             </a:r>
-            <a:endParaRPr sz="1350" b="0" i="0" u="none" strike="noStrike" cap="none">
+            <a:endParaRPr sz="1350" b="0" i="0" u="none" strike="noStrike" cap="none" dirty="0">
               <a:solidFill>
                 <a:srgbClr val="3F3F3F"/>
               </a:solidFill>
@@ -15621,7 +16110,7 @@
               <a:buChar char="◦"/>
             </a:pPr>
             <a:r>
-              <a:rPr lang="en-US" sz="1350" b="0" i="0" u="none" strike="noStrike" cap="none">
+              <a:rPr lang="en-US" sz="1350" b="0" i="0" u="none" strike="noStrike" cap="none" dirty="0">
                 <a:solidFill>
                   <a:srgbClr val="3F3F3F"/>
                 </a:solidFill>
@@ -15630,9 +16119,21 @@
                 <a:cs typeface="Calibri"/>
                 <a:sym typeface="Calibri"/>
               </a:rPr>
-              <a:t>IPT dataset url</a:t>
+              <a:t>IPT dataset </a:t>
             </a:r>
-            <a:endParaRPr sz="1350" b="0" i="0" u="none" strike="noStrike" cap="none">
+            <a:r>
+              <a:rPr lang="en-US" sz="1350" b="0" i="0" u="none" strike="noStrike" cap="none" dirty="0" err="1">
+                <a:solidFill>
+                  <a:srgbClr val="3F3F3F"/>
+                </a:solidFill>
+                <a:latin typeface="Calibri"/>
+                <a:ea typeface="Calibri"/>
+                <a:cs typeface="Calibri"/>
+                <a:sym typeface="Calibri"/>
+              </a:rPr>
+              <a:t>url</a:t>
+            </a:r>
+            <a:endParaRPr sz="1350" b="0" i="0" u="none" strike="noStrike" cap="none" dirty="0">
               <a:solidFill>
                 <a:srgbClr val="3F3F3F"/>
               </a:solidFill>
@@ -15660,7 +16161,7 @@
               <a:buFont typeface="Calibri"/>
               <a:buNone/>
             </a:pPr>
-            <a:endParaRPr sz="1350" b="0" i="0" u="none" strike="noStrike" cap="none">
+            <a:endParaRPr sz="1350" b="0" i="0" u="none" strike="noStrike" cap="none" dirty="0">
               <a:solidFill>
                 <a:srgbClr val="3F3F3F"/>
               </a:solidFill>
@@ -15676,7 +16177,7 @@
                 <a:spcPct val="90000"/>
               </a:lnSpc>
               <a:spcBef>
-                <a:spcPts val="600"/>
+                <a:spcPts val="400"/>
               </a:spcBef>
               <a:spcAft>
                 <a:spcPts val="0"/>
@@ -15688,7 +16189,7 @@
               <a:buFont typeface="Calibri"/>
               <a:buNone/>
             </a:pPr>
-            <a:endParaRPr sz="1350" b="0" i="0" u="none" strike="noStrike" cap="none">
+            <a:endParaRPr sz="1350" b="0" i="0" u="none" strike="noStrike" cap="none" dirty="0">
               <a:solidFill>
                 <a:srgbClr val="3F3F3F"/>
               </a:solidFill>
@@ -15698,92 +16199,483 @@
               <a:sym typeface="Calibri"/>
             </a:endParaRPr>
           </a:p>
-          <a:p>
-            <a:pPr marL="384048" marR="0" lvl="1" indent="-97154" algn="l" rtl="0">
-              <a:lnSpc>
-                <a:spcPct val="90000"/>
-              </a:lnSpc>
-              <a:spcBef>
-                <a:spcPts val="600"/>
-              </a:spcBef>
-              <a:spcAft>
-                <a:spcPts val="0"/>
-              </a:spcAft>
-              <a:buClr>
-                <a:schemeClr val="accent1"/>
-              </a:buClr>
-              <a:buSzPts val="1350"/>
-              <a:buFont typeface="Calibri"/>
-              <a:buNone/>
-            </a:pPr>
-            <a:endParaRPr sz="1350" b="0" i="0" u="none" strike="noStrike" cap="none">
+        </p:txBody>
+      </p:sp>
+      <p:sp>
+        <p:nvSpPr>
+          <p:cNvPr id="2" name="TextBox 1">
+            <a:extLst>
+              <a:ext uri="{FF2B5EF4-FFF2-40B4-BE49-F238E27FC236}">
+                <a16:creationId xmlns:a16="http://schemas.microsoft.com/office/drawing/2014/main" id="{81FE9BFC-7FE8-49AD-9219-DD1DB9267228}"/>
+              </a:ext>
+            </a:extLst>
+          </p:cNvPr>
+          <p:cNvSpPr txBox="1"/>
+          <p:nvPr/>
+        </p:nvSpPr>
+        <p:spPr>
+          <a:xfrm>
+            <a:off x="4772369" y="1502077"/>
+            <a:ext cx="6816436" cy="584775"/>
+          </a:xfrm>
+          <a:prstGeom prst="rect">
+            <a:avLst/>
+          </a:prstGeom>
+          <a:noFill/>
+        </p:spPr>
+        <p:txBody>
+          <a:bodyPr wrap="square" rtlCol="0">
+            <a:spAutoFit/>
+          </a:bodyPr>
+          <a:lstStyle/>
+          <a:p>
+            <a:r>
+              <a:rPr lang="en-CA" sz="1600" b="0" i="0" dirty="0">
+                <a:solidFill>
+                  <a:srgbClr val="C00000"/>
+                </a:solidFill>
+                <a:effectLst/>
+                <a:latin typeface="Calibri" panose="020F0502020204030204" pitchFamily="34" charset="0"/>
+                <a:cs typeface="Calibri" panose="020F0502020204030204" pitchFamily="34" charset="0"/>
+              </a:rPr>
+              <a:t>{</a:t>
+            </a:r>
+            <a:r>
+              <a:rPr lang="en-CA" sz="1600" b="0" i="0" dirty="0" err="1">
+                <a:solidFill>
+                  <a:srgbClr val="C00000"/>
+                </a:solidFill>
+                <a:effectLst/>
+                <a:latin typeface="Calibri" panose="020F0502020204030204" pitchFamily="34" charset="0"/>
+                <a:cs typeface="Calibri" panose="020F0502020204030204" pitchFamily="34" charset="0"/>
+              </a:rPr>
+              <a:t>dataset.authors</a:t>
+            </a:r>
+            <a:r>
+              <a:rPr lang="en-CA" sz="1600" b="0" i="0" dirty="0">
+                <a:solidFill>
+                  <a:srgbClr val="C00000"/>
+                </a:solidFill>
+                <a:effectLst/>
+                <a:latin typeface="Calibri" panose="020F0502020204030204" pitchFamily="34" charset="0"/>
+                <a:cs typeface="Calibri" panose="020F0502020204030204" pitchFamily="34" charset="0"/>
+              </a:rPr>
+              <a:t>} </a:t>
+            </a:r>
+            <a:r>
+              <a:rPr lang="en-CA" sz="1600" b="0" i="0" dirty="0">
+                <a:solidFill>
+                  <a:schemeClr val="accent2">
+                    <a:lumMod val="75000"/>
+                  </a:schemeClr>
+                </a:solidFill>
+                <a:effectLst/>
+                <a:latin typeface="Calibri" panose="020F0502020204030204" pitchFamily="34" charset="0"/>
+                <a:cs typeface="Calibri" panose="020F0502020204030204" pitchFamily="34" charset="0"/>
+              </a:rPr>
+              <a:t>({</a:t>
+            </a:r>
+            <a:r>
+              <a:rPr lang="en-CA" sz="1600" b="0" i="0" dirty="0" err="1">
+                <a:solidFill>
+                  <a:schemeClr val="accent2">
+                    <a:lumMod val="75000"/>
+                  </a:schemeClr>
+                </a:solidFill>
+                <a:effectLst/>
+                <a:latin typeface="Calibri" panose="020F0502020204030204" pitchFamily="34" charset="0"/>
+                <a:cs typeface="Calibri" panose="020F0502020204030204" pitchFamily="34" charset="0"/>
+              </a:rPr>
+              <a:t>dataset.pubDate</a:t>
+            </a:r>
+            <a:r>
+              <a:rPr lang="en-CA" sz="1600" b="0" i="0" dirty="0">
+                <a:solidFill>
+                  <a:schemeClr val="accent2">
+                    <a:lumMod val="75000"/>
+                  </a:schemeClr>
+                </a:solidFill>
+                <a:effectLst/>
+                <a:latin typeface="Calibri" panose="020F0502020204030204" pitchFamily="34" charset="0"/>
+                <a:cs typeface="Calibri" panose="020F0502020204030204" pitchFamily="34" charset="0"/>
+              </a:rPr>
+              <a:t>}) </a:t>
+            </a:r>
+            <a:r>
+              <a:rPr lang="en-CA" sz="1600" b="0" i="0" dirty="0">
+                <a:solidFill>
+                  <a:srgbClr val="00B050"/>
+                </a:solidFill>
+                <a:effectLst/>
+                <a:latin typeface="Calibri" panose="020F0502020204030204" pitchFamily="34" charset="0"/>
+                <a:cs typeface="Calibri" panose="020F0502020204030204" pitchFamily="34" charset="0"/>
+              </a:rPr>
+              <a:t>{</a:t>
+            </a:r>
+            <a:r>
+              <a:rPr lang="en-CA" sz="1600" b="0" i="0" dirty="0" err="1">
+                <a:solidFill>
+                  <a:srgbClr val="00B050"/>
+                </a:solidFill>
+                <a:effectLst/>
+                <a:latin typeface="Calibri" panose="020F0502020204030204" pitchFamily="34" charset="0"/>
+                <a:cs typeface="Calibri" panose="020F0502020204030204" pitchFamily="34" charset="0"/>
+              </a:rPr>
+              <a:t>dataset.title</a:t>
+            </a:r>
+            <a:r>
+              <a:rPr lang="en-CA" sz="1600" b="0" i="0" dirty="0">
+                <a:solidFill>
+                  <a:srgbClr val="00B050"/>
+                </a:solidFill>
+                <a:effectLst/>
+                <a:latin typeface="Calibri" panose="020F0502020204030204" pitchFamily="34" charset="0"/>
+                <a:cs typeface="Calibri" panose="020F0502020204030204" pitchFamily="34" charset="0"/>
+              </a:rPr>
+              <a:t>}. </a:t>
+            </a:r>
+            <a:r>
+              <a:rPr lang="en-CA" sz="1600" b="0" i="0" dirty="0">
+                <a:solidFill>
+                  <a:srgbClr val="7030A0"/>
+                </a:solidFill>
+                <a:effectLst/>
+                <a:latin typeface="Calibri" panose="020F0502020204030204" pitchFamily="34" charset="0"/>
+                <a:cs typeface="Calibri" panose="020F0502020204030204" pitchFamily="34" charset="0"/>
+              </a:rPr>
+              <a:t>[Version {</a:t>
+            </a:r>
+            <a:r>
+              <a:rPr lang="en-CA" sz="1600" b="0" i="0" dirty="0" err="1">
+                <a:solidFill>
+                  <a:srgbClr val="7030A0"/>
+                </a:solidFill>
+                <a:effectLst/>
+                <a:latin typeface="Calibri" panose="020F0502020204030204" pitchFamily="34" charset="0"/>
+                <a:cs typeface="Calibri" panose="020F0502020204030204" pitchFamily="34" charset="0"/>
+              </a:rPr>
+              <a:t>dataset.version</a:t>
+            </a:r>
+            <a:r>
+              <a:rPr lang="en-CA" sz="1600" b="0" i="0" dirty="0">
+                <a:solidFill>
+                  <a:srgbClr val="7030A0"/>
+                </a:solidFill>
+                <a:effectLst/>
+                <a:latin typeface="Calibri" panose="020F0502020204030204" pitchFamily="34" charset="0"/>
+                <a:cs typeface="Calibri" panose="020F0502020204030204" pitchFamily="34" charset="0"/>
+              </a:rPr>
+              <a:t>}]</a:t>
+            </a:r>
+            <a:r>
+              <a:rPr lang="en-CA" sz="1600" b="0" i="0" dirty="0">
+                <a:solidFill>
+                  <a:srgbClr val="212529"/>
+                </a:solidFill>
+                <a:effectLst/>
+                <a:latin typeface="Calibri" panose="020F0502020204030204" pitchFamily="34" charset="0"/>
+                <a:cs typeface="Calibri" panose="020F0502020204030204" pitchFamily="34" charset="0"/>
+              </a:rPr>
+              <a:t>. </a:t>
+            </a:r>
+            <a:r>
+              <a:rPr lang="en-CA" sz="1600" b="0" i="0" dirty="0">
+                <a:solidFill>
+                  <a:srgbClr val="00B0F0"/>
+                </a:solidFill>
+                <a:effectLst/>
+                <a:latin typeface="Calibri" panose="020F0502020204030204" pitchFamily="34" charset="0"/>
+                <a:cs typeface="Calibri" panose="020F0502020204030204" pitchFamily="34" charset="0"/>
+              </a:rPr>
+              <a:t>{</a:t>
+            </a:r>
+            <a:r>
+              <a:rPr lang="en-CA" sz="1600" b="0" i="0" dirty="0" err="1">
+                <a:solidFill>
+                  <a:srgbClr val="00B0F0"/>
+                </a:solidFill>
+                <a:effectLst/>
+                <a:latin typeface="Calibri" panose="020F0502020204030204" pitchFamily="34" charset="0"/>
+                <a:cs typeface="Calibri" panose="020F0502020204030204" pitchFamily="34" charset="0"/>
+              </a:rPr>
+              <a:t>organization.title</a:t>
+            </a:r>
+            <a:r>
+              <a:rPr lang="en-CA" sz="1600" b="0" i="0" dirty="0">
+                <a:solidFill>
+                  <a:srgbClr val="00B0F0"/>
+                </a:solidFill>
+                <a:effectLst/>
+                <a:latin typeface="Calibri" panose="020F0502020204030204" pitchFamily="34" charset="0"/>
+                <a:cs typeface="Calibri" panose="020F0502020204030204" pitchFamily="34" charset="0"/>
+              </a:rPr>
+              <a:t>}</a:t>
+            </a:r>
+            <a:r>
+              <a:rPr lang="en-CA" sz="1600" b="0" i="0" dirty="0">
+                <a:solidFill>
+                  <a:srgbClr val="212529"/>
+                </a:solidFill>
+                <a:effectLst/>
+                <a:latin typeface="Calibri" panose="020F0502020204030204" pitchFamily="34" charset="0"/>
+                <a:cs typeface="Calibri" panose="020F0502020204030204" pitchFamily="34" charset="0"/>
+              </a:rPr>
+              <a:t>. </a:t>
+            </a:r>
+            <a:r>
+              <a:rPr lang="en-CA" sz="1600" b="0" i="0" dirty="0">
+                <a:solidFill>
+                  <a:schemeClr val="accent4">
+                    <a:lumMod val="75000"/>
+                  </a:schemeClr>
+                </a:solidFill>
+                <a:effectLst/>
+                <a:latin typeface="Calibri" panose="020F0502020204030204" pitchFamily="34" charset="0"/>
+                <a:cs typeface="Calibri" panose="020F0502020204030204" pitchFamily="34" charset="0"/>
+              </a:rPr>
+              <a:t>{</a:t>
+            </a:r>
+            <a:r>
+              <a:rPr lang="en-CA" sz="1600" b="0" i="0" dirty="0" err="1">
+                <a:solidFill>
+                  <a:schemeClr val="accent4">
+                    <a:lumMod val="75000"/>
+                  </a:schemeClr>
+                </a:solidFill>
+                <a:effectLst/>
+                <a:latin typeface="Calibri" panose="020F0502020204030204" pitchFamily="34" charset="0"/>
+                <a:cs typeface="Calibri" panose="020F0502020204030204" pitchFamily="34" charset="0"/>
+              </a:rPr>
+              <a:t>dataset.type</a:t>
+            </a:r>
+            <a:r>
+              <a:rPr lang="en-CA" sz="1600" b="0" i="0" dirty="0">
+                <a:solidFill>
+                  <a:schemeClr val="accent4">
+                    <a:lumMod val="75000"/>
+                  </a:schemeClr>
+                </a:solidFill>
+                <a:effectLst/>
+                <a:latin typeface="Calibri" panose="020F0502020204030204" pitchFamily="34" charset="0"/>
+                <a:cs typeface="Calibri" panose="020F0502020204030204" pitchFamily="34" charset="0"/>
+              </a:rPr>
+              <a:t>} Dataset </a:t>
+            </a:r>
+            <a:r>
+              <a:rPr lang="en-CA" sz="1600" b="0" i="0" dirty="0">
+                <a:solidFill>
+                  <a:srgbClr val="212529"/>
+                </a:solidFill>
+                <a:effectLst/>
+                <a:latin typeface="Calibri" panose="020F0502020204030204" pitchFamily="34" charset="0"/>
+                <a:cs typeface="Calibri" panose="020F0502020204030204" pitchFamily="34" charset="0"/>
+              </a:rPr>
+              <a:t>{</a:t>
+            </a:r>
+            <a:r>
+              <a:rPr lang="en-CA" sz="1600" b="0" i="0" dirty="0" err="1">
+                <a:solidFill>
+                  <a:srgbClr val="212529"/>
+                </a:solidFill>
+                <a:effectLst/>
+                <a:latin typeface="Calibri" panose="020F0502020204030204" pitchFamily="34" charset="0"/>
+                <a:cs typeface="Calibri" panose="020F0502020204030204" pitchFamily="34" charset="0"/>
+              </a:rPr>
+              <a:t>dataset.doi</a:t>
+            </a:r>
+            <a:r>
+              <a:rPr lang="en-CA" sz="1600" b="0" i="0" dirty="0">
+                <a:solidFill>
+                  <a:srgbClr val="212529"/>
+                </a:solidFill>
+                <a:effectLst/>
+                <a:latin typeface="Calibri" panose="020F0502020204030204" pitchFamily="34" charset="0"/>
+                <a:cs typeface="Calibri" panose="020F0502020204030204" pitchFamily="34" charset="0"/>
+              </a:rPr>
+              <a:t>}, </a:t>
+            </a:r>
+            <a:r>
+              <a:rPr lang="en-CA" sz="1600" b="0" i="0" dirty="0">
+                <a:solidFill>
+                  <a:schemeClr val="accent5">
+                    <a:lumMod val="75000"/>
+                  </a:schemeClr>
+                </a:solidFill>
+                <a:effectLst/>
+                <a:latin typeface="Calibri" panose="020F0502020204030204" pitchFamily="34" charset="0"/>
+                <a:cs typeface="Calibri" panose="020F0502020204030204" pitchFamily="34" charset="0"/>
+              </a:rPr>
+              <a:t>{dataset.url}</a:t>
+            </a:r>
+            <a:endParaRPr lang="en-CA" sz="1600" dirty="0">
               <a:solidFill>
-                <a:srgbClr val="3F3F3F"/>
+                <a:schemeClr val="accent5">
+                  <a:lumMod val="75000"/>
+                </a:schemeClr>
               </a:solidFill>
-              <a:latin typeface="Calibri"/>
-              <a:ea typeface="Calibri"/>
-              <a:cs typeface="Calibri"/>
-              <a:sym typeface="Calibri"/>
+              <a:latin typeface="Calibri" panose="020F0502020204030204" pitchFamily="34" charset="0"/>
+              <a:cs typeface="Calibri" panose="020F0502020204030204" pitchFamily="34" charset="0"/>
             </a:endParaRPr>
           </a:p>
-          <a:p>
-            <a:pPr marL="91440" marR="0" lvl="0" indent="-95250" algn="l" rtl="0">
-              <a:lnSpc>
-                <a:spcPct val="90000"/>
-              </a:lnSpc>
-              <a:spcBef>
-                <a:spcPts val="1600"/>
-              </a:spcBef>
-              <a:spcAft>
-                <a:spcPts val="0"/>
-              </a:spcAft>
-              <a:buClr>
-                <a:schemeClr val="accent1"/>
-              </a:buClr>
-              <a:buSzPts val="1500"/>
-              <a:buFont typeface="Calibri"/>
-              <a:buChar char=" "/>
-            </a:pPr>
+        </p:txBody>
+      </p:sp>
+      <p:sp>
+        <p:nvSpPr>
+          <p:cNvPr id="3" name="TextBox 2">
+            <a:extLst>
+              <a:ext uri="{FF2B5EF4-FFF2-40B4-BE49-F238E27FC236}">
+                <a16:creationId xmlns:a16="http://schemas.microsoft.com/office/drawing/2014/main" id="{3412C55A-74B8-4A50-9834-F7B27CE56874}"/>
+              </a:ext>
+            </a:extLst>
+          </p:cNvPr>
+          <p:cNvSpPr txBox="1"/>
+          <p:nvPr/>
+        </p:nvSpPr>
+        <p:spPr>
+          <a:xfrm>
+            <a:off x="4855490" y="2166057"/>
+            <a:ext cx="6650038" cy="1323439"/>
+          </a:xfrm>
+          <a:prstGeom prst="rect">
+            <a:avLst/>
+          </a:prstGeom>
+          <a:noFill/>
+        </p:spPr>
+        <p:txBody>
+          <a:bodyPr wrap="square" rtlCol="0">
+            <a:spAutoFit/>
+          </a:bodyPr>
+          <a:lstStyle/>
+          <a:p>
             <a:r>
-              <a:rPr lang="en-US" sz="1500">
-                <a:solidFill>
-                  <a:srgbClr val="3F3F3F"/>
-                </a:solidFill>
-                <a:latin typeface="Calibri"/>
-                <a:ea typeface="Calibri"/>
-                <a:cs typeface="Calibri"/>
-                <a:sym typeface="Calibri"/>
+              <a:rPr lang="en-CA" sz="1600" b="0" i="1" dirty="0">
+                <a:solidFill>
+                  <a:srgbClr val="C00000"/>
+                </a:solidFill>
+                <a:effectLst/>
+                <a:latin typeface="Calibri" panose="020F0502020204030204" pitchFamily="34" charset="0"/>
+                <a:cs typeface="Calibri" panose="020F0502020204030204" pitchFamily="34" charset="0"/>
               </a:rPr>
-              <a:t>Note: IPT has an option to auto-generate the citation based on the metadata.</a:t>
+              <a:t>Platt T </a:t>
             </a:r>
-            <a:endParaRPr/>
-          </a:p>
-          <a:p>
-            <a:pPr marL="384048" marR="0" lvl="1" indent="-97154" algn="l" rtl="0">
-              <a:lnSpc>
-                <a:spcPct val="90000"/>
-              </a:lnSpc>
-              <a:spcBef>
-                <a:spcPts val="400"/>
-              </a:spcBef>
-              <a:spcAft>
-                <a:spcPts val="0"/>
-              </a:spcAft>
-              <a:buClr>
-                <a:schemeClr val="accent1"/>
-              </a:buClr>
-              <a:buSzPts val="1350"/>
-              <a:buFont typeface="Calibri"/>
-              <a:buNone/>
-            </a:pPr>
-            <a:endParaRPr sz="1350" b="0" i="0" u="none" strike="noStrike" cap="none">
-              <a:solidFill>
-                <a:srgbClr val="3F3F3F"/>
-              </a:solidFill>
-              <a:latin typeface="Calibri"/>
-              <a:ea typeface="Calibri"/>
-              <a:cs typeface="Calibri"/>
-              <a:sym typeface="Calibri"/>
+            <a:r>
+              <a:rPr lang="en-CA" sz="1600" b="0" i="1" dirty="0">
+                <a:solidFill>
+                  <a:schemeClr val="accent2">
+                    <a:lumMod val="75000"/>
+                  </a:schemeClr>
+                </a:solidFill>
+                <a:effectLst/>
+                <a:latin typeface="Calibri" panose="020F0502020204030204" pitchFamily="34" charset="0"/>
+                <a:cs typeface="Calibri" panose="020F0502020204030204" pitchFamily="34" charset="0"/>
+              </a:rPr>
+              <a:t>(2013): </a:t>
+            </a:r>
+            <a:r>
+              <a:rPr lang="en-CA" sz="1600" b="0" i="1" dirty="0">
+                <a:solidFill>
+                  <a:srgbClr val="00B050"/>
+                </a:solidFill>
+                <a:effectLst/>
+                <a:latin typeface="Calibri" panose="020F0502020204030204" pitchFamily="34" charset="0"/>
+                <a:cs typeface="Calibri" panose="020F0502020204030204" pitchFamily="34" charset="0"/>
+              </a:rPr>
+              <a:t>MEL: Marine </a:t>
+            </a:r>
+            <a:r>
+              <a:rPr lang="en-CA" sz="1600" b="0" i="1" dirty="0" err="1">
+                <a:solidFill>
+                  <a:srgbClr val="00B050"/>
+                </a:solidFill>
+                <a:effectLst/>
+                <a:latin typeface="Calibri" panose="020F0502020204030204" pitchFamily="34" charset="0"/>
+                <a:cs typeface="Calibri" panose="020F0502020204030204" pitchFamily="34" charset="0"/>
+              </a:rPr>
+              <a:t>cladocera</a:t>
+            </a:r>
+            <a:r>
+              <a:rPr lang="en-CA" sz="1600" b="0" i="1" dirty="0">
+                <a:solidFill>
+                  <a:srgbClr val="00B050"/>
+                </a:solidFill>
+                <a:effectLst/>
+                <a:latin typeface="Calibri" panose="020F0502020204030204" pitchFamily="34" charset="0"/>
+                <a:cs typeface="Calibri" panose="020F0502020204030204" pitchFamily="34" charset="0"/>
+              </a:rPr>
+              <a:t> collected from St. </a:t>
+            </a:r>
+            <a:r>
+              <a:rPr lang="en-CA" sz="1600" b="0" i="1" dirty="0" err="1">
+                <a:solidFill>
+                  <a:srgbClr val="00B050"/>
+                </a:solidFill>
+                <a:effectLst/>
+                <a:latin typeface="Calibri" panose="020F0502020204030204" pitchFamily="34" charset="0"/>
+                <a:cs typeface="Calibri" panose="020F0502020204030204" pitchFamily="34" charset="0"/>
+              </a:rPr>
+              <a:t>Margarets</a:t>
+            </a:r>
+            <a:r>
+              <a:rPr lang="en-CA" sz="1600" b="0" i="1" dirty="0">
+                <a:solidFill>
+                  <a:srgbClr val="00B050"/>
+                </a:solidFill>
+                <a:effectLst/>
+                <a:latin typeface="Calibri" panose="020F0502020204030204" pitchFamily="34" charset="0"/>
+                <a:cs typeface="Calibri" panose="020F0502020204030204" pitchFamily="34" charset="0"/>
+              </a:rPr>
+              <a:t> Bay between May to November, 1967-1969</a:t>
+            </a:r>
+            <a:r>
+              <a:rPr lang="en-CA" sz="1600" b="0" i="1" dirty="0">
+                <a:solidFill>
+                  <a:srgbClr val="7030A0"/>
+                </a:solidFill>
+                <a:effectLst/>
+                <a:latin typeface="Calibri" panose="020F0502020204030204" pitchFamily="34" charset="0"/>
+                <a:cs typeface="Calibri" panose="020F0502020204030204" pitchFamily="34" charset="0"/>
+              </a:rPr>
+              <a:t>. v1.5. </a:t>
+            </a:r>
+            <a:r>
+              <a:rPr lang="en-CA" sz="1600" b="0" i="1" dirty="0">
+                <a:solidFill>
+                  <a:srgbClr val="00B0F0"/>
+                </a:solidFill>
+                <a:effectLst/>
+                <a:latin typeface="Calibri" panose="020F0502020204030204" pitchFamily="34" charset="0"/>
+                <a:cs typeface="Calibri" panose="020F0502020204030204" pitchFamily="34" charset="0"/>
+              </a:rPr>
+              <a:t>Canadian node of the Ocean Biogeographic Information System (OBIS Canada). </a:t>
+            </a:r>
+            <a:r>
+              <a:rPr lang="en-CA" sz="1600" b="0" i="1" dirty="0">
+                <a:solidFill>
+                  <a:schemeClr val="accent4">
+                    <a:lumMod val="75000"/>
+                  </a:schemeClr>
+                </a:solidFill>
+                <a:effectLst/>
+                <a:latin typeface="Calibri" panose="020F0502020204030204" pitchFamily="34" charset="0"/>
+                <a:cs typeface="Calibri" panose="020F0502020204030204" pitchFamily="34" charset="0"/>
+              </a:rPr>
+              <a:t>Dataset/Occurrence. </a:t>
+            </a:r>
+            <a:r>
+              <a:rPr lang="en-CA" sz="1600" b="0" i="1" dirty="0">
+                <a:solidFill>
+                  <a:srgbClr val="008959"/>
+                </a:solidFill>
+                <a:effectLst/>
+                <a:latin typeface="Calibri" panose="020F0502020204030204" pitchFamily="34" charset="0"/>
+                <a:cs typeface="Calibri" panose="020F0502020204030204" pitchFamily="34" charset="0"/>
+                <a:hlinkClick r:id="rId4"/>
+              </a:rPr>
+              <a:t>http://ipt.iobis.org/obiscanada/resource?r=smb_cladocera_tr698&amp;amp;v=1.5</a:t>
+            </a:r>
+            <a:endParaRPr lang="en-CA" sz="1600" dirty="0">
+              <a:latin typeface="Calibri" panose="020F0502020204030204" pitchFamily="34" charset="0"/>
+              <a:cs typeface="Calibri" panose="020F0502020204030204" pitchFamily="34" charset="0"/>
             </a:endParaRPr>
           </a:p>
         </p:txBody>
@@ -15793,6 +16685,128 @@
   <p:clrMapOvr>
     <a:masterClrMapping/>
   </p:clrMapOvr>
+  <p:timing>
+    <p:tnLst>
+      <p:par>
+        <p:cTn id="1" dur="indefinite" restart="never" nodeType="tmRoot">
+          <p:childTnLst>
+            <p:seq concurrent="1" nextAc="seek">
+              <p:cTn id="2" dur="indefinite" nodeType="mainSeq">
+                <p:childTnLst>
+                  <p:par>
+                    <p:cTn id="3" fill="hold">
+                      <p:stCondLst>
+                        <p:cond delay="indefinite"/>
+                      </p:stCondLst>
+                      <p:childTnLst>
+                        <p:par>
+                          <p:cTn id="4" fill="hold">
+                            <p:stCondLst>
+                              <p:cond delay="0"/>
+                            </p:stCondLst>
+                            <p:childTnLst>
+                              <p:par>
+                                <p:cTn id="5" presetID="10" presetClass="entr" presetSubtype="0" fill="hold" grpId="0" nodeType="clickEffect">
+                                  <p:stCondLst>
+                                    <p:cond delay="0"/>
+                                  </p:stCondLst>
+                                  <p:childTnLst>
+                                    <p:set>
+                                      <p:cBhvr>
+                                        <p:cTn id="6" dur="1" fill="hold">
+                                          <p:stCondLst>
+                                            <p:cond delay="0"/>
+                                          </p:stCondLst>
+                                        </p:cTn>
+                                        <p:tgtEl>
+                                          <p:spTgt spid="2"/>
+                                        </p:tgtEl>
+                                        <p:attrNameLst>
+                                          <p:attrName>style.visibility</p:attrName>
+                                        </p:attrNameLst>
+                                      </p:cBhvr>
+                                      <p:to>
+                                        <p:strVal val="visible"/>
+                                      </p:to>
+                                    </p:set>
+                                    <p:animEffect transition="in" filter="fade">
+                                      <p:cBhvr>
+                                        <p:cTn id="7" dur="500"/>
+                                        <p:tgtEl>
+                                          <p:spTgt spid="2"/>
+                                        </p:tgtEl>
+                                      </p:cBhvr>
+                                    </p:animEffect>
+                                  </p:childTnLst>
+                                </p:cTn>
+                              </p:par>
+                              <p:par>
+                                <p:cTn id="8" presetID="10" presetClass="entr" presetSubtype="0" fill="hold" grpId="0" nodeType="withEffect">
+                                  <p:stCondLst>
+                                    <p:cond delay="0"/>
+                                  </p:stCondLst>
+                                  <p:childTnLst>
+                                    <p:set>
+                                      <p:cBhvr>
+                                        <p:cTn id="9" dur="1" fill="hold">
+                                          <p:stCondLst>
+                                            <p:cond delay="0"/>
+                                          </p:stCondLst>
+                                        </p:cTn>
+                                        <p:tgtEl>
+                                          <p:spTgt spid="3"/>
+                                        </p:tgtEl>
+                                        <p:attrNameLst>
+                                          <p:attrName>style.visibility</p:attrName>
+                                        </p:attrNameLst>
+                                      </p:cBhvr>
+                                      <p:to>
+                                        <p:strVal val="visible"/>
+                                      </p:to>
+                                    </p:set>
+                                    <p:animEffect transition="in" filter="fade">
+                                      <p:cBhvr>
+                                        <p:cTn id="10" dur="500"/>
+                                        <p:tgtEl>
+                                          <p:spTgt spid="3"/>
+                                        </p:tgtEl>
+                                      </p:cBhvr>
+                                    </p:animEffect>
+                                  </p:childTnLst>
+                                </p:cTn>
+                              </p:par>
+                            </p:childTnLst>
+                          </p:cTn>
+                        </p:par>
+                      </p:childTnLst>
+                    </p:cTn>
+                  </p:par>
+                </p:childTnLst>
+              </p:cTn>
+              <p:prevCondLst>
+                <p:cond evt="onPrev" delay="0">
+                  <p:tgtEl>
+                    <p:sldTgt/>
+                  </p:tgtEl>
+                </p:cond>
+              </p:prevCondLst>
+              <p:nextCondLst>
+                <p:cond evt="onNext" delay="0">
+                  <p:tgtEl>
+                    <p:sldTgt/>
+                  </p:tgtEl>
+                </p:cond>
+              </p:nextCondLst>
+            </p:seq>
+          </p:childTnLst>
+        </p:cTn>
+      </p:par>
+    </p:tnLst>
+    <p:bldLst>
+      <p:bldP spid="2" grpId="0"/>
+      <p:bldP spid="3" grpId="0"/>
+    </p:bldLst>
+  </p:timing>
 </p:sld>
 </file>
 
@@ -15813,6 +16827,37 @@
           <a:chExt cx="0" cy="0"/>
         </a:xfrm>
       </p:grpSpPr>
+      <p:pic>
+        <p:nvPicPr>
+          <p:cNvPr id="4" name="Picture 3">
+            <a:extLst>
+              <a:ext uri="{FF2B5EF4-FFF2-40B4-BE49-F238E27FC236}">
+                <a16:creationId xmlns:a16="http://schemas.microsoft.com/office/drawing/2014/main" id="{2A1B6312-BEE7-4105-9E8F-99361B1327B6}"/>
+              </a:ext>
+            </a:extLst>
+          </p:cNvPr>
+          <p:cNvPicPr>
+            <a:picLocks noChangeAspect="1"/>
+          </p:cNvPicPr>
+          <p:nvPr/>
+        </p:nvPicPr>
+        <p:blipFill rotWithShape="1">
+          <a:blip r:embed="rId3">
+            <a:alphaModFix amt="50000"/>
+          </a:blip>
+          <a:srcRect l="14726" t="14029" r="14726" b="20703"/>
+          <a:stretch/>
+        </p:blipFill>
+        <p:spPr>
+          <a:xfrm>
+            <a:off x="0" y="0"/>
+            <a:ext cx="12192000" cy="6345382"/>
+          </a:xfrm>
+          <a:prstGeom prst="rect">
+            <a:avLst/>
+          </a:prstGeom>
+        </p:spPr>
+      </p:pic>
       <p:sp>
         <p:nvSpPr>
           <p:cNvPr id="411" name="Google Shape;411;p39"/>
@@ -16074,7 +17119,7 @@
                 <a:ea typeface="Calibri"/>
                 <a:cs typeface="Calibri"/>
                 <a:sym typeface="Calibri"/>
-                <a:hlinkClick r:id="rId3"/>
+                <a:hlinkClick r:id="rId4"/>
               </a:rPr>
               <a:t>https://arpha.pensoft.net/tips/From-GBIF-IPT-metadata-EML</a:t>
             </a:r>

</xml_diff>

<commit_message>
even more 04 ppt changes
</commit_message>
<xml_diff>
--- a/04 -EML standards.pptx
+++ b/04 -EML standards.pptx
@@ -1821,6 +1821,135 @@
               </a:spcAft>
               <a:buNone/>
             </a:pPr>
+            <a:endParaRPr lang="en-CA" dirty="0"/>
+          </a:p>
+          <a:p>
+            <a:pPr marL="0" lvl="0" indent="0" algn="l" rtl="0">
+              <a:spcBef>
+                <a:spcPts val="0"/>
+              </a:spcBef>
+              <a:spcAft>
+                <a:spcPts val="0"/>
+              </a:spcAft>
+              <a:buNone/>
+            </a:pPr>
+            <a:r>
+              <a:rPr lang="en-CA" dirty="0"/>
+              <a:t>These and other terms are prompted in the IPT Metadata form set that accompanies each data collection, with entire sections covering geographic, temporal, and taxonomic coverage. Some of these fields are very straightforward, almost all of them have tooltips baked into the IPT to help with context.</a:t>
+            </a:r>
+          </a:p>
+          <a:p>
+            <a:pPr marL="0" lvl="0" indent="0" algn="l" rtl="0">
+              <a:spcBef>
+                <a:spcPts val="0"/>
+              </a:spcBef>
+              <a:spcAft>
+                <a:spcPts val="0"/>
+              </a:spcAft>
+              <a:buNone/>
+            </a:pPr>
+            <a:endParaRPr lang="en-CA" dirty="0"/>
+          </a:p>
+          <a:p>
+            <a:pPr marL="0" lvl="0" indent="0" algn="l" rtl="0">
+              <a:spcBef>
+                <a:spcPts val="0"/>
+              </a:spcBef>
+              <a:spcAft>
+                <a:spcPts val="0"/>
+              </a:spcAft>
+              <a:buNone/>
+            </a:pPr>
+            <a:r>
+              <a:rPr lang="en-CA" dirty="0"/>
+              <a:t>The Methods section particularly is an avalanche of free text, but allows for you to relay documentation you might receive from the data generators on the specific step by step processes that were part of the study that designed, executed, curated, and processed the dataset.</a:t>
+            </a:r>
+          </a:p>
+          <a:p>
+            <a:pPr marL="0" lvl="0" indent="0" algn="l" rtl="0">
+              <a:spcBef>
+                <a:spcPts val="0"/>
+              </a:spcBef>
+              <a:spcAft>
+                <a:spcPts val="0"/>
+              </a:spcAft>
+              <a:buNone/>
+            </a:pPr>
+            <a:endParaRPr lang="en-CA" dirty="0"/>
+          </a:p>
+          <a:p>
+            <a:pPr marL="0" lvl="0" indent="0" algn="l" rtl="0">
+              <a:spcBef>
+                <a:spcPts val="0"/>
+              </a:spcBef>
+              <a:spcAft>
+                <a:spcPts val="0"/>
+              </a:spcAft>
+              <a:buNone/>
+            </a:pPr>
+            <a:r>
+              <a:rPr lang="en-CA" dirty="0"/>
+              <a:t>Project data lets you document the central organization or larger effort behind this dataset’s generation and more high-level things like the motivation for </a:t>
+            </a:r>
+            <a:r>
+              <a:rPr lang="en-CA" dirty="0" err="1"/>
+              <a:t>th</a:t>
+            </a:r>
+            <a:r>
+              <a:rPr lang="en-CA" dirty="0"/>
+              <a:t> </a:t>
+            </a:r>
+            <a:r>
+              <a:rPr lang="en-CA" dirty="0" err="1"/>
+              <a:t>eproject</a:t>
+            </a:r>
+            <a:r>
+              <a:rPr lang="en-CA" dirty="0"/>
+              <a:t>, how it was funded, details of the study area and here there may or may not be some overlap with study design. You can make personnel entries attached to this, a name and a role, and the personnel directory and identifier, for instance ORCID, Google Scholar ID, </a:t>
+            </a:r>
+            <a:r>
+              <a:rPr lang="en-CA" dirty="0" err="1"/>
+              <a:t>researcherID</a:t>
+            </a:r>
+            <a:r>
+              <a:rPr lang="en-CA" dirty="0"/>
+              <a:t>, or even LinkedIn</a:t>
+            </a:r>
+          </a:p>
+          <a:p>
+            <a:pPr marL="0" lvl="0" indent="0" algn="l" rtl="0">
+              <a:spcBef>
+                <a:spcPts val="0"/>
+              </a:spcBef>
+              <a:spcAft>
+                <a:spcPts val="0"/>
+              </a:spcAft>
+              <a:buNone/>
+            </a:pPr>
+            <a:endParaRPr lang="en-CA" dirty="0"/>
+          </a:p>
+          <a:p>
+            <a:pPr marL="0" lvl="0" indent="0" algn="l" rtl="0">
+              <a:spcBef>
+                <a:spcPts val="0"/>
+              </a:spcBef>
+              <a:spcAft>
+                <a:spcPts val="0"/>
+              </a:spcAft>
+              <a:buNone/>
+            </a:pPr>
+            <a:r>
+              <a:rPr lang="en-CA" dirty="0"/>
+              <a:t>And finally there’s a section for keywords that lets you include keywords you want to associate with the dataset and optionally which vocabulary you are pulling those keywords from, for instance the Global Change Master Directory is a popular vocab for this field, they have a Earth Science - &gt; Biological Classification section that may provide more relevant eyeballs to the dataset. There’s a browser for GCMD here, but it’s by no means the only thing you may want to use in the Keywords </a:t>
+            </a:r>
+            <a:r>
+              <a:rPr lang="en-CA" dirty="0" err="1"/>
+              <a:t>fieldset</a:t>
+            </a:r>
+            <a:r>
+              <a:rPr lang="en-CA" dirty="0"/>
+              <a:t>. Multiple different keywords sets are allowed to be associated in the metadata, so I would approach this with ‘how do I get the most people possible to find this dataset’</a:t>
+            </a:r>
             <a:endParaRPr dirty="0"/>
           </a:p>
         </p:txBody>
@@ -2192,7 +2321,7 @@
             </a:pPr>
             <a:r>
               <a:rPr lang="en-CA" dirty="0"/>
-              <a:t>EML proper has more accommodation for multilingual abstracts, this could be a development request</a:t>
+              <a:t>The newer versions of the EML schema have more accommodation for multilingual abstracts, taking advantage of the attributes in the XML to denote language. this could be a development request, or could be part of a can of worms</a:t>
             </a:r>
             <a:endParaRPr dirty="0"/>
           </a:p>
@@ -2735,7 +2864,7 @@
             </a:pPr>
             <a:r>
               <a:rPr lang="en-CA" dirty="0"/>
-              <a:t>So, we won’t do this just yet, but it’s worth highlighting that due to their shared understanding of EML we can take a dataset published on an IPT, and register it with a Pensoft journal as a ‘data paper’, simply by exporting the EML and importing it to the appropriate Pensoft journal of our choice.</a:t>
+              <a:t>So, we won’t do this just yet, but it’s worth highlighting that even despite the version mismatch, due to the two platforms having a shared understanding of EML we can take a dataset that’s been published on an IPT, and register it with a Pensoft journal as a ‘data paper’, simply by exporting the EML and importing it to the appropriate Pensoft journal of our choice.</a:t>
             </a:r>
           </a:p>
         </p:txBody>
@@ -13067,7 +13196,7 @@
                 <a:cs typeface="Calibri"/>
                 <a:sym typeface="Calibri"/>
               </a:rPr>
-              <a:t>methods (sampling, QC) </a:t>
+              <a:t>methods (study extent, sampling, QC, step description) </a:t>
             </a:r>
             <a:endParaRPr dirty="0"/>
           </a:p>
@@ -13131,6 +13260,209 @@
           </a:p>
         </p:txBody>
       </p:sp>
+      <p:sp>
+        <p:nvSpPr>
+          <p:cNvPr id="3" name="TextBox 2">
+            <a:extLst>
+              <a:ext uri="{FF2B5EF4-FFF2-40B4-BE49-F238E27FC236}">
+                <a16:creationId xmlns:a16="http://schemas.microsoft.com/office/drawing/2014/main" id="{FC5C3A87-7A87-4812-9993-7516C87F09D0}"/>
+              </a:ext>
+            </a:extLst>
+          </p:cNvPr>
+          <p:cNvSpPr txBox="1"/>
+          <p:nvPr/>
+        </p:nvSpPr>
+        <p:spPr>
+          <a:xfrm>
+            <a:off x="6863479" y="2520764"/>
+            <a:ext cx="4124621" cy="738664"/>
+          </a:xfrm>
+          <a:prstGeom prst="rect">
+            <a:avLst/>
+          </a:prstGeom>
+        </p:spPr>
+        <p:style>
+          <a:lnRef idx="1">
+            <a:schemeClr val="accent1"/>
+          </a:lnRef>
+          <a:fillRef idx="2">
+            <a:schemeClr val="accent1"/>
+          </a:fillRef>
+          <a:effectRef idx="1">
+            <a:schemeClr val="accent1"/>
+          </a:effectRef>
+          <a:fontRef idx="minor">
+            <a:schemeClr val="dk1"/>
+          </a:fontRef>
+        </p:style>
+        <p:txBody>
+          <a:bodyPr wrap="square" rtlCol="0">
+            <a:spAutoFit/>
+          </a:bodyPr>
+          <a:lstStyle/>
+          <a:p>
+            <a:r>
+              <a:rPr lang="en-CA" b="0" i="0" dirty="0">
+                <a:solidFill>
+                  <a:srgbClr val="000000"/>
+                </a:solidFill>
+                <a:effectLst/>
+                <a:latin typeface="Calibri" panose="020F0502020204030204" pitchFamily="34" charset="0"/>
+                <a:cs typeface="Calibri" panose="020F0502020204030204" pitchFamily="34" charset="0"/>
+              </a:rPr>
+              <a:t>Summary of the intentions for which the data set was developed. Includes objectives for creating the data set and what the data set is to support.</a:t>
+            </a:r>
+            <a:endParaRPr lang="en-CA" dirty="0">
+              <a:latin typeface="Calibri" panose="020F0502020204030204" pitchFamily="34" charset="0"/>
+              <a:cs typeface="Calibri" panose="020F0502020204030204" pitchFamily="34" charset="0"/>
+            </a:endParaRPr>
+          </a:p>
+        </p:txBody>
+      </p:sp>
+      <p:cxnSp>
+        <p:nvCxnSpPr>
+          <p:cNvPr id="7" name="Straight Arrow Connector 6">
+            <a:extLst>
+              <a:ext uri="{FF2B5EF4-FFF2-40B4-BE49-F238E27FC236}">
+                <a16:creationId xmlns:a16="http://schemas.microsoft.com/office/drawing/2014/main" id="{1EAC7AB4-8E50-4A9D-9603-2D79C4548BD5}"/>
+              </a:ext>
+            </a:extLst>
+          </p:cNvPr>
+          <p:cNvCxnSpPr>
+            <a:cxnSpLocks/>
+            <a:endCxn id="3" idx="1"/>
+          </p:cNvCxnSpPr>
+          <p:nvPr/>
+        </p:nvCxnSpPr>
+        <p:spPr>
+          <a:xfrm flipV="1">
+            <a:off x="2921330" y="2890096"/>
+            <a:ext cx="3942149" cy="1816507"/>
+          </a:xfrm>
+          <a:prstGeom prst="straightConnector1">
+            <a:avLst/>
+          </a:prstGeom>
+          <a:ln w="9525" cap="flat" cmpd="sng" algn="ctr">
+            <a:solidFill>
+              <a:schemeClr val="accent1"/>
+            </a:solidFill>
+            <a:prstDash val="solid"/>
+            <a:round/>
+            <a:headEnd type="none" w="med" len="med"/>
+            <a:tailEnd type="arrow" w="med" len="med"/>
+          </a:ln>
+        </p:spPr>
+        <p:style>
+          <a:lnRef idx="0">
+            <a:scrgbClr r="0" g="0" b="0"/>
+          </a:lnRef>
+          <a:fillRef idx="0">
+            <a:scrgbClr r="0" g="0" b="0"/>
+          </a:fillRef>
+          <a:effectRef idx="0">
+            <a:scrgbClr r="0" g="0" b="0"/>
+          </a:effectRef>
+          <a:fontRef idx="minor">
+            <a:schemeClr val="tx1"/>
+          </a:fontRef>
+        </p:style>
+      </p:cxnSp>
+      <p:sp>
+        <p:nvSpPr>
+          <p:cNvPr id="8" name="TextBox 7">
+            <a:extLst>
+              <a:ext uri="{FF2B5EF4-FFF2-40B4-BE49-F238E27FC236}">
+                <a16:creationId xmlns:a16="http://schemas.microsoft.com/office/drawing/2014/main" id="{376457FA-8F1C-4794-824C-86262791CB27}"/>
+              </a:ext>
+            </a:extLst>
+          </p:cNvPr>
+          <p:cNvSpPr txBox="1"/>
+          <p:nvPr/>
+        </p:nvSpPr>
+        <p:spPr>
+          <a:xfrm>
+            <a:off x="4257637" y="5347745"/>
+            <a:ext cx="5211683" cy="369332"/>
+          </a:xfrm>
+          <a:prstGeom prst="rect">
+            <a:avLst/>
+          </a:prstGeom>
+        </p:spPr>
+        <p:style>
+          <a:lnRef idx="1">
+            <a:schemeClr val="accent1"/>
+          </a:lnRef>
+          <a:fillRef idx="2">
+            <a:schemeClr val="accent1"/>
+          </a:fillRef>
+          <a:effectRef idx="1">
+            <a:schemeClr val="accent1"/>
+          </a:effectRef>
+          <a:fontRef idx="minor">
+            <a:schemeClr val="dk1"/>
+          </a:fontRef>
+        </p:style>
+        <p:txBody>
+          <a:bodyPr wrap="none" rtlCol="0">
+            <a:spAutoFit/>
+          </a:bodyPr>
+          <a:lstStyle/>
+          <a:p>
+            <a:r>
+              <a:rPr lang="en-CA" sz="1800" dirty="0"/>
+              <a:t>https://gcmd.earthdata.nasa.gov/KeywordViewer/</a:t>
+            </a:r>
+          </a:p>
+        </p:txBody>
+      </p:sp>
+      <p:cxnSp>
+        <p:nvCxnSpPr>
+          <p:cNvPr id="10" name="Straight Arrow Connector 9">
+            <a:extLst>
+              <a:ext uri="{FF2B5EF4-FFF2-40B4-BE49-F238E27FC236}">
+                <a16:creationId xmlns:a16="http://schemas.microsoft.com/office/drawing/2014/main" id="{4790ECB1-923E-4711-B1A7-089C5B9542A1}"/>
+              </a:ext>
+            </a:extLst>
+          </p:cNvPr>
+          <p:cNvCxnSpPr>
+            <a:cxnSpLocks/>
+            <a:endCxn id="8" idx="1"/>
+          </p:cNvCxnSpPr>
+          <p:nvPr/>
+        </p:nvCxnSpPr>
+        <p:spPr>
+          <a:xfrm>
+            <a:off x="2173184" y="5486400"/>
+            <a:ext cx="2084453" cy="46011"/>
+          </a:xfrm>
+          <a:prstGeom prst="straightConnector1">
+            <a:avLst/>
+          </a:prstGeom>
+          <a:ln w="9525" cap="flat" cmpd="sng" algn="ctr">
+            <a:solidFill>
+              <a:schemeClr val="accent1"/>
+            </a:solidFill>
+            <a:prstDash val="solid"/>
+            <a:round/>
+            <a:headEnd type="none" w="med" len="med"/>
+            <a:tailEnd type="arrow" w="med" len="med"/>
+          </a:ln>
+        </p:spPr>
+        <p:style>
+          <a:lnRef idx="0">
+            <a:scrgbClr r="0" g="0" b="0"/>
+          </a:lnRef>
+          <a:fillRef idx="0">
+            <a:scrgbClr r="0" g="0" b="0"/>
+          </a:fillRef>
+          <a:effectRef idx="0">
+            <a:scrgbClr r="0" g="0" b="0"/>
+          </a:effectRef>
+          <a:fontRef idx="minor">
+            <a:schemeClr val="tx1"/>
+          </a:fontRef>
+        </p:style>
+      </p:cxnSp>
     </p:spTree>
   </p:cSld>
   <p:clrMapOvr>
@@ -13234,10 +13566,10 @@
               <a:buNone/>
             </a:pPr>
             <a:r>
-              <a:rPr lang="en-US"/>
+              <a:rPr lang="en-US" dirty="0"/>
               <a:t>Metadata standards</a:t>
             </a:r>
-            <a:endParaRPr/>
+            <a:endParaRPr dirty="0"/>
           </a:p>
         </p:txBody>
       </p:sp>
@@ -13249,7 +13581,7 @@
         </p:nvSpPr>
         <p:spPr>
           <a:xfrm>
-            <a:off x="838200" y="1561205"/>
+            <a:off x="1117600" y="1988705"/>
             <a:ext cx="10586400" cy="1080000"/>
           </a:xfrm>
           <a:prstGeom prst="rect">
@@ -13284,7 +13616,7 @@
               <a:buNone/>
             </a:pPr>
             <a:r>
-              <a:rPr lang="en-US" sz="1800" b="1">
+              <a:rPr lang="en-US" sz="1800" b="1" dirty="0">
                 <a:solidFill>
                   <a:schemeClr val="dk1"/>
                 </a:solidFill>
@@ -13293,11 +13625,90 @@
                 <a:cs typeface="Calibri"/>
                 <a:sym typeface="Calibri"/>
               </a:rPr>
-              <a:t>Dataset title</a:t>
-            </a:r>
-            <a:endParaRPr sz="1800" b="1">
+              <a:t>Dataset </a:t>
+            </a:r>
+            <a:r>
+              <a:rPr lang="en-US" sz="1800" b="1" dirty="0">
+                <a:solidFill>
+                  <a:schemeClr val="tx1"/>
+                </a:solidFill>
+                <a:latin typeface="Calibri"/>
+                <a:ea typeface="Calibri"/>
+                <a:cs typeface="Calibri"/>
+                <a:sym typeface="Calibri"/>
+              </a:rPr>
+              <a:t>title      </a:t>
+            </a:r>
+            <a:r>
+              <a:rPr lang="en-US" sz="1800" dirty="0">
+                <a:solidFill>
+                  <a:schemeClr val="tx1"/>
+                </a:solidFill>
+                <a:latin typeface="Calibri"/>
+                <a:ea typeface="Calibri"/>
+                <a:cs typeface="Calibri"/>
+                <a:sym typeface="Calibri"/>
+              </a:rPr>
+              <a:t>Is different from the </a:t>
+            </a:r>
+            <a:r>
+              <a:rPr lang="en-US" sz="1800" dirty="0" err="1">
+                <a:solidFill>
+                  <a:schemeClr val="tx1"/>
+                </a:solidFill>
+                <a:latin typeface="Calibri"/>
+                <a:ea typeface="Calibri"/>
+                <a:cs typeface="Calibri"/>
+                <a:sym typeface="Calibri"/>
+              </a:rPr>
+              <a:t>shortname</a:t>
+            </a:r>
+            <a:r>
+              <a:rPr lang="en-US" sz="1800" dirty="0">
+                <a:solidFill>
+                  <a:schemeClr val="tx1"/>
+                </a:solidFill>
+                <a:latin typeface="Calibri"/>
+                <a:ea typeface="Calibri"/>
+                <a:cs typeface="Calibri"/>
+                <a:sym typeface="Calibri"/>
+              </a:rPr>
+              <a:t>. </a:t>
+            </a:r>
+          </a:p>
+          <a:p>
+            <a:pPr marL="91440" marR="0" lvl="0" indent="-114300" algn="l" rtl="0">
+              <a:lnSpc>
+                <a:spcPct val="90000"/>
+              </a:lnSpc>
+              <a:spcBef>
+                <a:spcPts val="1400"/>
+              </a:spcBef>
+              <a:spcAft>
+                <a:spcPts val="0"/>
+              </a:spcAft>
+              <a:buClr>
+                <a:schemeClr val="accent1"/>
+              </a:buClr>
+              <a:buSzPts val="1800"/>
+              <a:buFont typeface="Calibri"/>
+              <a:buChar char=" "/>
+            </a:pPr>
+            <a:r>
+              <a:rPr lang="en-US" sz="1800" dirty="0">
+                <a:solidFill>
+                  <a:schemeClr val="tx1"/>
+                </a:solidFill>
+                <a:latin typeface="Calibri"/>
+                <a:ea typeface="Calibri"/>
+                <a:cs typeface="Calibri"/>
+                <a:sym typeface="Calibri"/>
+              </a:rPr>
+              <a:t>A good, descriptive title is indispensable</a:t>
+            </a:r>
+            <a:endParaRPr sz="1800" dirty="0">
               <a:solidFill>
-                <a:schemeClr val="dk1"/>
+                <a:schemeClr val="tx1"/>
               </a:solidFill>
               <a:latin typeface="Calibri"/>
               <a:ea typeface="Calibri"/>
@@ -13324,52 +13735,44 @@
               <a:buChar char=" "/>
             </a:pPr>
             <a:r>
-              <a:rPr lang="en-US" sz="1800">
-                <a:solidFill>
-                  <a:srgbClr val="3F3F3F"/>
+              <a:rPr lang="en-US" sz="1800" dirty="0">
+                <a:solidFill>
+                  <a:schemeClr val="tx1"/>
                 </a:solidFill>
                 <a:latin typeface="Calibri"/>
                 <a:ea typeface="Calibri"/>
                 <a:cs typeface="Calibri"/>
                 <a:sym typeface="Calibri"/>
               </a:rPr>
-              <a:t>Is different from the shortname (which is used to create the DwC-A file and the dataset IPT URL</a:t>
-            </a:r>
-            <a:endParaRPr/>
-          </a:p>
-          <a:p>
-            <a:pPr marL="91440" marR="0" lvl="0" indent="-114300" algn="l" rtl="0">
-              <a:lnSpc>
-                <a:spcPct val="90000"/>
-              </a:lnSpc>
-              <a:spcBef>
-                <a:spcPts val="1400"/>
-              </a:spcBef>
-              <a:spcAft>
-                <a:spcPts val="0"/>
-              </a:spcAft>
-              <a:buClr>
-                <a:schemeClr val="accent1"/>
-              </a:buClr>
-              <a:buSzPts val="1800"/>
-              <a:buFont typeface="Calibri"/>
-              <a:buChar char=" "/>
-            </a:pPr>
+              <a:t>Provides users with valuable information, making e.g. </a:t>
+            </a:r>
             <a:r>
               <a:rPr lang="en-US" sz="1800">
                 <a:solidFill>
-                  <a:srgbClr val="3F3F3F"/>
+                  <a:schemeClr val="tx1"/>
                 </a:solidFill>
                 <a:latin typeface="Calibri"/>
                 <a:ea typeface="Calibri"/>
                 <a:cs typeface="Calibri"/>
                 <a:sym typeface="Calibri"/>
               </a:rPr>
-              <a:t>A good, descriptive title is indispensable</a:t>
-            </a:r>
-            <a:endParaRPr sz="1800">
+              <a:t>data discovery / screening </a:t>
+            </a:r>
+            <a:r>
+              <a:rPr lang="en-US" sz="1800" dirty="0">
+                <a:solidFill>
+                  <a:schemeClr val="tx1"/>
+                </a:solidFill>
+                <a:latin typeface="Calibri"/>
+                <a:ea typeface="Calibri"/>
+                <a:cs typeface="Calibri"/>
+                <a:sym typeface="Calibri"/>
+              </a:rPr>
+              <a:t>easier</a:t>
+            </a:r>
+            <a:endParaRPr sz="1800" dirty="0">
               <a:solidFill>
-                <a:srgbClr val="3F3F3F"/>
+                <a:schemeClr val="tx1"/>
               </a:solidFill>
               <a:latin typeface="Calibri"/>
               <a:ea typeface="Calibri"/>
@@ -13378,7 +13781,7 @@
             </a:endParaRPr>
           </a:p>
           <a:p>
-            <a:pPr marL="91440" marR="0" lvl="0" indent="-114300" algn="l" rtl="0">
+            <a:pPr marL="91440" marR="0" lvl="0" indent="0" algn="l" rtl="0">
               <a:lnSpc>
                 <a:spcPct val="90000"/>
               </a:lnSpc>
@@ -13393,49 +13796,9 @@
               </a:buClr>
               <a:buSzPts val="1800"/>
               <a:buFont typeface="Calibri"/>
-              <a:buChar char=" "/>
+              <a:buNone/>
             </a:pPr>
-            <a:r>
-              <a:rPr lang="en-US" sz="1800">
-                <a:solidFill>
-                  <a:srgbClr val="3F3F3F"/>
-                </a:solidFill>
-                <a:latin typeface="Calibri"/>
-                <a:ea typeface="Calibri"/>
-                <a:cs typeface="Calibri"/>
-                <a:sym typeface="Calibri"/>
-              </a:rPr>
-              <a:t>Provides users with valuable information, making e.g. data screening easier</a:t>
-            </a:r>
-            <a:endParaRPr sz="1800">
-              <a:solidFill>
-                <a:srgbClr val="3F3F3F"/>
-              </a:solidFill>
-              <a:latin typeface="Calibri"/>
-              <a:ea typeface="Calibri"/>
-              <a:cs typeface="Calibri"/>
-              <a:sym typeface="Calibri"/>
-            </a:endParaRPr>
-          </a:p>
-          <a:p>
-            <a:pPr marL="91440" marR="0" lvl="0" indent="0" algn="l" rtl="0">
-              <a:lnSpc>
-                <a:spcPct val="90000"/>
-              </a:lnSpc>
-              <a:spcBef>
-                <a:spcPts val="1400"/>
-              </a:spcBef>
-              <a:spcAft>
-                <a:spcPts val="0"/>
-              </a:spcAft>
-              <a:buClr>
-                <a:schemeClr val="accent1"/>
-              </a:buClr>
-              <a:buSzPts val="1800"/>
-              <a:buFont typeface="Calibri"/>
-              <a:buNone/>
-            </a:pPr>
-            <a:endParaRPr sz="1800">
+            <a:endParaRPr sz="1800" dirty="0">
               <a:solidFill>
                 <a:srgbClr val="3F3F3F"/>
               </a:solidFill>
@@ -13899,6 +14262,85 @@
           </a:p>
         </p:txBody>
       </p:sp>
+      <p:sp>
+        <p:nvSpPr>
+          <p:cNvPr id="2" name="TextBox 1">
+            <a:extLst>
+              <a:ext uri="{FF2B5EF4-FFF2-40B4-BE49-F238E27FC236}">
+                <a16:creationId xmlns:a16="http://schemas.microsoft.com/office/drawing/2014/main" id="{FC30A100-9D0A-4422-8E63-04C6B433BB50}"/>
+              </a:ext>
+            </a:extLst>
+          </p:cNvPr>
+          <p:cNvSpPr txBox="1"/>
+          <p:nvPr/>
+        </p:nvSpPr>
+        <p:spPr>
+          <a:xfrm>
+            <a:off x="1117600" y="1410261"/>
+            <a:ext cx="10073592" cy="584775"/>
+          </a:xfrm>
+          <a:prstGeom prst="rect">
+            <a:avLst/>
+          </a:prstGeom>
+          <a:noFill/>
+        </p:spPr>
+        <p:txBody>
+          <a:bodyPr wrap="none" rtlCol="0">
+            <a:spAutoFit/>
+          </a:bodyPr>
+          <a:lstStyle/>
+          <a:p>
+            <a:r>
+              <a:rPr lang="en-US" sz="1800" b="1" dirty="0" err="1">
+                <a:solidFill>
+                  <a:schemeClr val="dk1"/>
+                </a:solidFill>
+                <a:latin typeface="Calibri"/>
+                <a:ea typeface="Calibri"/>
+                <a:cs typeface="Calibri"/>
+                <a:sym typeface="Calibri"/>
+              </a:rPr>
+              <a:t>Shortname</a:t>
+            </a:r>
+            <a:r>
+              <a:rPr lang="en-US" sz="1800" b="1" dirty="0">
+                <a:solidFill>
+                  <a:schemeClr val="dk1"/>
+                </a:solidFill>
+                <a:latin typeface="Calibri"/>
+                <a:ea typeface="Calibri"/>
+                <a:cs typeface="Calibri"/>
+                <a:sym typeface="Calibri"/>
+              </a:rPr>
+              <a:t>        </a:t>
+            </a:r>
+            <a:r>
+              <a:rPr lang="en-US" sz="1800" dirty="0">
+                <a:solidFill>
+                  <a:schemeClr val="dk1"/>
+                </a:solidFill>
+                <a:latin typeface="Calibri"/>
+                <a:ea typeface="Calibri"/>
+                <a:cs typeface="Calibri"/>
+                <a:sym typeface="Calibri"/>
+              </a:rPr>
+              <a:t>Resource identifier in the IPT, will be part of the URL. Short! No escape characters please!</a:t>
+            </a:r>
+            <a:endParaRPr lang="en-US" sz="1800" b="1" dirty="0">
+              <a:solidFill>
+                <a:schemeClr val="dk1"/>
+              </a:solidFill>
+              <a:latin typeface="Calibri"/>
+              <a:ea typeface="Calibri"/>
+              <a:cs typeface="Calibri"/>
+              <a:sym typeface="Calibri"/>
+            </a:endParaRPr>
+          </a:p>
+          <a:p>
+            <a:endParaRPr lang="en-CA" dirty="0"/>
+          </a:p>
+        </p:txBody>
+      </p:sp>
     </p:spTree>
   </p:cSld>
   <p:clrMapOvr>
@@ -14466,213 +14908,6 @@
             </a:endParaRPr>
           </a:p>
           <a:p>
-            <a:pPr>
-              <a:buClr>
-                <a:schemeClr val="accent1"/>
-              </a:buClr>
-              <a:buSzPts val="1500"/>
-            </a:pPr>
-            <a:r>
-              <a:rPr lang="en-US" sz="1500" i="1" dirty="0">
-                <a:latin typeface="Calibri"/>
-              </a:rPr>
-              <a:t>Example</a:t>
-            </a:r>
-            <a:endParaRPr lang="en-US" sz="1500" dirty="0">
-              <a:solidFill>
-                <a:srgbClr val="3F3F3F"/>
-              </a:solidFill>
-              <a:latin typeface="Calibri"/>
-              <a:cs typeface="Calibri"/>
-            </a:endParaRPr>
-          </a:p>
-          <a:p>
-            <a:pPr>
-              <a:buClr>
-                <a:schemeClr val="accent1"/>
-              </a:buClr>
-              <a:buSzPts val="1500"/>
-              <a:buChar char="•"/>
-            </a:pPr>
-            <a:r>
-              <a:rPr lang="en-US" sz="1500" dirty="0">
-                <a:latin typeface="Calibri"/>
-              </a:rPr>
-              <a:t>The Louis-Marie herbarium grants a priority to the Arctic-alpine, subarctic and boreal species from the province of Quebec and the northern hemisphere. This dataset is mainly populated with specimens from the province of Quebec. / </a:t>
-            </a:r>
-            <a:r>
-              <a:rPr lang="en-US" sz="1500" dirty="0" err="1">
-                <a:latin typeface="Calibri"/>
-              </a:rPr>
-              <a:t>L’Herbier</a:t>
-            </a:r>
-            <a:r>
-              <a:rPr lang="en-US" sz="1500" dirty="0">
-                <a:latin typeface="Calibri"/>
-              </a:rPr>
-              <a:t> Louis-Marie </a:t>
-            </a:r>
-            <a:r>
-              <a:rPr lang="en-US" sz="1500" dirty="0" err="1">
-                <a:latin typeface="Calibri"/>
-              </a:rPr>
-              <a:t>accorde</a:t>
-            </a:r>
-            <a:r>
-              <a:rPr lang="en-US" sz="1500" dirty="0">
-                <a:latin typeface="Calibri"/>
-              </a:rPr>
-              <a:t> </a:t>
-            </a:r>
-            <a:r>
-              <a:rPr lang="en-US" sz="1500" dirty="0" err="1">
-                <a:latin typeface="Calibri"/>
-              </a:rPr>
-              <a:t>une</a:t>
-            </a:r>
-            <a:r>
-              <a:rPr lang="en-US" sz="1500" dirty="0">
-                <a:latin typeface="Calibri"/>
-              </a:rPr>
-              <a:t> </a:t>
-            </a:r>
-            <a:r>
-              <a:rPr lang="en-US" sz="1500" dirty="0" err="1">
-                <a:latin typeface="Calibri"/>
-              </a:rPr>
-              <a:t>priorité</a:t>
-            </a:r>
-            <a:r>
-              <a:rPr lang="en-US" sz="1500" dirty="0">
-                <a:latin typeface="Calibri"/>
-              </a:rPr>
-              <a:t> aux </a:t>
-            </a:r>
-            <a:r>
-              <a:rPr lang="en-US" sz="1500" dirty="0" err="1">
-                <a:latin typeface="Calibri"/>
-              </a:rPr>
-              <a:t>espèces</a:t>
-            </a:r>
-            <a:r>
-              <a:rPr lang="en-US" sz="1500" dirty="0">
-                <a:latin typeface="Calibri"/>
-              </a:rPr>
-              <a:t> </a:t>
-            </a:r>
-            <a:r>
-              <a:rPr lang="en-US" sz="1500" dirty="0" err="1">
-                <a:latin typeface="Calibri"/>
-              </a:rPr>
-              <a:t>arctiques</a:t>
-            </a:r>
-            <a:r>
-              <a:rPr lang="en-US" sz="1500" dirty="0">
-                <a:latin typeface="Calibri"/>
-              </a:rPr>
-              <a:t>-alpines, </a:t>
-            </a:r>
-            <a:r>
-              <a:rPr lang="en-US" sz="1500" dirty="0" err="1">
-                <a:latin typeface="Calibri"/>
-              </a:rPr>
-              <a:t>subarctiques</a:t>
-            </a:r>
-            <a:r>
-              <a:rPr lang="en-US" sz="1500" dirty="0">
-                <a:latin typeface="Calibri"/>
-              </a:rPr>
-              <a:t> et </a:t>
-            </a:r>
-            <a:r>
-              <a:rPr lang="en-US" sz="1500" dirty="0" err="1">
-                <a:latin typeface="Calibri"/>
-              </a:rPr>
-              <a:t>boréales</a:t>
-            </a:r>
-            <a:r>
-              <a:rPr lang="en-US" sz="1500" dirty="0">
-                <a:latin typeface="Calibri"/>
-              </a:rPr>
-              <a:t> du Québec, du Canada et de </a:t>
-            </a:r>
-            <a:r>
-              <a:rPr lang="en-US" sz="1500" dirty="0" err="1">
-                <a:latin typeface="Calibri"/>
-              </a:rPr>
-              <a:t>l’hémisphère</a:t>
-            </a:r>
-            <a:r>
-              <a:rPr lang="en-US" sz="1500" dirty="0">
-                <a:latin typeface="Calibri"/>
-              </a:rPr>
-              <a:t> </a:t>
-            </a:r>
-            <a:r>
-              <a:rPr lang="en-US" sz="1500" dirty="0" err="1">
-                <a:latin typeface="Calibri"/>
-              </a:rPr>
-              <a:t>nord</a:t>
-            </a:r>
-            <a:r>
-              <a:rPr lang="en-US" sz="1500" dirty="0">
-                <a:latin typeface="Calibri"/>
-              </a:rPr>
-              <a:t>. Ce jeu </a:t>
-            </a:r>
-            <a:r>
-              <a:rPr lang="en-US" sz="1500" dirty="0" err="1">
-                <a:latin typeface="Calibri"/>
-              </a:rPr>
-              <a:t>présente</a:t>
-            </a:r>
-            <a:r>
-              <a:rPr lang="en-US" sz="1500" dirty="0">
-                <a:latin typeface="Calibri"/>
-              </a:rPr>
-              <a:t> </a:t>
-            </a:r>
-            <a:r>
-              <a:rPr lang="en-US" sz="1500" dirty="0" err="1">
-                <a:latin typeface="Calibri"/>
-              </a:rPr>
-              <a:t>principalement</a:t>
-            </a:r>
-            <a:r>
-              <a:rPr lang="en-US" sz="1500" dirty="0">
-                <a:latin typeface="Calibri"/>
-              </a:rPr>
-              <a:t> des </a:t>
-            </a:r>
-            <a:r>
-              <a:rPr lang="en-US" sz="1500" dirty="0" err="1">
-                <a:latin typeface="Calibri"/>
-              </a:rPr>
-              <a:t>spécimens</a:t>
-            </a:r>
-            <a:r>
-              <a:rPr lang="en-US" sz="1500" dirty="0">
-                <a:latin typeface="Calibri"/>
-              </a:rPr>
-              <a:t> </a:t>
-            </a:r>
-            <a:r>
-              <a:rPr lang="en-US" sz="1500" dirty="0" err="1">
-                <a:latin typeface="Calibri"/>
-              </a:rPr>
-              <a:t>provenant</a:t>
-            </a:r>
-            <a:r>
-              <a:rPr lang="en-US" sz="1500" dirty="0">
-                <a:latin typeface="Calibri"/>
-              </a:rPr>
-              <a:t> du Québec.</a:t>
-            </a:r>
-            <a:endParaRPr lang="en-US" dirty="0">
-              <a:latin typeface="Calibri"/>
-            </a:endParaRPr>
-          </a:p>
-          <a:p>
             <a:pPr marL="342900" marR="0" lvl="0" indent="-342900" algn="l">
               <a:spcBef>
                 <a:spcPts val="1400"/>
@@ -14824,6 +15059,390 @@
               <a:ea typeface="Calibri"/>
               <a:cs typeface="Calibri"/>
             </a:endParaRPr>
+          </a:p>
+        </p:txBody>
+      </p:sp>
+      <p:sp>
+        <p:nvSpPr>
+          <p:cNvPr id="2" name="TextBox 1">
+            <a:extLst>
+              <a:ext uri="{FF2B5EF4-FFF2-40B4-BE49-F238E27FC236}">
+                <a16:creationId xmlns:a16="http://schemas.microsoft.com/office/drawing/2014/main" id="{3184FB4C-FDA0-4740-A2C9-E213E127CA8F}"/>
+              </a:ext>
+            </a:extLst>
+          </p:cNvPr>
+          <p:cNvSpPr txBox="1"/>
+          <p:nvPr/>
+        </p:nvSpPr>
+        <p:spPr>
+          <a:xfrm>
+            <a:off x="4880757" y="3283527"/>
+            <a:ext cx="5796268" cy="2062103"/>
+          </a:xfrm>
+          <a:prstGeom prst="rect">
+            <a:avLst/>
+          </a:prstGeom>
+          <a:noFill/>
+        </p:spPr>
+        <p:txBody>
+          <a:bodyPr wrap="square" rtlCol="0">
+            <a:spAutoFit/>
+          </a:bodyPr>
+          <a:lstStyle/>
+          <a:p>
+            <a:pPr>
+              <a:buClr>
+                <a:schemeClr val="accent1"/>
+              </a:buClr>
+              <a:buSzPts val="1500"/>
+            </a:pPr>
+            <a:r>
+              <a:rPr lang="en-US" sz="1600" i="1" dirty="0">
+                <a:latin typeface="Calibri"/>
+              </a:rPr>
+              <a:t>Example</a:t>
+            </a:r>
+            <a:endParaRPr lang="en-US" sz="1600" dirty="0">
+              <a:solidFill>
+                <a:srgbClr val="3F3F3F"/>
+              </a:solidFill>
+              <a:latin typeface="Calibri"/>
+              <a:cs typeface="Calibri"/>
+            </a:endParaRPr>
+          </a:p>
+          <a:p>
+            <a:pPr>
+              <a:buClr>
+                <a:schemeClr val="accent1"/>
+              </a:buClr>
+              <a:buSzPts val="1500"/>
+              <a:buChar char="•"/>
+            </a:pPr>
+            <a:r>
+              <a:rPr lang="en-US" sz="1600" dirty="0">
+                <a:solidFill>
+                  <a:schemeClr val="accent1">
+                    <a:lumMod val="75000"/>
+                  </a:schemeClr>
+                </a:solidFill>
+                <a:latin typeface="Calibri"/>
+              </a:rPr>
+              <a:t>The Louis-Marie herbarium grants a priority to the Arctic-alpine, subarctic and boreal species from the province of Quebec and the northern hemisphere. This dataset is mainly populated with specimens from the province of Quebec. </a:t>
+            </a:r>
+            <a:r>
+              <a:rPr lang="en-US" sz="1600" dirty="0">
+                <a:latin typeface="Calibri"/>
+              </a:rPr>
+              <a:t>/ </a:t>
+            </a:r>
+            <a:r>
+              <a:rPr lang="en-US" sz="1600" dirty="0" err="1">
+                <a:solidFill>
+                  <a:schemeClr val="accent2">
+                    <a:lumMod val="75000"/>
+                  </a:schemeClr>
+                </a:solidFill>
+                <a:latin typeface="Calibri"/>
+              </a:rPr>
+              <a:t>L’Herbier</a:t>
+            </a:r>
+            <a:r>
+              <a:rPr lang="en-US" sz="1600" dirty="0">
+                <a:solidFill>
+                  <a:schemeClr val="accent2">
+                    <a:lumMod val="75000"/>
+                  </a:schemeClr>
+                </a:solidFill>
+                <a:latin typeface="Calibri"/>
+              </a:rPr>
+              <a:t> Louis-Marie </a:t>
+            </a:r>
+            <a:r>
+              <a:rPr lang="en-US" sz="1600" dirty="0" err="1">
+                <a:solidFill>
+                  <a:schemeClr val="accent2">
+                    <a:lumMod val="75000"/>
+                  </a:schemeClr>
+                </a:solidFill>
+                <a:latin typeface="Calibri"/>
+              </a:rPr>
+              <a:t>accorde</a:t>
+            </a:r>
+            <a:r>
+              <a:rPr lang="en-US" sz="1600" dirty="0">
+                <a:solidFill>
+                  <a:schemeClr val="accent2">
+                    <a:lumMod val="75000"/>
+                  </a:schemeClr>
+                </a:solidFill>
+                <a:latin typeface="Calibri"/>
+              </a:rPr>
+              <a:t> </a:t>
+            </a:r>
+            <a:r>
+              <a:rPr lang="en-US" sz="1600" dirty="0" err="1">
+                <a:solidFill>
+                  <a:schemeClr val="accent2">
+                    <a:lumMod val="75000"/>
+                  </a:schemeClr>
+                </a:solidFill>
+                <a:latin typeface="Calibri"/>
+              </a:rPr>
+              <a:t>une</a:t>
+            </a:r>
+            <a:r>
+              <a:rPr lang="en-US" sz="1600" dirty="0">
+                <a:solidFill>
+                  <a:schemeClr val="accent2">
+                    <a:lumMod val="75000"/>
+                  </a:schemeClr>
+                </a:solidFill>
+                <a:latin typeface="Calibri"/>
+              </a:rPr>
+              <a:t> </a:t>
+            </a:r>
+            <a:r>
+              <a:rPr lang="en-US" sz="1600" dirty="0" err="1">
+                <a:solidFill>
+                  <a:schemeClr val="accent2">
+                    <a:lumMod val="75000"/>
+                  </a:schemeClr>
+                </a:solidFill>
+                <a:latin typeface="Calibri"/>
+              </a:rPr>
+              <a:t>priorité</a:t>
+            </a:r>
+            <a:r>
+              <a:rPr lang="en-US" sz="1600" dirty="0">
+                <a:solidFill>
+                  <a:schemeClr val="accent2">
+                    <a:lumMod val="75000"/>
+                  </a:schemeClr>
+                </a:solidFill>
+                <a:latin typeface="Calibri"/>
+              </a:rPr>
+              <a:t> aux </a:t>
+            </a:r>
+            <a:r>
+              <a:rPr lang="en-US" sz="1600" dirty="0" err="1">
+                <a:solidFill>
+                  <a:schemeClr val="accent2">
+                    <a:lumMod val="75000"/>
+                  </a:schemeClr>
+                </a:solidFill>
+                <a:latin typeface="Calibri"/>
+              </a:rPr>
+              <a:t>espèces</a:t>
+            </a:r>
+            <a:r>
+              <a:rPr lang="en-US" sz="1600" dirty="0">
+                <a:solidFill>
+                  <a:schemeClr val="accent2">
+                    <a:lumMod val="75000"/>
+                  </a:schemeClr>
+                </a:solidFill>
+                <a:latin typeface="Calibri"/>
+              </a:rPr>
+              <a:t> </a:t>
+            </a:r>
+            <a:r>
+              <a:rPr lang="en-US" sz="1600" dirty="0" err="1">
+                <a:solidFill>
+                  <a:schemeClr val="accent2">
+                    <a:lumMod val="75000"/>
+                  </a:schemeClr>
+                </a:solidFill>
+                <a:latin typeface="Calibri"/>
+              </a:rPr>
+              <a:t>arctiques</a:t>
+            </a:r>
+            <a:r>
+              <a:rPr lang="en-US" sz="1600" dirty="0">
+                <a:solidFill>
+                  <a:schemeClr val="accent2">
+                    <a:lumMod val="75000"/>
+                  </a:schemeClr>
+                </a:solidFill>
+                <a:latin typeface="Calibri"/>
+              </a:rPr>
+              <a:t>-alpines, </a:t>
+            </a:r>
+            <a:r>
+              <a:rPr lang="en-US" sz="1600" dirty="0" err="1">
+                <a:solidFill>
+                  <a:schemeClr val="accent2">
+                    <a:lumMod val="75000"/>
+                  </a:schemeClr>
+                </a:solidFill>
+                <a:latin typeface="Calibri"/>
+              </a:rPr>
+              <a:t>subarctiques</a:t>
+            </a:r>
+            <a:r>
+              <a:rPr lang="en-US" sz="1600" dirty="0">
+                <a:solidFill>
+                  <a:schemeClr val="accent2">
+                    <a:lumMod val="75000"/>
+                  </a:schemeClr>
+                </a:solidFill>
+                <a:latin typeface="Calibri"/>
+              </a:rPr>
+              <a:t> et </a:t>
+            </a:r>
+            <a:r>
+              <a:rPr lang="en-US" sz="1600" dirty="0" err="1">
+                <a:solidFill>
+                  <a:schemeClr val="accent2">
+                    <a:lumMod val="75000"/>
+                  </a:schemeClr>
+                </a:solidFill>
+                <a:latin typeface="Calibri"/>
+              </a:rPr>
+              <a:t>boréales</a:t>
+            </a:r>
+            <a:r>
+              <a:rPr lang="en-US" sz="1600" dirty="0">
+                <a:solidFill>
+                  <a:schemeClr val="accent2">
+                    <a:lumMod val="75000"/>
+                  </a:schemeClr>
+                </a:solidFill>
+                <a:latin typeface="Calibri"/>
+              </a:rPr>
+              <a:t> du Québec, du Canada et de </a:t>
+            </a:r>
+            <a:r>
+              <a:rPr lang="en-US" sz="1600" dirty="0" err="1">
+                <a:solidFill>
+                  <a:schemeClr val="accent2">
+                    <a:lumMod val="75000"/>
+                  </a:schemeClr>
+                </a:solidFill>
+                <a:latin typeface="Calibri"/>
+              </a:rPr>
+              <a:t>l’hémisphère</a:t>
+            </a:r>
+            <a:r>
+              <a:rPr lang="en-US" sz="1600" dirty="0">
+                <a:solidFill>
+                  <a:schemeClr val="accent2">
+                    <a:lumMod val="75000"/>
+                  </a:schemeClr>
+                </a:solidFill>
+                <a:latin typeface="Calibri"/>
+              </a:rPr>
+              <a:t> </a:t>
+            </a:r>
+            <a:r>
+              <a:rPr lang="en-US" sz="1600" dirty="0" err="1">
+                <a:solidFill>
+                  <a:schemeClr val="accent2">
+                    <a:lumMod val="75000"/>
+                  </a:schemeClr>
+                </a:solidFill>
+                <a:latin typeface="Calibri"/>
+              </a:rPr>
+              <a:t>nord</a:t>
+            </a:r>
+            <a:r>
+              <a:rPr lang="en-US" sz="1600" dirty="0">
+                <a:solidFill>
+                  <a:schemeClr val="accent2">
+                    <a:lumMod val="75000"/>
+                  </a:schemeClr>
+                </a:solidFill>
+                <a:latin typeface="Calibri"/>
+              </a:rPr>
+              <a:t>. Ce jeu </a:t>
+            </a:r>
+            <a:r>
+              <a:rPr lang="en-US" sz="1600" dirty="0" err="1">
+                <a:solidFill>
+                  <a:schemeClr val="accent2">
+                    <a:lumMod val="75000"/>
+                  </a:schemeClr>
+                </a:solidFill>
+                <a:latin typeface="Calibri"/>
+              </a:rPr>
+              <a:t>présente</a:t>
+            </a:r>
+            <a:r>
+              <a:rPr lang="en-US" sz="1600" dirty="0">
+                <a:solidFill>
+                  <a:schemeClr val="accent2">
+                    <a:lumMod val="75000"/>
+                  </a:schemeClr>
+                </a:solidFill>
+                <a:latin typeface="Calibri"/>
+              </a:rPr>
+              <a:t> </a:t>
+            </a:r>
+            <a:r>
+              <a:rPr lang="en-US" sz="1600" dirty="0" err="1">
+                <a:solidFill>
+                  <a:schemeClr val="accent2">
+                    <a:lumMod val="75000"/>
+                  </a:schemeClr>
+                </a:solidFill>
+                <a:latin typeface="Calibri"/>
+              </a:rPr>
+              <a:t>principalement</a:t>
+            </a:r>
+            <a:r>
+              <a:rPr lang="en-US" sz="1600" dirty="0">
+                <a:solidFill>
+                  <a:schemeClr val="accent2">
+                    <a:lumMod val="75000"/>
+                  </a:schemeClr>
+                </a:solidFill>
+                <a:latin typeface="Calibri"/>
+              </a:rPr>
+              <a:t> des </a:t>
+            </a:r>
+            <a:r>
+              <a:rPr lang="en-US" sz="1600" dirty="0" err="1">
+                <a:solidFill>
+                  <a:schemeClr val="accent2">
+                    <a:lumMod val="75000"/>
+                  </a:schemeClr>
+                </a:solidFill>
+                <a:latin typeface="Calibri"/>
+              </a:rPr>
+              <a:t>spécimens</a:t>
+            </a:r>
+            <a:r>
+              <a:rPr lang="en-US" sz="1600" dirty="0">
+                <a:solidFill>
+                  <a:schemeClr val="accent2">
+                    <a:lumMod val="75000"/>
+                  </a:schemeClr>
+                </a:solidFill>
+                <a:latin typeface="Calibri"/>
+              </a:rPr>
+              <a:t> </a:t>
+            </a:r>
+            <a:r>
+              <a:rPr lang="en-US" sz="1600" dirty="0" err="1">
+                <a:solidFill>
+                  <a:schemeClr val="accent2">
+                    <a:lumMod val="75000"/>
+                  </a:schemeClr>
+                </a:solidFill>
+                <a:latin typeface="Calibri"/>
+              </a:rPr>
+              <a:t>provenant</a:t>
+            </a:r>
+            <a:r>
+              <a:rPr lang="en-US" sz="1600" dirty="0">
+                <a:solidFill>
+                  <a:schemeClr val="accent2">
+                    <a:lumMod val="75000"/>
+                  </a:schemeClr>
+                </a:solidFill>
+                <a:latin typeface="Calibri"/>
+              </a:rPr>
+              <a:t> du Québec.</a:t>
+            </a:r>
           </a:p>
         </p:txBody>
       </p:sp>

</xml_diff>